<commit_message>
Added outline for ICRAR powerpoint presentation
</commit_message>
<xml_diff>
--- a/ICRAR-Black-Powerpoint.pptx
+++ b/ICRAR-Black-Powerpoint.pptx
@@ -5,14 +5,25 @@
     <p:sldMasterId id="2147483648" r:id="rId1"/>
   </p:sldMasterIdLst>
   <p:notesMasterIdLst>
-    <p:notesMasterId r:id="rId4"/>
+    <p:notesMasterId r:id="rId15"/>
   </p:notesMasterIdLst>
   <p:handoutMasterIdLst>
-    <p:handoutMasterId r:id="rId5"/>
+    <p:handoutMasterId r:id="rId16"/>
   </p:handoutMasterIdLst>
   <p:sldIdLst>
     <p:sldId id="256" r:id="rId2"/>
     <p:sldId id="257" r:id="rId3"/>
+    <p:sldId id="258" r:id="rId4"/>
+    <p:sldId id="265" r:id="rId5"/>
+    <p:sldId id="259" r:id="rId6"/>
+    <p:sldId id="262" r:id="rId7"/>
+    <p:sldId id="266" r:id="rId8"/>
+    <p:sldId id="260" r:id="rId9"/>
+    <p:sldId id="261" r:id="rId10"/>
+    <p:sldId id="263" r:id="rId11"/>
+    <p:sldId id="264" r:id="rId12"/>
+    <p:sldId id="267" r:id="rId13"/>
+    <p:sldId id="268" r:id="rId14"/>
   </p:sldIdLst>
   <p:sldSz cx="9144000" cy="6858000" type="screen4x3"/>
   <p:notesSz cx="6858000" cy="9144000"/>
@@ -196,7 +207,7 @@
           <a:p>
             <a:fld id="{CF40E7CB-B090-6140-958A-EAE3EFECA0AB}" type="datetimeFigureOut">
               <a:rPr lang="en-US" smtClean="0"/>
-              <a:t>30/1/17</a:t>
+              <a:t>7/02/17</a:t>
             </a:fld>
             <a:endParaRPr lang="en-US"/>
           </a:p>
@@ -362,7 +373,7 @@
           <a:p>
             <a:fld id="{CC8FA2BA-21CB-AC41-BDFF-8AF1F2C23B5F}" type="datetimeFigureOut">
               <a:rPr lang="en-US" smtClean="0"/>
-              <a:t>30/1/17</a:t>
+              <a:t>7/02/17</a:t>
             </a:fld>
             <a:endParaRPr lang="en-US"/>
           </a:p>
@@ -2297,6 +2308,10 @@
           <a:bodyPr/>
           <a:lstStyle/>
           <a:p>
+            <a:r>
+              <a:rPr lang="en-US" dirty="0" smtClean="0"/>
+              <a:t>Alignment of Stellar Halos with Filaments of the Cosmic Web</a:t>
+            </a:r>
             <a:endParaRPr lang="en-US" dirty="0"/>
           </a:p>
         </p:txBody>
@@ -2316,7 +2331,25 @@
           <a:bodyPr/>
           <a:lstStyle/>
           <a:p>
-            <a:endParaRPr lang="en-US"/>
+            <a:r>
+              <a:rPr lang="en-US" dirty="0" smtClean="0"/>
+              <a:t>Emily Hackett</a:t>
+            </a:r>
+          </a:p>
+          <a:p>
+            <a:r>
+              <a:rPr lang="en-US" sz="2000" dirty="0" smtClean="0"/>
+              <a:t>ICRAR-</a:t>
+            </a:r>
+            <a:r>
+              <a:rPr lang="en-US" sz="2000" dirty="0" err="1" smtClean="0"/>
+              <a:t>Pawsey</a:t>
+            </a:r>
+            <a:r>
+              <a:rPr lang="en-US" sz="2000" dirty="0" smtClean="0"/>
+              <a:t> Summer Studentship</a:t>
+            </a:r>
+            <a:endParaRPr lang="en-US" sz="2000" dirty="0"/>
           </a:p>
         </p:txBody>
       </p:sp>
@@ -2324,6 +2357,570 @@
     <p:extLst>
       <p:ext uri="{BB962C8B-B14F-4D97-AF65-F5344CB8AC3E}">
         <p14:creationId xmlns:p14="http://schemas.microsoft.com/office/powerpoint/2010/main" val="1825234592"/>
+      </p:ext>
+    </p:extLst>
+  </p:cSld>
+  <p:clrMapOvr>
+    <a:masterClrMapping/>
+  </p:clrMapOvr>
+</p:sld>
+</file>
+
+<file path=ppt/slides/slide10.xml><?xml version="1.0" encoding="utf-8"?>
+<p:sld xmlns:a="http://schemas.openxmlformats.org/drawingml/2006/main" xmlns:r="http://schemas.openxmlformats.org/officeDocument/2006/relationships" xmlns:p="http://schemas.openxmlformats.org/presentationml/2006/main">
+  <p:cSld>
+    <p:spTree>
+      <p:nvGrpSpPr>
+        <p:cNvPr id="1" name=""/>
+        <p:cNvGrpSpPr/>
+        <p:nvPr/>
+      </p:nvGrpSpPr>
+      <p:grpSpPr>
+        <a:xfrm>
+          <a:off x="0" y="0"/>
+          <a:ext cx="0" cy="0"/>
+          <a:chOff x="0" y="0"/>
+          <a:chExt cx="0" cy="0"/>
+        </a:xfrm>
+      </p:grpSpPr>
+      <p:sp>
+        <p:nvSpPr>
+          <p:cNvPr id="2" name="Title 1"/>
+          <p:cNvSpPr>
+            <a:spLocks noGrp="1"/>
+          </p:cNvSpPr>
+          <p:nvPr>
+            <p:ph type="title"/>
+          </p:nvPr>
+        </p:nvSpPr>
+        <p:spPr/>
+        <p:txBody>
+          <a:bodyPr>
+            <a:normAutofit fontScale="90000"/>
+          </a:bodyPr>
+          <a:lstStyle/>
+          <a:p>
+            <a:r>
+              <a:rPr lang="en-US" dirty="0" err="1" smtClean="0"/>
+              <a:t>Examing</a:t>
+            </a:r>
+            <a:r>
+              <a:rPr lang="en-US" dirty="0" smtClean="0"/>
+              <a:t> Correlations</a:t>
+            </a:r>
+            <a:endParaRPr lang="en-US" dirty="0"/>
+          </a:p>
+        </p:txBody>
+      </p:sp>
+      <p:sp>
+        <p:nvSpPr>
+          <p:cNvPr id="3" name="Footer Placeholder 2"/>
+          <p:cNvSpPr>
+            <a:spLocks noGrp="1"/>
+          </p:cNvSpPr>
+          <p:nvPr>
+            <p:ph type="ftr" sz="quarter" idx="10"/>
+          </p:nvPr>
+        </p:nvSpPr>
+        <p:spPr/>
+        <p:txBody>
+          <a:bodyPr/>
+          <a:lstStyle/>
+          <a:p>
+            <a:r>
+              <a:rPr lang="en-US" dirty="0" smtClean="0"/>
+              <a:t>Presentation Title (Edit in File &gt; 'Page Setup')</a:t>
+            </a:r>
+            <a:endParaRPr lang="en-US" dirty="0"/>
+          </a:p>
+        </p:txBody>
+      </p:sp>
+      <p:sp>
+        <p:nvSpPr>
+          <p:cNvPr id="4" name="Text Placeholder 3"/>
+          <p:cNvSpPr>
+            <a:spLocks noGrp="1"/>
+          </p:cNvSpPr>
+          <p:nvPr>
+            <p:ph type="body" sz="quarter" idx="14"/>
+          </p:nvPr>
+        </p:nvSpPr>
+        <p:spPr/>
+        <p:txBody>
+          <a:bodyPr/>
+          <a:lstStyle/>
+          <a:p>
+            <a:r>
+              <a:rPr lang="en-US" dirty="0" smtClean="0"/>
+              <a:t>Plotting angle between the major axis of the halo and the filament</a:t>
+            </a:r>
+            <a:endParaRPr lang="en-US" dirty="0" smtClean="0"/>
+          </a:p>
+          <a:p>
+            <a:pPr lvl="1"/>
+            <a:r>
+              <a:rPr lang="en-US" dirty="0" smtClean="0"/>
+              <a:t>What about the other axes? Did we plot these?</a:t>
+            </a:r>
+            <a:endParaRPr lang="en-US" dirty="0" smtClean="0"/>
+          </a:p>
+          <a:p>
+            <a:pPr lvl="2"/>
+            <a:r>
+              <a:rPr lang="en-US" dirty="0" smtClean="0"/>
+              <a:t>Bullet 1</a:t>
+            </a:r>
+          </a:p>
+          <a:p>
+            <a:pPr lvl="3"/>
+            <a:r>
+              <a:rPr lang="en-US" dirty="0" smtClean="0"/>
+              <a:t>Bullet 2</a:t>
+            </a:r>
+          </a:p>
+          <a:p>
+            <a:pPr lvl="4"/>
+            <a:r>
+              <a:rPr lang="en-US" dirty="0" smtClean="0"/>
+              <a:t>Bullet 3</a:t>
+            </a:r>
+            <a:endParaRPr lang="en-US" dirty="0"/>
+          </a:p>
+        </p:txBody>
+      </p:sp>
+    </p:spTree>
+    <p:extLst>
+      <p:ext uri="{BB962C8B-B14F-4D97-AF65-F5344CB8AC3E}">
+        <p14:creationId xmlns:p14="http://schemas.microsoft.com/office/powerpoint/2010/main" val="136223336"/>
+      </p:ext>
+    </p:extLst>
+  </p:cSld>
+  <p:clrMapOvr>
+    <a:masterClrMapping/>
+  </p:clrMapOvr>
+</p:sld>
+</file>
+
+<file path=ppt/slides/slide11.xml><?xml version="1.0" encoding="utf-8"?>
+<p:sld xmlns:a="http://schemas.openxmlformats.org/drawingml/2006/main" xmlns:r="http://schemas.openxmlformats.org/officeDocument/2006/relationships" xmlns:p="http://schemas.openxmlformats.org/presentationml/2006/main">
+  <p:cSld>
+    <p:spTree>
+      <p:nvGrpSpPr>
+        <p:cNvPr id="1" name=""/>
+        <p:cNvGrpSpPr/>
+        <p:nvPr/>
+      </p:nvGrpSpPr>
+      <p:grpSpPr>
+        <a:xfrm>
+          <a:off x="0" y="0"/>
+          <a:ext cx="0" cy="0"/>
+          <a:chOff x="0" y="0"/>
+          <a:chExt cx="0" cy="0"/>
+        </a:xfrm>
+      </p:grpSpPr>
+      <p:sp>
+        <p:nvSpPr>
+          <p:cNvPr id="2" name="Title 1"/>
+          <p:cNvSpPr>
+            <a:spLocks noGrp="1"/>
+          </p:cNvSpPr>
+          <p:nvPr>
+            <p:ph type="title"/>
+          </p:nvPr>
+        </p:nvSpPr>
+        <p:spPr/>
+        <p:txBody>
+          <a:bodyPr>
+            <a:normAutofit fontScale="90000"/>
+          </a:bodyPr>
+          <a:lstStyle/>
+          <a:p>
+            <a:r>
+              <a:rPr lang="en-US" dirty="0" smtClean="0"/>
+              <a:t>Results?</a:t>
+            </a:r>
+            <a:endParaRPr lang="en-US" dirty="0"/>
+          </a:p>
+        </p:txBody>
+      </p:sp>
+      <p:sp>
+        <p:nvSpPr>
+          <p:cNvPr id="3" name="Footer Placeholder 2"/>
+          <p:cNvSpPr>
+            <a:spLocks noGrp="1"/>
+          </p:cNvSpPr>
+          <p:nvPr>
+            <p:ph type="ftr" sz="quarter" idx="10"/>
+          </p:nvPr>
+        </p:nvSpPr>
+        <p:spPr/>
+        <p:txBody>
+          <a:bodyPr/>
+          <a:lstStyle/>
+          <a:p>
+            <a:r>
+              <a:rPr lang="en-US" dirty="0" smtClean="0"/>
+              <a:t>Presentation Title (Edit in File &gt; 'Page Setup')</a:t>
+            </a:r>
+            <a:endParaRPr lang="en-US" dirty="0"/>
+          </a:p>
+        </p:txBody>
+      </p:sp>
+      <p:sp>
+        <p:nvSpPr>
+          <p:cNvPr id="4" name="Text Placeholder 3"/>
+          <p:cNvSpPr>
+            <a:spLocks noGrp="1"/>
+          </p:cNvSpPr>
+          <p:nvPr>
+            <p:ph type="body" sz="quarter" idx="14"/>
+          </p:nvPr>
+        </p:nvSpPr>
+        <p:spPr/>
+        <p:txBody>
+          <a:bodyPr/>
+          <a:lstStyle/>
+          <a:p>
+            <a:r>
+              <a:rPr lang="en-US" dirty="0" smtClean="0"/>
+              <a:t>What did this say about large-scale structure formation?</a:t>
+            </a:r>
+          </a:p>
+          <a:p>
+            <a:pPr lvl="1"/>
+            <a:r>
+              <a:rPr lang="en-US" dirty="0" smtClean="0"/>
+              <a:t>On the level of this single cluster</a:t>
+            </a:r>
+            <a:endParaRPr lang="en-US" dirty="0" smtClean="0"/>
+          </a:p>
+          <a:p>
+            <a:pPr lvl="2"/>
+            <a:r>
+              <a:rPr lang="en-US" dirty="0" smtClean="0"/>
+              <a:t>Bullet 1</a:t>
+            </a:r>
+          </a:p>
+          <a:p>
+            <a:pPr lvl="3"/>
+            <a:r>
+              <a:rPr lang="en-US" dirty="0" smtClean="0"/>
+              <a:t>Bullet 2</a:t>
+            </a:r>
+          </a:p>
+          <a:p>
+            <a:pPr lvl="4"/>
+            <a:r>
+              <a:rPr lang="en-US" dirty="0" smtClean="0"/>
+              <a:t>Bullet 3</a:t>
+            </a:r>
+            <a:endParaRPr lang="en-US" dirty="0"/>
+          </a:p>
+        </p:txBody>
+      </p:sp>
+    </p:spTree>
+    <p:extLst>
+      <p:ext uri="{BB962C8B-B14F-4D97-AF65-F5344CB8AC3E}">
+        <p14:creationId xmlns:p14="http://schemas.microsoft.com/office/powerpoint/2010/main" val="346904941"/>
+      </p:ext>
+    </p:extLst>
+  </p:cSld>
+  <p:clrMapOvr>
+    <a:masterClrMapping/>
+  </p:clrMapOvr>
+</p:sld>
+</file>
+
+<file path=ppt/slides/slide12.xml><?xml version="1.0" encoding="utf-8"?>
+<p:sld xmlns:a="http://schemas.openxmlformats.org/drawingml/2006/main" xmlns:r="http://schemas.openxmlformats.org/officeDocument/2006/relationships" xmlns:p="http://schemas.openxmlformats.org/presentationml/2006/main">
+  <p:cSld>
+    <p:spTree>
+      <p:nvGrpSpPr>
+        <p:cNvPr id="1" name=""/>
+        <p:cNvGrpSpPr/>
+        <p:nvPr/>
+      </p:nvGrpSpPr>
+      <p:grpSpPr>
+        <a:xfrm>
+          <a:off x="0" y="0"/>
+          <a:ext cx="0" cy="0"/>
+          <a:chOff x="0" y="0"/>
+          <a:chExt cx="0" cy="0"/>
+        </a:xfrm>
+      </p:grpSpPr>
+      <p:sp>
+        <p:nvSpPr>
+          <p:cNvPr id="2" name="Title 1"/>
+          <p:cNvSpPr>
+            <a:spLocks noGrp="1"/>
+          </p:cNvSpPr>
+          <p:nvPr>
+            <p:ph type="title"/>
+          </p:nvPr>
+        </p:nvSpPr>
+        <p:spPr/>
+        <p:txBody>
+          <a:bodyPr>
+            <a:normAutofit fontScale="90000"/>
+          </a:bodyPr>
+          <a:lstStyle/>
+          <a:p>
+            <a:r>
+              <a:rPr lang="en-US" dirty="0" smtClean="0"/>
+              <a:t>Results?</a:t>
+            </a:r>
+            <a:endParaRPr lang="en-US" dirty="0"/>
+          </a:p>
+        </p:txBody>
+      </p:sp>
+      <p:sp>
+        <p:nvSpPr>
+          <p:cNvPr id="3" name="Footer Placeholder 2"/>
+          <p:cNvSpPr>
+            <a:spLocks noGrp="1"/>
+          </p:cNvSpPr>
+          <p:nvPr>
+            <p:ph type="ftr" sz="quarter" idx="10"/>
+          </p:nvPr>
+        </p:nvSpPr>
+        <p:spPr/>
+        <p:txBody>
+          <a:bodyPr/>
+          <a:lstStyle/>
+          <a:p>
+            <a:r>
+              <a:rPr lang="en-US" dirty="0" smtClean="0"/>
+              <a:t>Presentation Title (Edit in File &gt; 'Page Setup')</a:t>
+            </a:r>
+            <a:endParaRPr lang="en-US" dirty="0"/>
+          </a:p>
+        </p:txBody>
+      </p:sp>
+      <p:sp>
+        <p:nvSpPr>
+          <p:cNvPr id="4" name="Text Placeholder 3"/>
+          <p:cNvSpPr>
+            <a:spLocks noGrp="1"/>
+          </p:cNvSpPr>
+          <p:nvPr>
+            <p:ph type="body" sz="quarter" idx="14"/>
+          </p:nvPr>
+        </p:nvSpPr>
+        <p:spPr/>
+        <p:txBody>
+          <a:bodyPr/>
+          <a:lstStyle/>
+          <a:p>
+            <a:r>
+              <a:rPr lang="en-US" dirty="0" smtClean="0"/>
+              <a:t>What did this say about large-scale structure formation?</a:t>
+            </a:r>
+          </a:p>
+          <a:p>
+            <a:pPr lvl="1"/>
+            <a:r>
+              <a:rPr lang="en-US" dirty="0" smtClean="0"/>
+              <a:t>What could we expect to see in a larger simulation data set (such as Horizon-AGN)?</a:t>
+            </a:r>
+            <a:endParaRPr lang="en-US" dirty="0" smtClean="0"/>
+          </a:p>
+          <a:p>
+            <a:pPr lvl="2"/>
+            <a:r>
+              <a:rPr lang="en-US" dirty="0" smtClean="0"/>
+              <a:t>Bullet 1</a:t>
+            </a:r>
+          </a:p>
+          <a:p>
+            <a:pPr lvl="3"/>
+            <a:r>
+              <a:rPr lang="en-US" dirty="0" smtClean="0"/>
+              <a:t>Bullet 2</a:t>
+            </a:r>
+          </a:p>
+          <a:p>
+            <a:pPr lvl="4"/>
+            <a:r>
+              <a:rPr lang="en-US" dirty="0" smtClean="0"/>
+              <a:t>Bullet 3</a:t>
+            </a:r>
+            <a:endParaRPr lang="en-US" dirty="0"/>
+          </a:p>
+        </p:txBody>
+      </p:sp>
+    </p:spTree>
+    <p:extLst>
+      <p:ext uri="{BB962C8B-B14F-4D97-AF65-F5344CB8AC3E}">
+        <p14:creationId xmlns:p14="http://schemas.microsoft.com/office/powerpoint/2010/main" val="2013433585"/>
+      </p:ext>
+    </p:extLst>
+  </p:cSld>
+  <p:clrMapOvr>
+    <a:masterClrMapping/>
+  </p:clrMapOvr>
+</p:sld>
+</file>
+
+<file path=ppt/slides/slide13.xml><?xml version="1.0" encoding="utf-8"?>
+<p:sld xmlns:a="http://schemas.openxmlformats.org/drawingml/2006/main" xmlns:r="http://schemas.openxmlformats.org/officeDocument/2006/relationships" xmlns:p="http://schemas.openxmlformats.org/presentationml/2006/main">
+  <p:cSld>
+    <p:spTree>
+      <p:nvGrpSpPr>
+        <p:cNvPr id="1" name=""/>
+        <p:cNvGrpSpPr/>
+        <p:nvPr/>
+      </p:nvGrpSpPr>
+      <p:grpSpPr>
+        <a:xfrm>
+          <a:off x="0" y="0"/>
+          <a:ext cx="0" cy="0"/>
+          <a:chOff x="0" y="0"/>
+          <a:chExt cx="0" cy="0"/>
+        </a:xfrm>
+      </p:grpSpPr>
+      <p:sp>
+        <p:nvSpPr>
+          <p:cNvPr id="2" name="Title 1"/>
+          <p:cNvSpPr>
+            <a:spLocks noGrp="1"/>
+          </p:cNvSpPr>
+          <p:nvPr>
+            <p:ph type="title"/>
+          </p:nvPr>
+        </p:nvSpPr>
+        <p:spPr/>
+        <p:txBody>
+          <a:bodyPr>
+            <a:normAutofit fontScale="90000"/>
+          </a:bodyPr>
+          <a:lstStyle/>
+          <a:p>
+            <a:r>
+              <a:rPr lang="en-US" dirty="0" smtClean="0"/>
+              <a:t>Acknowledgments</a:t>
+            </a:r>
+            <a:endParaRPr lang="en-US" dirty="0"/>
+          </a:p>
+        </p:txBody>
+      </p:sp>
+      <p:sp>
+        <p:nvSpPr>
+          <p:cNvPr id="3" name="Footer Placeholder 2"/>
+          <p:cNvSpPr>
+            <a:spLocks noGrp="1"/>
+          </p:cNvSpPr>
+          <p:nvPr>
+            <p:ph type="ftr" sz="quarter" idx="10"/>
+          </p:nvPr>
+        </p:nvSpPr>
+        <p:spPr/>
+        <p:txBody>
+          <a:bodyPr/>
+          <a:lstStyle/>
+          <a:p>
+            <a:r>
+              <a:rPr lang="en-US" dirty="0" smtClean="0"/>
+              <a:t>Presentation Title (Edit in File &gt; 'Page Setup')</a:t>
+            </a:r>
+            <a:endParaRPr lang="en-US" dirty="0"/>
+          </a:p>
+        </p:txBody>
+      </p:sp>
+      <p:sp>
+        <p:nvSpPr>
+          <p:cNvPr id="4" name="Text Placeholder 3"/>
+          <p:cNvSpPr>
+            <a:spLocks noGrp="1"/>
+          </p:cNvSpPr>
+          <p:nvPr>
+            <p:ph type="body" sz="quarter" idx="14"/>
+          </p:nvPr>
+        </p:nvSpPr>
+        <p:spPr/>
+        <p:txBody>
+          <a:bodyPr/>
+          <a:lstStyle/>
+          <a:p>
+            <a:r>
+              <a:rPr lang="en-US" dirty="0" smtClean="0"/>
+              <a:t>Thank you to both supervisors at ICRAR (</a:t>
+            </a:r>
+            <a:r>
+              <a:rPr lang="en-US" dirty="0" err="1" smtClean="0"/>
+              <a:t>Dr</a:t>
+            </a:r>
+            <a:r>
+              <a:rPr lang="en-US" dirty="0" smtClean="0"/>
+              <a:t> Chris Power and </a:t>
+            </a:r>
+            <a:r>
+              <a:rPr lang="en-US" dirty="0" err="1" smtClean="0"/>
+              <a:t>Dr</a:t>
+            </a:r>
+            <a:r>
+              <a:rPr lang="en-US" dirty="0" smtClean="0"/>
+              <a:t> Charlotte Welker)</a:t>
+            </a:r>
+          </a:p>
+          <a:p>
+            <a:r>
+              <a:rPr lang="en-US" dirty="0" smtClean="0"/>
+              <a:t>Thank you to Chris </a:t>
+            </a:r>
+            <a:r>
+              <a:rPr lang="en-US" dirty="0" err="1" smtClean="0"/>
+              <a:t>Bording</a:t>
+            </a:r>
+            <a:r>
+              <a:rPr lang="en-US" dirty="0" smtClean="0"/>
+              <a:t> at </a:t>
+            </a:r>
+            <a:r>
+              <a:rPr lang="en-US" dirty="0" err="1" smtClean="0"/>
+              <a:t>Pawsey</a:t>
+            </a:r>
+            <a:r>
+              <a:rPr lang="en-US" dirty="0" smtClean="0"/>
+              <a:t> Supercomputing Centre</a:t>
+            </a:r>
+            <a:endParaRPr lang="en-US" dirty="0" smtClean="0"/>
+          </a:p>
+          <a:p>
+            <a:pPr lvl="1"/>
+            <a:r>
+              <a:rPr lang="en-US" dirty="0" smtClean="0"/>
+              <a:t>Text</a:t>
+            </a:r>
+            <a:endParaRPr lang="en-US" dirty="0" smtClean="0"/>
+          </a:p>
+          <a:p>
+            <a:pPr lvl="2"/>
+            <a:r>
+              <a:rPr lang="en-US" dirty="0" smtClean="0"/>
+              <a:t>Bullet 1</a:t>
+            </a:r>
+          </a:p>
+          <a:p>
+            <a:pPr lvl="3"/>
+            <a:r>
+              <a:rPr lang="en-US" dirty="0" smtClean="0"/>
+              <a:t>Bullet 2</a:t>
+            </a:r>
+          </a:p>
+          <a:p>
+            <a:pPr lvl="4"/>
+            <a:r>
+              <a:rPr lang="en-US" dirty="0" smtClean="0"/>
+              <a:t>Bullet 3</a:t>
+            </a:r>
+            <a:endParaRPr lang="en-US" dirty="0"/>
+          </a:p>
+        </p:txBody>
+      </p:sp>
+    </p:spTree>
+    <p:extLst>
+      <p:ext uri="{BB962C8B-B14F-4D97-AF65-F5344CB8AC3E}">
+        <p14:creationId xmlns:p14="http://schemas.microsoft.com/office/powerpoint/2010/main" val="2013433585"/>
       </p:ext>
     </p:extLst>
   </p:cSld>
@@ -2369,7 +2966,7 @@
           <a:p>
             <a:r>
               <a:rPr lang="en-US" dirty="0" smtClean="0"/>
-              <a:t>Slide Title</a:t>
+              <a:t>Hierarchical Structure Formation</a:t>
             </a:r>
             <a:endParaRPr lang="en-US" dirty="0"/>
           </a:p>
@@ -2415,8 +3012,9 @@
           <a:p>
             <a:r>
               <a:rPr lang="en-US" dirty="0" smtClean="0"/>
-              <a:t>Heading</a:t>
-            </a:r>
+              <a:t>Why look at cosmic web alignment?</a:t>
+            </a:r>
+            <a:endParaRPr lang="en-US" dirty="0" smtClean="0"/>
           </a:p>
           <a:p>
             <a:pPr lvl="1"/>
@@ -2453,6 +3051,968 @@
     <p:extLst>
       <p:ext uri="{BB962C8B-B14F-4D97-AF65-F5344CB8AC3E}">
         <p14:creationId xmlns:p14="http://schemas.microsoft.com/office/powerpoint/2010/main" val="3224246657"/>
+      </p:ext>
+    </p:extLst>
+  </p:cSld>
+  <p:clrMapOvr>
+    <a:masterClrMapping/>
+  </p:clrMapOvr>
+</p:sld>
+</file>
+
+<file path=ppt/slides/slide3.xml><?xml version="1.0" encoding="utf-8"?>
+<p:sld xmlns:a="http://schemas.openxmlformats.org/drawingml/2006/main" xmlns:r="http://schemas.openxmlformats.org/officeDocument/2006/relationships" xmlns:p="http://schemas.openxmlformats.org/presentationml/2006/main">
+  <p:cSld>
+    <p:spTree>
+      <p:nvGrpSpPr>
+        <p:cNvPr id="1" name=""/>
+        <p:cNvGrpSpPr/>
+        <p:nvPr/>
+      </p:nvGrpSpPr>
+      <p:grpSpPr>
+        <a:xfrm>
+          <a:off x="0" y="0"/>
+          <a:ext cx="0" cy="0"/>
+          <a:chOff x="0" y="0"/>
+          <a:chExt cx="0" cy="0"/>
+        </a:xfrm>
+      </p:grpSpPr>
+      <p:sp>
+        <p:nvSpPr>
+          <p:cNvPr id="2" name="Title 1"/>
+          <p:cNvSpPr>
+            <a:spLocks noGrp="1"/>
+          </p:cNvSpPr>
+          <p:nvPr>
+            <p:ph type="title"/>
+          </p:nvPr>
+        </p:nvSpPr>
+        <p:spPr/>
+        <p:txBody>
+          <a:bodyPr>
+            <a:normAutofit fontScale="90000"/>
+          </a:bodyPr>
+          <a:lstStyle/>
+          <a:p>
+            <a:r>
+              <a:rPr lang="en-US" dirty="0" smtClean="0"/>
+              <a:t>Why Stellar Halos?</a:t>
+            </a:r>
+            <a:endParaRPr lang="en-US" dirty="0"/>
+          </a:p>
+        </p:txBody>
+      </p:sp>
+      <p:sp>
+        <p:nvSpPr>
+          <p:cNvPr id="3" name="Footer Placeholder 2"/>
+          <p:cNvSpPr>
+            <a:spLocks noGrp="1"/>
+          </p:cNvSpPr>
+          <p:nvPr>
+            <p:ph type="ftr" sz="quarter" idx="10"/>
+          </p:nvPr>
+        </p:nvSpPr>
+        <p:spPr/>
+        <p:txBody>
+          <a:bodyPr/>
+          <a:lstStyle/>
+          <a:p>
+            <a:r>
+              <a:rPr lang="en-US" smtClean="0"/>
+              <a:t>Presentation Title (Edit in File &gt; 'Page Setup')</a:t>
+            </a:r>
+            <a:endParaRPr lang="en-US" dirty="0"/>
+          </a:p>
+        </p:txBody>
+      </p:sp>
+      <p:sp>
+        <p:nvSpPr>
+          <p:cNvPr id="4" name="Text Placeholder 3"/>
+          <p:cNvSpPr>
+            <a:spLocks noGrp="1"/>
+          </p:cNvSpPr>
+          <p:nvPr>
+            <p:ph type="body" sz="quarter" idx="14"/>
+          </p:nvPr>
+        </p:nvSpPr>
+        <p:spPr/>
+        <p:txBody>
+          <a:bodyPr/>
+          <a:lstStyle/>
+          <a:p>
+            <a:r>
+              <a:rPr lang="en-US" dirty="0" smtClean="0"/>
+              <a:t>In previous research, stellar halo is filtered out (e.g. to look at galaxies or DM only)</a:t>
+            </a:r>
+            <a:endParaRPr lang="en-US" dirty="0" smtClean="0"/>
+          </a:p>
+          <a:p>
+            <a:pPr lvl="1"/>
+            <a:r>
+              <a:rPr lang="en-US" dirty="0" smtClean="0"/>
+              <a:t>Text</a:t>
+            </a:r>
+          </a:p>
+          <a:p>
+            <a:pPr lvl="2"/>
+            <a:r>
+              <a:rPr lang="en-US" dirty="0" smtClean="0"/>
+              <a:t>Bullet 1</a:t>
+            </a:r>
+          </a:p>
+          <a:p>
+            <a:pPr lvl="3"/>
+            <a:r>
+              <a:rPr lang="en-US" dirty="0" smtClean="0"/>
+              <a:t>Bullet 2</a:t>
+            </a:r>
+          </a:p>
+          <a:p>
+            <a:pPr lvl="4"/>
+            <a:r>
+              <a:rPr lang="en-US" dirty="0" smtClean="0"/>
+              <a:t>Bullet 3</a:t>
+            </a:r>
+            <a:endParaRPr lang="en-US" dirty="0"/>
+          </a:p>
+        </p:txBody>
+      </p:sp>
+    </p:spTree>
+    <p:extLst>
+      <p:ext uri="{BB962C8B-B14F-4D97-AF65-F5344CB8AC3E}">
+        <p14:creationId xmlns:p14="http://schemas.microsoft.com/office/powerpoint/2010/main" val="3723072916"/>
+      </p:ext>
+    </p:extLst>
+  </p:cSld>
+  <p:clrMapOvr>
+    <a:masterClrMapping/>
+  </p:clrMapOvr>
+</p:sld>
+</file>
+
+<file path=ppt/slides/slide4.xml><?xml version="1.0" encoding="utf-8"?>
+<p:sld xmlns:a="http://schemas.openxmlformats.org/drawingml/2006/main" xmlns:r="http://schemas.openxmlformats.org/officeDocument/2006/relationships" xmlns:p="http://schemas.openxmlformats.org/presentationml/2006/main">
+  <p:cSld>
+    <p:spTree>
+      <p:nvGrpSpPr>
+        <p:cNvPr id="1" name=""/>
+        <p:cNvGrpSpPr/>
+        <p:nvPr/>
+      </p:nvGrpSpPr>
+      <p:grpSpPr>
+        <a:xfrm>
+          <a:off x="0" y="0"/>
+          <a:ext cx="0" cy="0"/>
+          <a:chOff x="0" y="0"/>
+          <a:chExt cx="0" cy="0"/>
+        </a:xfrm>
+      </p:grpSpPr>
+      <p:sp>
+        <p:nvSpPr>
+          <p:cNvPr id="2" name="Title 1"/>
+          <p:cNvSpPr>
+            <a:spLocks noGrp="1"/>
+          </p:cNvSpPr>
+          <p:nvPr>
+            <p:ph type="title"/>
+          </p:nvPr>
+        </p:nvSpPr>
+        <p:spPr/>
+        <p:txBody>
+          <a:bodyPr>
+            <a:normAutofit fontScale="90000"/>
+          </a:bodyPr>
+          <a:lstStyle/>
+          <a:p>
+            <a:r>
+              <a:rPr lang="en-US" dirty="0" err="1" smtClean="0"/>
+              <a:t>nIFTy</a:t>
+            </a:r>
+            <a:r>
+              <a:rPr lang="en-US" dirty="0" smtClean="0"/>
+              <a:t> Cluster</a:t>
+            </a:r>
+            <a:endParaRPr lang="en-US" dirty="0"/>
+          </a:p>
+        </p:txBody>
+      </p:sp>
+      <p:sp>
+        <p:nvSpPr>
+          <p:cNvPr id="3" name="Footer Placeholder 2"/>
+          <p:cNvSpPr>
+            <a:spLocks noGrp="1"/>
+          </p:cNvSpPr>
+          <p:nvPr>
+            <p:ph type="ftr" sz="quarter" idx="10"/>
+          </p:nvPr>
+        </p:nvSpPr>
+        <p:spPr/>
+        <p:txBody>
+          <a:bodyPr/>
+          <a:lstStyle/>
+          <a:p>
+            <a:r>
+              <a:rPr lang="en-US" smtClean="0"/>
+              <a:t>Presentation Title (Edit in File &gt; 'Page Setup')</a:t>
+            </a:r>
+            <a:endParaRPr lang="en-US" dirty="0"/>
+          </a:p>
+        </p:txBody>
+      </p:sp>
+      <p:sp>
+        <p:nvSpPr>
+          <p:cNvPr id="4" name="Text Placeholder 3"/>
+          <p:cNvSpPr>
+            <a:spLocks noGrp="1"/>
+          </p:cNvSpPr>
+          <p:nvPr>
+            <p:ph type="body" sz="quarter" idx="14"/>
+          </p:nvPr>
+        </p:nvSpPr>
+        <p:spPr/>
+        <p:txBody>
+          <a:bodyPr/>
+          <a:lstStyle/>
+          <a:p>
+            <a:r>
+              <a:rPr lang="en-US" dirty="0" smtClean="0"/>
+              <a:t>Why the </a:t>
+            </a:r>
+            <a:r>
+              <a:rPr lang="en-US" dirty="0" err="1" smtClean="0"/>
+              <a:t>nIFTy</a:t>
+            </a:r>
+            <a:r>
+              <a:rPr lang="en-US" dirty="0" smtClean="0"/>
+              <a:t> cluster?</a:t>
+            </a:r>
+            <a:endParaRPr lang="en-US" dirty="0" smtClean="0"/>
+          </a:p>
+          <a:p>
+            <a:pPr lvl="2"/>
+            <a:r>
+              <a:rPr lang="en-US" dirty="0" smtClean="0"/>
+              <a:t>Relationship to Horizon-AGN simulation (initial goal)</a:t>
+            </a:r>
+            <a:endParaRPr lang="en-US" dirty="0" smtClean="0"/>
+          </a:p>
+          <a:p>
+            <a:pPr lvl="3"/>
+            <a:r>
+              <a:rPr lang="en-US" dirty="0" smtClean="0"/>
+              <a:t>Bullet 2</a:t>
+            </a:r>
+          </a:p>
+          <a:p>
+            <a:pPr lvl="4"/>
+            <a:r>
+              <a:rPr lang="en-US" dirty="0" smtClean="0"/>
+              <a:t>Bullet 3</a:t>
+            </a:r>
+            <a:endParaRPr lang="en-US" dirty="0"/>
+          </a:p>
+        </p:txBody>
+      </p:sp>
+    </p:spTree>
+    <p:extLst>
+      <p:ext uri="{BB962C8B-B14F-4D97-AF65-F5344CB8AC3E}">
+        <p14:creationId xmlns:p14="http://schemas.microsoft.com/office/powerpoint/2010/main" val="2194668825"/>
+      </p:ext>
+    </p:extLst>
+  </p:cSld>
+  <p:clrMapOvr>
+    <a:masterClrMapping/>
+  </p:clrMapOvr>
+</p:sld>
+</file>
+
+<file path=ppt/slides/slide5.xml><?xml version="1.0" encoding="utf-8"?>
+<p:sld xmlns:a="http://schemas.openxmlformats.org/drawingml/2006/main" xmlns:r="http://schemas.openxmlformats.org/officeDocument/2006/relationships" xmlns:p="http://schemas.openxmlformats.org/presentationml/2006/main">
+  <p:cSld>
+    <p:spTree>
+      <p:nvGrpSpPr>
+        <p:cNvPr id="1" name=""/>
+        <p:cNvGrpSpPr/>
+        <p:nvPr/>
+      </p:nvGrpSpPr>
+      <p:grpSpPr>
+        <a:xfrm>
+          <a:off x="0" y="0"/>
+          <a:ext cx="0" cy="0"/>
+          <a:chOff x="0" y="0"/>
+          <a:chExt cx="0" cy="0"/>
+        </a:xfrm>
+      </p:grpSpPr>
+      <p:sp>
+        <p:nvSpPr>
+          <p:cNvPr id="2" name="Title 1"/>
+          <p:cNvSpPr>
+            <a:spLocks noGrp="1"/>
+          </p:cNvSpPr>
+          <p:nvPr>
+            <p:ph type="title"/>
+          </p:nvPr>
+        </p:nvSpPr>
+        <p:spPr/>
+        <p:txBody>
+          <a:bodyPr>
+            <a:normAutofit fontScale="90000"/>
+          </a:bodyPr>
+          <a:lstStyle/>
+          <a:p>
+            <a:r>
+              <a:rPr lang="en-US" dirty="0" smtClean="0"/>
+              <a:t>Halo Shape Properties</a:t>
+            </a:r>
+            <a:endParaRPr lang="en-US" dirty="0"/>
+          </a:p>
+        </p:txBody>
+      </p:sp>
+      <p:sp>
+        <p:nvSpPr>
+          <p:cNvPr id="3" name="Footer Placeholder 2"/>
+          <p:cNvSpPr>
+            <a:spLocks noGrp="1"/>
+          </p:cNvSpPr>
+          <p:nvPr>
+            <p:ph type="ftr" sz="quarter" idx="10"/>
+          </p:nvPr>
+        </p:nvSpPr>
+        <p:spPr/>
+        <p:txBody>
+          <a:bodyPr/>
+          <a:lstStyle/>
+          <a:p>
+            <a:r>
+              <a:rPr lang="en-US" dirty="0" smtClean="0"/>
+              <a:t>Presentation Title (Edit in File &gt; 'Page Setup')</a:t>
+            </a:r>
+            <a:endParaRPr lang="en-US" dirty="0"/>
+          </a:p>
+        </p:txBody>
+      </p:sp>
+      <p:sp>
+        <p:nvSpPr>
+          <p:cNvPr id="4" name="Text Placeholder 3"/>
+          <p:cNvSpPr>
+            <a:spLocks noGrp="1"/>
+          </p:cNvSpPr>
+          <p:nvPr>
+            <p:ph type="body" sz="quarter" idx="14"/>
+          </p:nvPr>
+        </p:nvSpPr>
+        <p:spPr/>
+        <p:txBody>
+          <a:bodyPr/>
+          <a:lstStyle/>
+          <a:p>
+            <a:r>
+              <a:rPr lang="en-US" dirty="0" smtClean="0"/>
+              <a:t>Reduced moment of inertia tensor</a:t>
+            </a:r>
+            <a:endParaRPr lang="en-US" dirty="0" smtClean="0"/>
+          </a:p>
+          <a:p>
+            <a:pPr lvl="1"/>
+            <a:r>
+              <a:rPr lang="en-US" dirty="0" smtClean="0"/>
+              <a:t>Text</a:t>
+            </a:r>
+          </a:p>
+          <a:p>
+            <a:pPr lvl="2"/>
+            <a:r>
+              <a:rPr lang="en-US" dirty="0" smtClean="0"/>
+              <a:t>Bullet 1</a:t>
+            </a:r>
+          </a:p>
+          <a:p>
+            <a:pPr lvl="3"/>
+            <a:r>
+              <a:rPr lang="en-US" dirty="0" smtClean="0"/>
+              <a:t>Bullet 2</a:t>
+            </a:r>
+          </a:p>
+          <a:p>
+            <a:pPr lvl="4"/>
+            <a:r>
+              <a:rPr lang="en-US" dirty="0" smtClean="0"/>
+              <a:t>Bullet 3</a:t>
+            </a:r>
+            <a:endParaRPr lang="en-US" dirty="0"/>
+          </a:p>
+        </p:txBody>
+      </p:sp>
+    </p:spTree>
+    <p:extLst>
+      <p:ext uri="{BB962C8B-B14F-4D97-AF65-F5344CB8AC3E}">
+        <p14:creationId xmlns:p14="http://schemas.microsoft.com/office/powerpoint/2010/main" val="3723072916"/>
+      </p:ext>
+    </p:extLst>
+  </p:cSld>
+  <p:clrMapOvr>
+    <a:masterClrMapping/>
+  </p:clrMapOvr>
+</p:sld>
+</file>
+
+<file path=ppt/slides/slide6.xml><?xml version="1.0" encoding="utf-8"?>
+<p:sld xmlns:a="http://schemas.openxmlformats.org/drawingml/2006/main" xmlns:r="http://schemas.openxmlformats.org/officeDocument/2006/relationships" xmlns:p="http://schemas.openxmlformats.org/presentationml/2006/main">
+  <p:cSld>
+    <p:spTree>
+      <p:nvGrpSpPr>
+        <p:cNvPr id="1" name=""/>
+        <p:cNvGrpSpPr/>
+        <p:nvPr/>
+      </p:nvGrpSpPr>
+      <p:grpSpPr>
+        <a:xfrm>
+          <a:off x="0" y="0"/>
+          <a:ext cx="0" cy="0"/>
+          <a:chOff x="0" y="0"/>
+          <a:chExt cx="0" cy="0"/>
+        </a:xfrm>
+      </p:grpSpPr>
+      <p:sp>
+        <p:nvSpPr>
+          <p:cNvPr id="2" name="Title 1"/>
+          <p:cNvSpPr>
+            <a:spLocks noGrp="1"/>
+          </p:cNvSpPr>
+          <p:nvPr>
+            <p:ph type="title"/>
+          </p:nvPr>
+        </p:nvSpPr>
+        <p:spPr/>
+        <p:txBody>
+          <a:bodyPr>
+            <a:normAutofit fontScale="90000"/>
+          </a:bodyPr>
+          <a:lstStyle/>
+          <a:p>
+            <a:r>
+              <a:rPr lang="en-US" dirty="0" smtClean="0"/>
+              <a:t>Halo Shape Properties</a:t>
+            </a:r>
+            <a:endParaRPr lang="en-US" dirty="0"/>
+          </a:p>
+        </p:txBody>
+      </p:sp>
+      <p:sp>
+        <p:nvSpPr>
+          <p:cNvPr id="3" name="Footer Placeholder 2"/>
+          <p:cNvSpPr>
+            <a:spLocks noGrp="1"/>
+          </p:cNvSpPr>
+          <p:nvPr>
+            <p:ph type="ftr" sz="quarter" idx="10"/>
+          </p:nvPr>
+        </p:nvSpPr>
+        <p:spPr/>
+        <p:txBody>
+          <a:bodyPr/>
+          <a:lstStyle/>
+          <a:p>
+            <a:r>
+              <a:rPr lang="en-US" dirty="0" smtClean="0"/>
+              <a:t>Presentation Title (Edit in File &gt; 'Page Setup')</a:t>
+            </a:r>
+            <a:endParaRPr lang="en-US" dirty="0"/>
+          </a:p>
+        </p:txBody>
+      </p:sp>
+      <p:sp>
+        <p:nvSpPr>
+          <p:cNvPr id="4" name="Text Placeholder 3"/>
+          <p:cNvSpPr>
+            <a:spLocks noGrp="1"/>
+          </p:cNvSpPr>
+          <p:nvPr>
+            <p:ph type="body" sz="quarter" idx="14"/>
+          </p:nvPr>
+        </p:nvSpPr>
+        <p:spPr/>
+        <p:txBody>
+          <a:bodyPr/>
+          <a:lstStyle/>
+          <a:p>
+            <a:r>
+              <a:rPr lang="en-US" dirty="0" err="1" smtClean="0"/>
+              <a:t>Sphericity</a:t>
+            </a:r>
+            <a:r>
+              <a:rPr lang="en-US" dirty="0" smtClean="0"/>
+              <a:t>, </a:t>
+            </a:r>
+            <a:r>
+              <a:rPr lang="en-US" dirty="0" err="1" smtClean="0"/>
+              <a:t>Triaxiality</a:t>
+            </a:r>
+            <a:r>
+              <a:rPr lang="en-US" dirty="0" smtClean="0"/>
+              <a:t> and </a:t>
+            </a:r>
+            <a:r>
+              <a:rPr lang="en-US" dirty="0" err="1" smtClean="0"/>
+              <a:t>Ellipticity</a:t>
+            </a:r>
+            <a:endParaRPr lang="en-US" dirty="0" smtClean="0"/>
+          </a:p>
+          <a:p>
+            <a:pPr lvl="1"/>
+            <a:r>
+              <a:rPr lang="en-US" dirty="0" smtClean="0"/>
+              <a:t>Differences between these properties?</a:t>
+            </a:r>
+            <a:endParaRPr lang="en-US" dirty="0" smtClean="0"/>
+          </a:p>
+          <a:p>
+            <a:pPr lvl="2"/>
+            <a:r>
+              <a:rPr lang="en-US" dirty="0" smtClean="0"/>
+              <a:t>Bullet 1</a:t>
+            </a:r>
+          </a:p>
+          <a:p>
+            <a:pPr lvl="3"/>
+            <a:r>
+              <a:rPr lang="en-US" dirty="0" smtClean="0"/>
+              <a:t>Bullet 2</a:t>
+            </a:r>
+          </a:p>
+          <a:p>
+            <a:pPr lvl="4"/>
+            <a:r>
+              <a:rPr lang="en-US" dirty="0" smtClean="0"/>
+              <a:t>Bullet 3</a:t>
+            </a:r>
+            <a:endParaRPr lang="en-US" dirty="0"/>
+          </a:p>
+        </p:txBody>
+      </p:sp>
+    </p:spTree>
+    <p:extLst>
+      <p:ext uri="{BB962C8B-B14F-4D97-AF65-F5344CB8AC3E}">
+        <p14:creationId xmlns:p14="http://schemas.microsoft.com/office/powerpoint/2010/main" val="136223336"/>
+      </p:ext>
+    </p:extLst>
+  </p:cSld>
+  <p:clrMapOvr>
+    <a:masterClrMapping/>
+  </p:clrMapOvr>
+</p:sld>
+</file>
+
+<file path=ppt/slides/slide7.xml><?xml version="1.0" encoding="utf-8"?>
+<p:sld xmlns:a="http://schemas.openxmlformats.org/drawingml/2006/main" xmlns:r="http://schemas.openxmlformats.org/officeDocument/2006/relationships" xmlns:p="http://schemas.openxmlformats.org/presentationml/2006/main">
+  <p:cSld>
+    <p:spTree>
+      <p:nvGrpSpPr>
+        <p:cNvPr id="1" name=""/>
+        <p:cNvGrpSpPr/>
+        <p:nvPr/>
+      </p:nvGrpSpPr>
+      <p:grpSpPr>
+        <a:xfrm>
+          <a:off x="0" y="0"/>
+          <a:ext cx="0" cy="0"/>
+          <a:chOff x="0" y="0"/>
+          <a:chExt cx="0" cy="0"/>
+        </a:xfrm>
+      </p:grpSpPr>
+      <p:sp>
+        <p:nvSpPr>
+          <p:cNvPr id="2" name="Title 1"/>
+          <p:cNvSpPr>
+            <a:spLocks noGrp="1"/>
+          </p:cNvSpPr>
+          <p:nvPr>
+            <p:ph type="title"/>
+          </p:nvPr>
+        </p:nvSpPr>
+        <p:spPr/>
+        <p:txBody>
+          <a:bodyPr>
+            <a:normAutofit fontScale="90000"/>
+          </a:bodyPr>
+          <a:lstStyle/>
+          <a:p>
+            <a:r>
+              <a:rPr lang="en-US" dirty="0" smtClean="0"/>
+              <a:t>Results</a:t>
+            </a:r>
+            <a:endParaRPr lang="en-US" dirty="0"/>
+          </a:p>
+        </p:txBody>
+      </p:sp>
+      <p:sp>
+        <p:nvSpPr>
+          <p:cNvPr id="3" name="Footer Placeholder 2"/>
+          <p:cNvSpPr>
+            <a:spLocks noGrp="1"/>
+          </p:cNvSpPr>
+          <p:nvPr>
+            <p:ph type="ftr" sz="quarter" idx="10"/>
+          </p:nvPr>
+        </p:nvSpPr>
+        <p:spPr/>
+        <p:txBody>
+          <a:bodyPr/>
+          <a:lstStyle/>
+          <a:p>
+            <a:r>
+              <a:rPr lang="en-US" smtClean="0"/>
+              <a:t>Presentation Title (Edit in File &gt; 'Page Setup')</a:t>
+            </a:r>
+            <a:endParaRPr lang="en-US" dirty="0"/>
+          </a:p>
+        </p:txBody>
+      </p:sp>
+      <p:sp>
+        <p:nvSpPr>
+          <p:cNvPr id="4" name="Text Placeholder 3"/>
+          <p:cNvSpPr>
+            <a:spLocks noGrp="1"/>
+          </p:cNvSpPr>
+          <p:nvPr>
+            <p:ph type="body" sz="quarter" idx="14"/>
+          </p:nvPr>
+        </p:nvSpPr>
+        <p:spPr/>
+        <p:txBody>
+          <a:bodyPr/>
+          <a:lstStyle/>
+          <a:p>
+            <a:r>
+              <a:rPr lang="en-US" dirty="0" smtClean="0"/>
+              <a:t>What do the shape characteristics at different radii say about large-scale structure formation?</a:t>
+            </a:r>
+            <a:endParaRPr lang="en-US" dirty="0" smtClean="0"/>
+          </a:p>
+          <a:p>
+            <a:pPr lvl="2"/>
+            <a:r>
+              <a:rPr lang="en-US" dirty="0" smtClean="0"/>
+              <a:t>Strongly influenced by large mergers (e.g. in </a:t>
+            </a:r>
+            <a:r>
+              <a:rPr lang="en-US" dirty="0" err="1" smtClean="0"/>
+              <a:t>nIFTy</a:t>
+            </a:r>
+            <a:r>
+              <a:rPr lang="en-US" dirty="0" smtClean="0"/>
+              <a:t> cluster picture)</a:t>
+            </a:r>
+            <a:endParaRPr lang="en-US" dirty="0" smtClean="0"/>
+          </a:p>
+          <a:p>
+            <a:pPr lvl="4"/>
+            <a:r>
+              <a:rPr lang="en-US" dirty="0" smtClean="0"/>
+              <a:t>Show picture of cluster with circle of radius at same point in dip of </a:t>
+            </a:r>
+            <a:r>
+              <a:rPr lang="en-US" dirty="0" err="1" smtClean="0"/>
+              <a:t>sphericity</a:t>
+            </a:r>
+            <a:r>
+              <a:rPr lang="en-US" dirty="0" smtClean="0"/>
+              <a:t>/</a:t>
+            </a:r>
+            <a:r>
+              <a:rPr lang="en-US" dirty="0" err="1" smtClean="0"/>
+              <a:t>ellipticity</a:t>
+            </a:r>
+            <a:r>
+              <a:rPr lang="en-US" dirty="0" smtClean="0"/>
+              <a:t> (whichever shows it the most)</a:t>
+            </a:r>
+          </a:p>
+          <a:p>
+            <a:pPr lvl="4"/>
+            <a:r>
+              <a:rPr lang="en-US" dirty="0" err="1" smtClean="0"/>
+              <a:t>Ellipticity</a:t>
+            </a:r>
+            <a:r>
+              <a:rPr lang="en-US" dirty="0" smtClean="0"/>
+              <a:t> plots with dip</a:t>
+            </a:r>
+          </a:p>
+        </p:txBody>
+      </p:sp>
+    </p:spTree>
+    <p:extLst>
+      <p:ext uri="{BB962C8B-B14F-4D97-AF65-F5344CB8AC3E}">
+        <p14:creationId xmlns:p14="http://schemas.microsoft.com/office/powerpoint/2010/main" val="2194668825"/>
+      </p:ext>
+    </p:extLst>
+  </p:cSld>
+  <p:clrMapOvr>
+    <a:masterClrMapping/>
+  </p:clrMapOvr>
+</p:sld>
+</file>
+
+<file path=ppt/slides/slide8.xml><?xml version="1.0" encoding="utf-8"?>
+<p:sld xmlns:a="http://schemas.openxmlformats.org/drawingml/2006/main" xmlns:r="http://schemas.openxmlformats.org/officeDocument/2006/relationships" xmlns:p="http://schemas.openxmlformats.org/presentationml/2006/main">
+  <p:cSld>
+    <p:spTree>
+      <p:nvGrpSpPr>
+        <p:cNvPr id="1" name=""/>
+        <p:cNvGrpSpPr/>
+        <p:nvPr/>
+      </p:nvGrpSpPr>
+      <p:grpSpPr>
+        <a:xfrm>
+          <a:off x="0" y="0"/>
+          <a:ext cx="0" cy="0"/>
+          <a:chOff x="0" y="0"/>
+          <a:chExt cx="0" cy="0"/>
+        </a:xfrm>
+      </p:grpSpPr>
+      <p:sp>
+        <p:nvSpPr>
+          <p:cNvPr id="2" name="Title 1"/>
+          <p:cNvSpPr>
+            <a:spLocks noGrp="1"/>
+          </p:cNvSpPr>
+          <p:nvPr>
+            <p:ph type="title"/>
+          </p:nvPr>
+        </p:nvSpPr>
+        <p:spPr/>
+        <p:txBody>
+          <a:bodyPr>
+            <a:normAutofit fontScale="90000"/>
+          </a:bodyPr>
+          <a:lstStyle/>
+          <a:p>
+            <a:r>
+              <a:rPr lang="en-US" dirty="0" smtClean="0"/>
+              <a:t>Extracting the Cosmic Web</a:t>
+            </a:r>
+            <a:endParaRPr lang="en-US" dirty="0"/>
+          </a:p>
+        </p:txBody>
+      </p:sp>
+      <p:sp>
+        <p:nvSpPr>
+          <p:cNvPr id="3" name="Footer Placeholder 2"/>
+          <p:cNvSpPr>
+            <a:spLocks noGrp="1"/>
+          </p:cNvSpPr>
+          <p:nvPr>
+            <p:ph type="ftr" sz="quarter" idx="10"/>
+          </p:nvPr>
+        </p:nvSpPr>
+        <p:spPr/>
+        <p:txBody>
+          <a:bodyPr/>
+          <a:lstStyle/>
+          <a:p>
+            <a:r>
+              <a:rPr lang="en-US" smtClean="0"/>
+              <a:t>Presentation Title (Edit in File &gt; 'Page Setup')</a:t>
+            </a:r>
+            <a:endParaRPr lang="en-US" dirty="0"/>
+          </a:p>
+        </p:txBody>
+      </p:sp>
+      <p:sp>
+        <p:nvSpPr>
+          <p:cNvPr id="4" name="Text Placeholder 3"/>
+          <p:cNvSpPr>
+            <a:spLocks noGrp="1"/>
+          </p:cNvSpPr>
+          <p:nvPr>
+            <p:ph type="body" sz="quarter" idx="14"/>
+          </p:nvPr>
+        </p:nvSpPr>
+        <p:spPr/>
+        <p:txBody>
+          <a:bodyPr/>
+          <a:lstStyle/>
+          <a:p>
+            <a:r>
+              <a:rPr lang="en-US" dirty="0" smtClean="0"/>
+              <a:t>Discrete Persistent Source Extractor (</a:t>
+            </a:r>
+            <a:r>
+              <a:rPr lang="en-US" dirty="0" err="1" smtClean="0"/>
+              <a:t>DisPerSe</a:t>
+            </a:r>
+            <a:r>
+              <a:rPr lang="en-US" dirty="0" smtClean="0"/>
+              <a:t>)</a:t>
+            </a:r>
+            <a:endParaRPr lang="en-US" dirty="0" smtClean="0"/>
+          </a:p>
+          <a:p>
+            <a:pPr lvl="1"/>
+            <a:r>
+              <a:rPr lang="en-US" dirty="0" smtClean="0"/>
+              <a:t>Text</a:t>
+            </a:r>
+          </a:p>
+          <a:p>
+            <a:pPr lvl="2"/>
+            <a:r>
+              <a:rPr lang="en-US" dirty="0" smtClean="0"/>
+              <a:t>Bullet 1</a:t>
+            </a:r>
+          </a:p>
+          <a:p>
+            <a:pPr lvl="3"/>
+            <a:r>
+              <a:rPr lang="en-US" dirty="0" smtClean="0"/>
+              <a:t>Bullet 2</a:t>
+            </a:r>
+          </a:p>
+          <a:p>
+            <a:pPr lvl="4"/>
+            <a:r>
+              <a:rPr lang="en-US" dirty="0" smtClean="0"/>
+              <a:t>Bullet 3</a:t>
+            </a:r>
+            <a:endParaRPr lang="en-US" dirty="0"/>
+          </a:p>
+        </p:txBody>
+      </p:sp>
+    </p:spTree>
+    <p:extLst>
+      <p:ext uri="{BB962C8B-B14F-4D97-AF65-F5344CB8AC3E}">
+        <p14:creationId xmlns:p14="http://schemas.microsoft.com/office/powerpoint/2010/main" val="3723072916"/>
+      </p:ext>
+    </p:extLst>
+  </p:cSld>
+  <p:clrMapOvr>
+    <a:masterClrMapping/>
+  </p:clrMapOvr>
+</p:sld>
+</file>
+
+<file path=ppt/slides/slide9.xml><?xml version="1.0" encoding="utf-8"?>
+<p:sld xmlns:a="http://schemas.openxmlformats.org/drawingml/2006/main" xmlns:r="http://schemas.openxmlformats.org/officeDocument/2006/relationships" xmlns:p="http://schemas.openxmlformats.org/presentationml/2006/main">
+  <p:cSld>
+    <p:spTree>
+      <p:nvGrpSpPr>
+        <p:cNvPr id="1" name=""/>
+        <p:cNvGrpSpPr/>
+        <p:nvPr/>
+      </p:nvGrpSpPr>
+      <p:grpSpPr>
+        <a:xfrm>
+          <a:off x="0" y="0"/>
+          <a:ext cx="0" cy="0"/>
+          <a:chOff x="0" y="0"/>
+          <a:chExt cx="0" cy="0"/>
+        </a:xfrm>
+      </p:grpSpPr>
+      <p:sp>
+        <p:nvSpPr>
+          <p:cNvPr id="2" name="Title 1"/>
+          <p:cNvSpPr>
+            <a:spLocks noGrp="1"/>
+          </p:cNvSpPr>
+          <p:nvPr>
+            <p:ph type="title"/>
+          </p:nvPr>
+        </p:nvSpPr>
+        <p:spPr/>
+        <p:txBody>
+          <a:bodyPr>
+            <a:normAutofit fontScale="90000"/>
+          </a:bodyPr>
+          <a:lstStyle/>
+          <a:p>
+            <a:r>
+              <a:rPr lang="en-US" dirty="0" smtClean="0"/>
+              <a:t>Defining Filament Structure</a:t>
+            </a:r>
+            <a:endParaRPr lang="en-US" dirty="0"/>
+          </a:p>
+        </p:txBody>
+      </p:sp>
+      <p:sp>
+        <p:nvSpPr>
+          <p:cNvPr id="3" name="Footer Placeholder 2"/>
+          <p:cNvSpPr>
+            <a:spLocks noGrp="1"/>
+          </p:cNvSpPr>
+          <p:nvPr>
+            <p:ph type="ftr" sz="quarter" idx="10"/>
+          </p:nvPr>
+        </p:nvSpPr>
+        <p:spPr/>
+        <p:txBody>
+          <a:bodyPr/>
+          <a:lstStyle/>
+          <a:p>
+            <a:r>
+              <a:rPr lang="en-US" smtClean="0"/>
+              <a:t>Presentation Title (Edit in File &gt; 'Page Setup')</a:t>
+            </a:r>
+            <a:endParaRPr lang="en-US" dirty="0"/>
+          </a:p>
+        </p:txBody>
+      </p:sp>
+      <p:sp>
+        <p:nvSpPr>
+          <p:cNvPr id="4" name="Text Placeholder 3"/>
+          <p:cNvSpPr>
+            <a:spLocks noGrp="1"/>
+          </p:cNvSpPr>
+          <p:nvPr>
+            <p:ph type="body" sz="quarter" idx="14"/>
+          </p:nvPr>
+        </p:nvSpPr>
+        <p:spPr/>
+        <p:txBody>
+          <a:bodyPr/>
+          <a:lstStyle/>
+          <a:p>
+            <a:r>
+              <a:rPr lang="en-US" dirty="0" smtClean="0"/>
+              <a:t>(Pictures of filament directions for different radii)</a:t>
+            </a:r>
+            <a:endParaRPr lang="en-US" dirty="0" smtClean="0"/>
+          </a:p>
+          <a:p>
+            <a:pPr lvl="1"/>
+            <a:r>
+              <a:rPr lang="en-US" dirty="0" smtClean="0"/>
+              <a:t>Text</a:t>
+            </a:r>
+          </a:p>
+          <a:p>
+            <a:pPr lvl="2"/>
+            <a:r>
+              <a:rPr lang="en-US" dirty="0" smtClean="0"/>
+              <a:t>Bullet 1</a:t>
+            </a:r>
+          </a:p>
+          <a:p>
+            <a:pPr lvl="3"/>
+            <a:r>
+              <a:rPr lang="en-US" dirty="0" smtClean="0"/>
+              <a:t>Bullet 2</a:t>
+            </a:r>
+          </a:p>
+          <a:p>
+            <a:pPr lvl="4"/>
+            <a:r>
+              <a:rPr lang="en-US" dirty="0" smtClean="0"/>
+              <a:t>Bullet 3</a:t>
+            </a:r>
+            <a:endParaRPr lang="en-US" dirty="0"/>
+          </a:p>
+        </p:txBody>
+      </p:sp>
+    </p:spTree>
+    <p:extLst>
+      <p:ext uri="{BB962C8B-B14F-4D97-AF65-F5344CB8AC3E}">
+        <p14:creationId xmlns:p14="http://schemas.microsoft.com/office/powerpoint/2010/main" val="3880460800"/>
       </p:ext>
     </p:extLst>
   </p:cSld>

</xml_diff>

<commit_message>
Changed page header, shortened intro (stellar halo etc) and fixed shape plots
</commit_message>
<xml_diff>
--- a/ICRAR-Black-Powerpoint.pptx
+++ b/ICRAR-Black-Powerpoint.pptx
@@ -5,25 +5,26 @@
     <p:sldMasterId id="2147483648" r:id="rId1"/>
   </p:sldMasterIdLst>
   <p:notesMasterIdLst>
-    <p:notesMasterId r:id="rId15"/>
+    <p:notesMasterId r:id="rId16"/>
   </p:notesMasterIdLst>
   <p:handoutMasterIdLst>
-    <p:handoutMasterId r:id="rId16"/>
+    <p:handoutMasterId r:id="rId17"/>
   </p:handoutMasterIdLst>
   <p:sldIdLst>
     <p:sldId id="256" r:id="rId2"/>
     <p:sldId id="257" r:id="rId3"/>
-    <p:sldId id="258" r:id="rId4"/>
-    <p:sldId id="265" r:id="rId5"/>
-    <p:sldId id="259" r:id="rId6"/>
-    <p:sldId id="262" r:id="rId7"/>
-    <p:sldId id="266" r:id="rId8"/>
-    <p:sldId id="260" r:id="rId9"/>
-    <p:sldId id="261" r:id="rId10"/>
-    <p:sldId id="263" r:id="rId11"/>
-    <p:sldId id="264" r:id="rId12"/>
-    <p:sldId id="267" r:id="rId13"/>
-    <p:sldId id="268" r:id="rId14"/>
+    <p:sldId id="269" r:id="rId4"/>
+    <p:sldId id="258" r:id="rId5"/>
+    <p:sldId id="265" r:id="rId6"/>
+    <p:sldId id="259" r:id="rId7"/>
+    <p:sldId id="262" r:id="rId8"/>
+    <p:sldId id="266" r:id="rId9"/>
+    <p:sldId id="260" r:id="rId10"/>
+    <p:sldId id="261" r:id="rId11"/>
+    <p:sldId id="263" r:id="rId12"/>
+    <p:sldId id="264" r:id="rId13"/>
+    <p:sldId id="267" r:id="rId14"/>
+    <p:sldId id="268" r:id="rId15"/>
   </p:sldIdLst>
   <p:sldSz cx="9144000" cy="6858000" type="screen4x3"/>
   <p:notesSz cx="6858000" cy="9144000"/>
@@ -207,7 +208,7 @@
           <a:p>
             <a:fld id="{CF40E7CB-B090-6140-958A-EAE3EFECA0AB}" type="datetimeFigureOut">
               <a:rPr lang="en-US" smtClean="0"/>
-              <a:t>7/02/17</a:t>
+              <a:t>13/02/17</a:t>
             </a:fld>
             <a:endParaRPr lang="en-US"/>
           </a:p>
@@ -373,7 +374,7 @@
           <a:p>
             <a:fld id="{CC8FA2BA-21CB-AC41-BDFF-8AF1F2C23B5F}" type="datetimeFigureOut">
               <a:rPr lang="en-US" smtClean="0"/>
-              <a:t>7/02/17</a:t>
+              <a:t>13/02/17</a:t>
             </a:fld>
             <a:endParaRPr lang="en-US"/>
           </a:p>
@@ -2305,12 +2306,22 @@
         </p:nvSpPr>
         <p:spPr/>
         <p:txBody>
-          <a:bodyPr/>
-          <a:lstStyle/>
-          <a:p>
-            <a:r>
-              <a:rPr lang="en-US" dirty="0" smtClean="0"/>
-              <a:t>Alignment of Stellar Halos with Filaments of the Cosmic Web</a:t>
+          <a:bodyPr>
+            <a:normAutofit fontScale="90000"/>
+          </a:bodyPr>
+          <a:lstStyle/>
+          <a:p>
+            <a:r>
+              <a:rPr lang="en-US" dirty="0" smtClean="0"/>
+              <a:t>Alignment of the stellar halo of the </a:t>
+            </a:r>
+            <a:r>
+              <a:rPr lang="en-US" dirty="0" err="1" smtClean="0"/>
+              <a:t>nIFTy</a:t>
+            </a:r>
+            <a:r>
+              <a:rPr lang="en-US" dirty="0" smtClean="0"/>
+              <a:t> cluster with cosmic web filaments</a:t>
             </a:r>
             <a:endParaRPr lang="en-US" dirty="0"/>
           </a:p>
@@ -2401,12 +2412,8 @@
           <a:lstStyle/>
           <a:p>
             <a:r>
-              <a:rPr lang="en-US" dirty="0" err="1" smtClean="0"/>
-              <a:t>Examing</a:t>
-            </a:r>
-            <a:r>
-              <a:rPr lang="en-US" dirty="0" smtClean="0"/>
-              <a:t> Correlations</a:t>
+              <a:rPr lang="en-US" dirty="0" smtClean="0"/>
+              <a:t>Defining Filament Structure</a:t>
             </a:r>
             <a:endParaRPr lang="en-US" dirty="0"/>
           </a:p>
@@ -2428,7 +2435,7 @@
           <a:lstStyle/>
           <a:p>
             <a:r>
-              <a:rPr lang="en-US" dirty="0" smtClean="0"/>
+              <a:rPr lang="en-US" smtClean="0"/>
               <a:t>Presentation Title (Edit in File &gt; 'Page Setup')</a:t>
             </a:r>
             <a:endParaRPr lang="en-US" dirty="0"/>
@@ -2452,17 +2459,15 @@
           <a:p>
             <a:r>
               <a:rPr lang="en-US" dirty="0" smtClean="0"/>
-              <a:t>Plotting angle between the major axis of the halo and the filament</a:t>
-            </a:r>
-            <a:endParaRPr lang="en-US" dirty="0" smtClean="0"/>
+              <a:t>(Pictures of filament directions for different radii)</a:t>
+            </a:r>
           </a:p>
           <a:p>
             <a:pPr lvl="1"/>
             <a:r>
               <a:rPr lang="en-US" dirty="0" smtClean="0"/>
-              <a:t>What about the other axes? Did we plot these?</a:t>
-            </a:r>
-            <a:endParaRPr lang="en-US" dirty="0" smtClean="0"/>
+              <a:t>Text</a:t>
+            </a:r>
           </a:p>
           <a:p>
             <a:pPr lvl="2"/>
@@ -2491,7 +2496,7 @@
     </p:spTree>
     <p:extLst>
       <p:ext uri="{BB962C8B-B14F-4D97-AF65-F5344CB8AC3E}">
-        <p14:creationId xmlns:p14="http://schemas.microsoft.com/office/powerpoint/2010/main" val="136223336"/>
+        <p14:creationId xmlns:p14="http://schemas.microsoft.com/office/powerpoint/2010/main" val="3880460800"/>
       </p:ext>
     </p:extLst>
   </p:cSld>
@@ -2536,8 +2541,12 @@
           <a:lstStyle/>
           <a:p>
             <a:r>
-              <a:rPr lang="en-US" dirty="0" smtClean="0"/>
-              <a:t>Results?</a:t>
+              <a:rPr lang="en-US" dirty="0" err="1" smtClean="0"/>
+              <a:t>Examing</a:t>
+            </a:r>
+            <a:r>
+              <a:rPr lang="en-US" dirty="0" smtClean="0"/>
+              <a:t> Correlations</a:t>
             </a:r>
             <a:endParaRPr lang="en-US" dirty="0"/>
           </a:p>
@@ -2583,16 +2592,15 @@
           <a:p>
             <a:r>
               <a:rPr lang="en-US" dirty="0" smtClean="0"/>
-              <a:t>What did this say about large-scale structure formation?</a:t>
+              <a:t>Plotting angle between the major axis of the halo and the filament</a:t>
             </a:r>
           </a:p>
           <a:p>
             <a:pPr lvl="1"/>
             <a:r>
               <a:rPr lang="en-US" dirty="0" smtClean="0"/>
-              <a:t>On the level of this single cluster</a:t>
-            </a:r>
-            <a:endParaRPr lang="en-US" dirty="0" smtClean="0"/>
+              <a:t>What about the other axes? Did we plot these?</a:t>
+            </a:r>
           </a:p>
           <a:p>
             <a:pPr lvl="2"/>
@@ -2621,7 +2629,7 @@
     </p:spTree>
     <p:extLst>
       <p:ext uri="{BB962C8B-B14F-4D97-AF65-F5344CB8AC3E}">
-        <p14:creationId xmlns:p14="http://schemas.microsoft.com/office/powerpoint/2010/main" val="346904941"/>
+        <p14:creationId xmlns:p14="http://schemas.microsoft.com/office/powerpoint/2010/main" val="136223336"/>
       </p:ext>
     </p:extLst>
   </p:cSld>
@@ -2720,9 +2728,8 @@
             <a:pPr lvl="1"/>
             <a:r>
               <a:rPr lang="en-US" dirty="0" smtClean="0"/>
-              <a:t>What could we expect to see in a larger simulation data set (such as Horizon-AGN)?</a:t>
-            </a:r>
-            <a:endParaRPr lang="en-US" dirty="0" smtClean="0"/>
+              <a:t>On the level of this single cluster</a:t>
+            </a:r>
           </a:p>
           <a:p>
             <a:pPr lvl="2"/>
@@ -2751,7 +2758,7 @@
     </p:spTree>
     <p:extLst>
       <p:ext uri="{BB962C8B-B14F-4D97-AF65-F5344CB8AC3E}">
-        <p14:creationId xmlns:p14="http://schemas.microsoft.com/office/powerpoint/2010/main" val="2013433585"/>
+        <p14:creationId xmlns:p14="http://schemas.microsoft.com/office/powerpoint/2010/main" val="346904941"/>
       </p:ext>
     </p:extLst>
   </p:cSld>
@@ -2797,6 +2804,135 @@
           <a:p>
             <a:r>
               <a:rPr lang="en-US" dirty="0" smtClean="0"/>
+              <a:t>Results?</a:t>
+            </a:r>
+            <a:endParaRPr lang="en-US" dirty="0"/>
+          </a:p>
+        </p:txBody>
+      </p:sp>
+      <p:sp>
+        <p:nvSpPr>
+          <p:cNvPr id="3" name="Footer Placeholder 2"/>
+          <p:cNvSpPr>
+            <a:spLocks noGrp="1"/>
+          </p:cNvSpPr>
+          <p:nvPr>
+            <p:ph type="ftr" sz="quarter" idx="10"/>
+          </p:nvPr>
+        </p:nvSpPr>
+        <p:spPr/>
+        <p:txBody>
+          <a:bodyPr/>
+          <a:lstStyle/>
+          <a:p>
+            <a:r>
+              <a:rPr lang="en-US" dirty="0" smtClean="0"/>
+              <a:t>Presentation Title (Edit in File &gt; 'Page Setup')</a:t>
+            </a:r>
+            <a:endParaRPr lang="en-US" dirty="0"/>
+          </a:p>
+        </p:txBody>
+      </p:sp>
+      <p:sp>
+        <p:nvSpPr>
+          <p:cNvPr id="4" name="Text Placeholder 3"/>
+          <p:cNvSpPr>
+            <a:spLocks noGrp="1"/>
+          </p:cNvSpPr>
+          <p:nvPr>
+            <p:ph type="body" sz="quarter" idx="14"/>
+          </p:nvPr>
+        </p:nvSpPr>
+        <p:spPr/>
+        <p:txBody>
+          <a:bodyPr/>
+          <a:lstStyle/>
+          <a:p>
+            <a:r>
+              <a:rPr lang="en-US" dirty="0" smtClean="0"/>
+              <a:t>What did this say about large-scale structure formation?</a:t>
+            </a:r>
+          </a:p>
+          <a:p>
+            <a:pPr lvl="1"/>
+            <a:r>
+              <a:rPr lang="en-US" dirty="0" smtClean="0"/>
+              <a:t>What could we expect to see in a larger simulation data set (such as Horizon-AGN)?</a:t>
+            </a:r>
+          </a:p>
+          <a:p>
+            <a:pPr lvl="2"/>
+            <a:r>
+              <a:rPr lang="en-US" dirty="0" smtClean="0"/>
+              <a:t>Bullet 1</a:t>
+            </a:r>
+          </a:p>
+          <a:p>
+            <a:pPr lvl="3"/>
+            <a:r>
+              <a:rPr lang="en-US" dirty="0" smtClean="0"/>
+              <a:t>Bullet 2</a:t>
+            </a:r>
+          </a:p>
+          <a:p>
+            <a:pPr lvl="4"/>
+            <a:r>
+              <a:rPr lang="en-US" dirty="0" smtClean="0"/>
+              <a:t>Bullet 3</a:t>
+            </a:r>
+            <a:endParaRPr lang="en-US" dirty="0"/>
+          </a:p>
+        </p:txBody>
+      </p:sp>
+    </p:spTree>
+    <p:extLst>
+      <p:ext uri="{BB962C8B-B14F-4D97-AF65-F5344CB8AC3E}">
+        <p14:creationId xmlns:p14="http://schemas.microsoft.com/office/powerpoint/2010/main" val="2013433585"/>
+      </p:ext>
+    </p:extLst>
+  </p:cSld>
+  <p:clrMapOvr>
+    <a:masterClrMapping/>
+  </p:clrMapOvr>
+</p:sld>
+</file>
+
+<file path=ppt/slides/slide14.xml><?xml version="1.0" encoding="utf-8"?>
+<p:sld xmlns:a="http://schemas.openxmlformats.org/drawingml/2006/main" xmlns:r="http://schemas.openxmlformats.org/officeDocument/2006/relationships" xmlns:p="http://schemas.openxmlformats.org/presentationml/2006/main">
+  <p:cSld>
+    <p:spTree>
+      <p:nvGrpSpPr>
+        <p:cNvPr id="1" name=""/>
+        <p:cNvGrpSpPr/>
+        <p:nvPr/>
+      </p:nvGrpSpPr>
+      <p:grpSpPr>
+        <a:xfrm>
+          <a:off x="0" y="0"/>
+          <a:ext cx="0" cy="0"/>
+          <a:chOff x="0" y="0"/>
+          <a:chExt cx="0" cy="0"/>
+        </a:xfrm>
+      </p:grpSpPr>
+      <p:sp>
+        <p:nvSpPr>
+          <p:cNvPr id="2" name="Title 1"/>
+          <p:cNvSpPr>
+            <a:spLocks noGrp="1"/>
+          </p:cNvSpPr>
+          <p:nvPr>
+            <p:ph type="title"/>
+          </p:nvPr>
+        </p:nvSpPr>
+        <p:spPr/>
+        <p:txBody>
+          <a:bodyPr>
+            <a:normAutofit fontScale="90000"/>
+          </a:bodyPr>
+          <a:lstStyle/>
+          <a:p>
+            <a:r>
+              <a:rPr lang="en-US" dirty="0" smtClean="0"/>
               <a:t>Acknowledgments</a:t>
             </a:r>
             <a:endParaRPr lang="en-US" dirty="0"/>
@@ -2883,7 +3019,6 @@
               <a:rPr lang="en-US" dirty="0" smtClean="0"/>
               <a:t> Supercomputing Centre</a:t>
             </a:r>
-            <a:endParaRPr lang="en-US" dirty="0" smtClean="0"/>
           </a:p>
           <a:p>
             <a:pPr lvl="1"/>
@@ -2891,7 +3026,6 @@
               <a:rPr lang="en-US" dirty="0" smtClean="0"/>
               <a:t>Text</a:t>
             </a:r>
-            <a:endParaRPr lang="en-US" dirty="0" smtClean="0"/>
           </a:p>
           <a:p>
             <a:pPr lvl="2"/>
@@ -3012,38 +3146,48 @@
           <a:p>
             <a:r>
               <a:rPr lang="en-US" dirty="0" smtClean="0"/>
-              <a:t>Why look at cosmic web alignment?</a:t>
-            </a:r>
+              <a:t>Why look at </a:t>
+            </a:r>
+            <a:r>
+              <a:rPr lang="en-US" dirty="0" smtClean="0"/>
+              <a:t>large-scale structure alignment?</a:t>
+            </a:r>
+          </a:p>
+          <a:p>
             <a:endParaRPr lang="en-US" dirty="0" smtClean="0"/>
           </a:p>
           <a:p>
-            <a:pPr lvl="1"/>
-            <a:r>
-              <a:rPr lang="en-US" dirty="0" smtClean="0"/>
-              <a:t>Text</a:t>
-            </a:r>
-          </a:p>
-          <a:p>
             <a:pPr lvl="2"/>
             <a:r>
               <a:rPr lang="en-US" dirty="0" smtClean="0"/>
-              <a:t>Bullet 1</a:t>
+              <a:t>Provides insight into galax</a:t>
+            </a:r>
+            <a:r>
+              <a:rPr lang="en-US" dirty="0" smtClean="0"/>
+              <a:t>y formation processes</a:t>
+            </a:r>
+          </a:p>
+          <a:p>
+            <a:pPr lvl="2"/>
+            <a:r>
+              <a:rPr lang="en-US" dirty="0" smtClean="0"/>
+              <a:t>Simulations can predict mass distributions and much more, but what we are capable of observing is galaxies</a:t>
             </a:r>
           </a:p>
           <a:p>
             <a:pPr lvl="3"/>
             <a:r>
               <a:rPr lang="en-US" dirty="0" smtClean="0"/>
-              <a:t>Bullet 2</a:t>
-            </a:r>
-          </a:p>
-          <a:p>
-            <a:pPr lvl="4"/>
-            <a:r>
-              <a:rPr lang="en-US" dirty="0" smtClean="0"/>
-              <a:t>Bullet 3</a:t>
-            </a:r>
-            <a:endParaRPr lang="en-US" dirty="0"/>
+              <a:t>Therefore need to model galaxy formation accurately!</a:t>
+            </a:r>
+          </a:p>
+          <a:p>
+            <a:pPr lvl="3"/>
+            <a:r>
+              <a:rPr lang="en-US" dirty="0" smtClean="0"/>
+              <a:t>At the moment, this is done with low resolution as it is computationally expensive to model baryonic physics in comparison to dark matter</a:t>
+            </a:r>
+            <a:endParaRPr lang="en-US" dirty="0" smtClean="0"/>
           </a:p>
         </p:txBody>
       </p:sp>
@@ -3087,7 +3231,12 @@
             <p:ph type="title"/>
           </p:nvPr>
         </p:nvSpPr>
-        <p:spPr/>
+        <p:spPr>
+          <a:xfrm>
+            <a:off x="540355" y="1596645"/>
+            <a:ext cx="7670800" cy="3861149"/>
+          </a:xfrm>
+        </p:spPr>
         <p:txBody>
           <a:bodyPr>
             <a:normAutofit fontScale="90000"/>
@@ -3096,7 +3245,7 @@
           <a:p>
             <a:r>
               <a:rPr lang="en-US" dirty="0" smtClean="0"/>
-              <a:t>Why Stellar Halos?</a:t>
+              <a:t>If there is clear alignment between stellar halo and dark matter halo or surrounding large-scale structure (filament), could be used as an indicator of galaxy distributions (without as much computation)</a:t>
             </a:r>
             <a:endParaRPr lang="en-US" dirty="0"/>
           </a:p>
@@ -3119,59 +3268,7 @@
           <a:p>
             <a:r>
               <a:rPr lang="en-US" smtClean="0"/>
-              <a:t>Presentation Title (Edit in File &gt; 'Page Setup')</a:t>
-            </a:r>
-            <a:endParaRPr lang="en-US" dirty="0"/>
-          </a:p>
-        </p:txBody>
-      </p:sp>
-      <p:sp>
-        <p:nvSpPr>
-          <p:cNvPr id="4" name="Text Placeholder 3"/>
-          <p:cNvSpPr>
-            <a:spLocks noGrp="1"/>
-          </p:cNvSpPr>
-          <p:nvPr>
-            <p:ph type="body" sz="quarter" idx="14"/>
-          </p:nvPr>
-        </p:nvSpPr>
-        <p:spPr/>
-        <p:txBody>
-          <a:bodyPr/>
-          <a:lstStyle/>
-          <a:p>
-            <a:r>
-              <a:rPr lang="en-US" dirty="0" smtClean="0"/>
-              <a:t>In previous research, stellar halo is filtered out (e.g. to look at galaxies or DM only)</a:t>
-            </a:r>
-            <a:endParaRPr lang="en-US" dirty="0" smtClean="0"/>
-          </a:p>
-          <a:p>
-            <a:pPr lvl="1"/>
-            <a:r>
-              <a:rPr lang="en-US" dirty="0" smtClean="0"/>
-              <a:t>Text</a:t>
-            </a:r>
-          </a:p>
-          <a:p>
-            <a:pPr lvl="2"/>
-            <a:r>
-              <a:rPr lang="en-US" dirty="0" smtClean="0"/>
-              <a:t>Bullet 1</a:t>
-            </a:r>
-          </a:p>
-          <a:p>
-            <a:pPr lvl="3"/>
-            <a:r>
-              <a:rPr lang="en-US" dirty="0" smtClean="0"/>
-              <a:t>Bullet 2</a:t>
-            </a:r>
-          </a:p>
-          <a:p>
-            <a:pPr lvl="4"/>
-            <a:r>
-              <a:rPr lang="en-US" dirty="0" smtClean="0"/>
-              <a:t>Bullet 3</a:t>
+              <a:t>Presentation Title (Edit in File &gt; 'Page Setup' &gt; ‘Header/footer’)</a:t>
             </a:r>
             <a:endParaRPr lang="en-US" dirty="0"/>
           </a:p>
@@ -3180,7 +3277,7 @@
     </p:spTree>
     <p:extLst>
       <p:ext uri="{BB962C8B-B14F-4D97-AF65-F5344CB8AC3E}">
-        <p14:creationId xmlns:p14="http://schemas.microsoft.com/office/powerpoint/2010/main" val="3723072916"/>
+        <p14:creationId xmlns:p14="http://schemas.microsoft.com/office/powerpoint/2010/main" val="3115040940"/>
       </p:ext>
     </p:extLst>
   </p:cSld>
@@ -3225,12 +3322,8 @@
           <a:lstStyle/>
           <a:p>
             <a:r>
-              <a:rPr lang="en-US" dirty="0" err="1" smtClean="0"/>
-              <a:t>nIFTy</a:t>
-            </a:r>
-            <a:r>
-              <a:rPr lang="en-US" dirty="0" smtClean="0"/>
-              <a:t> Cluster</a:t>
+              <a:rPr lang="en-US" dirty="0" smtClean="0"/>
+              <a:t>Why Stellar Halos?</a:t>
             </a:r>
             <a:endParaRPr lang="en-US" dirty="0"/>
           </a:p>
@@ -3276,32 +3369,24 @@
           <a:p>
             <a:r>
               <a:rPr lang="en-US" dirty="0" smtClean="0"/>
-              <a:t>Why the </a:t>
-            </a:r>
-            <a:r>
-              <a:rPr lang="en-US" dirty="0" err="1" smtClean="0"/>
-              <a:t>nIFTy</a:t>
-            </a:r>
-            <a:r>
-              <a:rPr lang="en-US" dirty="0" smtClean="0"/>
-              <a:t> cluster?</a:t>
+              <a:t>In previous research, stellar halo is filtered out (e.g. to look at galaxies or DM only</a:t>
+            </a:r>
+            <a:r>
+              <a:rPr lang="en-US" dirty="0" smtClean="0"/>
+              <a:t>)</a:t>
+            </a:r>
+          </a:p>
+          <a:p>
+            <a:pPr lvl="2"/>
+            <a:endParaRPr lang="en-US" dirty="0"/>
+          </a:p>
+          <a:p>
+            <a:pPr lvl="2"/>
+            <a:r>
+              <a:rPr lang="en-US" dirty="0" smtClean="0"/>
+              <a:t>The stellar halo likely holds remnants of merger events etc. that have been significant in galaxy formation</a:t>
             </a:r>
             <a:endParaRPr lang="en-US" dirty="0" smtClean="0"/>
-          </a:p>
-          <a:p>
-            <a:pPr lvl="2"/>
-            <a:r>
-              <a:rPr lang="en-US" dirty="0" smtClean="0"/>
-              <a:t>Relationship to Horizon-AGN simulation (initial goal)</a:t>
-            </a:r>
-            <a:endParaRPr lang="en-US" dirty="0" smtClean="0"/>
-          </a:p>
-          <a:p>
-            <a:pPr lvl="3"/>
-            <a:r>
-              <a:rPr lang="en-US" dirty="0" smtClean="0"/>
-              <a:t>Bullet 2</a:t>
-            </a:r>
           </a:p>
           <a:p>
             <a:pPr lvl="4"/>
@@ -3316,7 +3401,7 @@
     </p:spTree>
     <p:extLst>
       <p:ext uri="{BB962C8B-B14F-4D97-AF65-F5344CB8AC3E}">
-        <p14:creationId xmlns:p14="http://schemas.microsoft.com/office/powerpoint/2010/main" val="2194668825"/>
+        <p14:creationId xmlns:p14="http://schemas.microsoft.com/office/powerpoint/2010/main" val="3723072916"/>
       </p:ext>
     </p:extLst>
   </p:cSld>
@@ -3361,8 +3446,12 @@
           <a:lstStyle/>
           <a:p>
             <a:r>
-              <a:rPr lang="en-US" dirty="0" smtClean="0"/>
-              <a:t>Halo Shape Properties</a:t>
+              <a:rPr lang="en-US" dirty="0" err="1" smtClean="0"/>
+              <a:t>nIFTy</a:t>
+            </a:r>
+            <a:r>
+              <a:rPr lang="en-US" dirty="0" smtClean="0"/>
+              <a:t> Cluster</a:t>
             </a:r>
             <a:endParaRPr lang="en-US" dirty="0"/>
           </a:p>
@@ -3384,7 +3473,7 @@
           <a:lstStyle/>
           <a:p>
             <a:r>
-              <a:rPr lang="en-US" dirty="0" smtClean="0"/>
+              <a:rPr lang="en-US" smtClean="0"/>
               <a:t>Presentation Title (Edit in File &gt; 'Page Setup')</a:t>
             </a:r>
             <a:endParaRPr lang="en-US" dirty="0"/>
@@ -3408,22 +3497,22 @@
           <a:p>
             <a:r>
               <a:rPr lang="en-US" dirty="0" smtClean="0"/>
-              <a:t>Reduced moment of inertia tensor</a:t>
-            </a:r>
-            <a:endParaRPr lang="en-US" dirty="0" smtClean="0"/>
-          </a:p>
-          <a:p>
-            <a:pPr lvl="1"/>
-            <a:r>
-              <a:rPr lang="en-US" dirty="0" smtClean="0"/>
-              <a:t>Text</a:t>
+              <a:t>Why the </a:t>
+            </a:r>
+            <a:r>
+              <a:rPr lang="en-US" dirty="0" err="1" smtClean="0"/>
+              <a:t>nIFTy</a:t>
+            </a:r>
+            <a:r>
+              <a:rPr lang="en-US" dirty="0" smtClean="0"/>
+              <a:t> cluster?</a:t>
             </a:r>
           </a:p>
           <a:p>
             <a:pPr lvl="2"/>
             <a:r>
               <a:rPr lang="en-US" dirty="0" smtClean="0"/>
-              <a:t>Bullet 1</a:t>
+              <a:t>Relationship to Horizon-AGN simulation (initial goal)</a:t>
             </a:r>
           </a:p>
           <a:p>
@@ -3446,7 +3535,7 @@
     </p:spTree>
     <p:extLst>
       <p:ext uri="{BB962C8B-B14F-4D97-AF65-F5344CB8AC3E}">
-        <p14:creationId xmlns:p14="http://schemas.microsoft.com/office/powerpoint/2010/main" val="3723072916"/>
+        <p14:creationId xmlns:p14="http://schemas.microsoft.com/office/powerpoint/2010/main" val="2194668825"/>
       </p:ext>
     </p:extLst>
   </p:cSld>
@@ -3537,34 +3626,16 @@
           <a:lstStyle/>
           <a:p>
             <a:r>
-              <a:rPr lang="en-US" dirty="0" err="1" smtClean="0"/>
-              <a:t>Sphericity</a:t>
-            </a:r>
-            <a:r>
-              <a:rPr lang="en-US" dirty="0" smtClean="0"/>
-              <a:t>, </a:t>
-            </a:r>
-            <a:r>
-              <a:rPr lang="en-US" dirty="0" err="1" smtClean="0"/>
-              <a:t>Triaxiality</a:t>
-            </a:r>
-            <a:r>
-              <a:rPr lang="en-US" dirty="0" smtClean="0"/>
-              <a:t> and </a:t>
-            </a:r>
-            <a:r>
-              <a:rPr lang="en-US" dirty="0" err="1" smtClean="0"/>
-              <a:t>Ellipticity</a:t>
-            </a:r>
-            <a:endParaRPr lang="en-US" dirty="0" smtClean="0"/>
+              <a:rPr lang="en-US" dirty="0" smtClean="0"/>
+              <a:t>Reduced moment of inertia tensor</a:t>
+            </a:r>
           </a:p>
           <a:p>
             <a:pPr lvl="1"/>
             <a:r>
               <a:rPr lang="en-US" dirty="0" smtClean="0"/>
-              <a:t>Differences between these properties?</a:t>
-            </a:r>
-            <a:endParaRPr lang="en-US" dirty="0" smtClean="0"/>
+              <a:t>Text</a:t>
+            </a:r>
           </a:p>
           <a:p>
             <a:pPr lvl="2"/>
@@ -3593,7 +3664,7 @@
     </p:spTree>
     <p:extLst>
       <p:ext uri="{BB962C8B-B14F-4D97-AF65-F5344CB8AC3E}">
-        <p14:creationId xmlns:p14="http://schemas.microsoft.com/office/powerpoint/2010/main" val="136223336"/>
+        <p14:creationId xmlns:p14="http://schemas.microsoft.com/office/powerpoint/2010/main" val="3723072916"/>
       </p:ext>
     </p:extLst>
   </p:cSld>
@@ -3639,7 +3710,7 @@
           <a:p>
             <a:r>
               <a:rPr lang="en-US" dirty="0" smtClean="0"/>
-              <a:t>Results</a:t>
+              <a:t>Halo Shape Properties</a:t>
             </a:r>
             <a:endParaRPr lang="en-US" dirty="0"/>
           </a:p>
@@ -3661,7 +3732,7 @@
           <a:lstStyle/>
           <a:p>
             <a:r>
-              <a:rPr lang="en-US" smtClean="0"/>
+              <a:rPr lang="en-US" dirty="0" smtClean="0"/>
               <a:t>Presentation Title (Edit in File &gt; 'Page Setup')</a:t>
             </a:r>
             <a:endParaRPr lang="en-US" dirty="0"/>
@@ -3684,67 +3755,62 @@
           <a:lstStyle/>
           <a:p>
             <a:r>
-              <a:rPr lang="en-US" dirty="0" smtClean="0"/>
-              <a:t>What do the shape characteristics at different radii say about large-scale structure formation?</a:t>
-            </a:r>
-            <a:endParaRPr lang="en-US" dirty="0" smtClean="0"/>
-          </a:p>
-          <a:p>
-            <a:pPr lvl="2"/>
-            <a:r>
-              <a:rPr lang="en-US" dirty="0" smtClean="0"/>
-              <a:t>Strongly influenced by large mergers (e.g. in </a:t>
-            </a:r>
-            <a:r>
               <a:rPr lang="en-US" dirty="0" err="1" smtClean="0"/>
-              <a:t>nIFTy</a:t>
-            </a:r>
-            <a:r>
-              <a:rPr lang="en-US" dirty="0" smtClean="0"/>
-              <a:t> cluster picture)</a:t>
-            </a:r>
-            <a:endParaRPr lang="en-US" dirty="0" smtClean="0"/>
-          </a:p>
-          <a:p>
-            <a:pPr lvl="4"/>
-            <a:r>
-              <a:rPr lang="en-US" dirty="0" smtClean="0"/>
-              <a:t>Show picture of cluster with circle of radius at same point in dip of </a:t>
+              <a:t>Sphericity</a:t>
+            </a:r>
+            <a:r>
+              <a:rPr lang="en-US" dirty="0" smtClean="0"/>
+              <a:t>, </a:t>
             </a:r>
             <a:r>
               <a:rPr lang="en-US" dirty="0" err="1" smtClean="0"/>
-              <a:t>sphericity</a:t>
-            </a:r>
-            <a:r>
-              <a:rPr lang="en-US" dirty="0" smtClean="0"/>
-              <a:t>/</a:t>
-            </a:r>
-            <a:r>
-              <a:rPr lang="en-US" dirty="0" err="1" smtClean="0"/>
-              <a:t>ellipticity</a:t>
-            </a:r>
-            <a:r>
-              <a:rPr lang="en-US" dirty="0" smtClean="0"/>
-              <a:t> (whichever shows it the most)</a:t>
-            </a:r>
-          </a:p>
-          <a:p>
-            <a:pPr lvl="4"/>
+              <a:t>Triaxiality</a:t>
+            </a:r>
+            <a:r>
+              <a:rPr lang="en-US" dirty="0" smtClean="0"/>
+              <a:t> and </a:t>
+            </a:r>
             <a:r>
               <a:rPr lang="en-US" dirty="0" err="1" smtClean="0"/>
               <a:t>Ellipticity</a:t>
             </a:r>
-            <a:r>
-              <a:rPr lang="en-US" dirty="0" smtClean="0"/>
-              <a:t> plots with dip</a:t>
-            </a:r>
+            <a:endParaRPr lang="en-US" dirty="0" smtClean="0"/>
+          </a:p>
+          <a:p>
+            <a:pPr lvl="1"/>
+            <a:r>
+              <a:rPr lang="en-US" dirty="0" smtClean="0"/>
+              <a:t>Differences between these properties?</a:t>
+            </a:r>
+          </a:p>
+          <a:p>
+            <a:pPr lvl="2"/>
+            <a:r>
+              <a:rPr lang="en-US" dirty="0" smtClean="0"/>
+              <a:t>Bullet 1</a:t>
+            </a:r>
+          </a:p>
+          <a:p>
+            <a:pPr lvl="3"/>
+            <a:r>
+              <a:rPr lang="en-US" dirty="0" smtClean="0"/>
+              <a:t>Bullet 2</a:t>
+            </a:r>
+          </a:p>
+          <a:p>
+            <a:pPr lvl="4"/>
+            <a:r>
+              <a:rPr lang="en-US" dirty="0" smtClean="0"/>
+              <a:t>Bullet 3</a:t>
+            </a:r>
+            <a:endParaRPr lang="en-US" dirty="0"/>
           </a:p>
         </p:txBody>
       </p:sp>
     </p:spTree>
     <p:extLst>
       <p:ext uri="{BB962C8B-B14F-4D97-AF65-F5344CB8AC3E}">
-        <p14:creationId xmlns:p14="http://schemas.microsoft.com/office/powerpoint/2010/main" val="2194668825"/>
+        <p14:creationId xmlns:p14="http://schemas.microsoft.com/office/powerpoint/2010/main" val="136223336"/>
       </p:ext>
     </p:extLst>
   </p:cSld>
@@ -3790,7 +3856,7 @@
           <a:p>
             <a:r>
               <a:rPr lang="en-US" dirty="0" smtClean="0"/>
-              <a:t>Extracting the Cosmic Web</a:t>
+              <a:t>Results</a:t>
             </a:r>
             <a:endParaRPr lang="en-US" dirty="0"/>
           </a:p>
@@ -3836,53 +3902,64 @@
           <a:p>
             <a:r>
               <a:rPr lang="en-US" dirty="0" smtClean="0"/>
-              <a:t>Discrete Persistent Source Extractor (</a:t>
+              <a:t>What do the shape characteristics at different radii say about large-scale structure formation?</a:t>
+            </a:r>
+          </a:p>
+          <a:p>
+            <a:pPr lvl="2"/>
+            <a:r>
+              <a:rPr lang="en-US" dirty="0" smtClean="0"/>
+              <a:t>Strongly influenced by large mergers (e.g. in </a:t>
             </a:r>
             <a:r>
               <a:rPr lang="en-US" dirty="0" err="1" smtClean="0"/>
-              <a:t>DisPerSe</a:t>
-            </a:r>
-            <a:r>
-              <a:rPr lang="en-US" dirty="0" smtClean="0"/>
-              <a:t>)</a:t>
-            </a:r>
-            <a:endParaRPr lang="en-US" dirty="0" smtClean="0"/>
-          </a:p>
-          <a:p>
-            <a:pPr lvl="1"/>
-            <a:r>
-              <a:rPr lang="en-US" dirty="0" smtClean="0"/>
-              <a:t>Text</a:t>
-            </a:r>
-          </a:p>
-          <a:p>
-            <a:pPr lvl="2"/>
-            <a:r>
-              <a:rPr lang="en-US" dirty="0" smtClean="0"/>
-              <a:t>Bullet 1</a:t>
-            </a:r>
-          </a:p>
-          <a:p>
-            <a:pPr lvl="3"/>
-            <a:r>
-              <a:rPr lang="en-US" dirty="0" smtClean="0"/>
-              <a:t>Bullet 2</a:t>
+              <a:t>nIFTy</a:t>
+            </a:r>
+            <a:r>
+              <a:rPr lang="en-US" dirty="0" smtClean="0"/>
+              <a:t> cluster picture)</a:t>
             </a:r>
           </a:p>
           <a:p>
             <a:pPr lvl="4"/>
             <a:r>
               <a:rPr lang="en-US" dirty="0" smtClean="0"/>
-              <a:t>Bullet 3</a:t>
-            </a:r>
-            <a:endParaRPr lang="en-US" dirty="0"/>
+              <a:t>Show picture of cluster with circle of radius at same point in dip of </a:t>
+            </a:r>
+            <a:r>
+              <a:rPr lang="en-US" dirty="0" err="1" smtClean="0"/>
+              <a:t>sphericity</a:t>
+            </a:r>
+            <a:r>
+              <a:rPr lang="en-US" dirty="0" smtClean="0"/>
+              <a:t>/</a:t>
+            </a:r>
+            <a:r>
+              <a:rPr lang="en-US" dirty="0" err="1" smtClean="0"/>
+              <a:t>ellipticity</a:t>
+            </a:r>
+            <a:r>
+              <a:rPr lang="en-US" dirty="0" smtClean="0"/>
+              <a:t> (whichever shows it the most)</a:t>
+            </a:r>
+          </a:p>
+          <a:p>
+            <a:pPr lvl="4"/>
+            <a:r>
+              <a:rPr lang="en-US" dirty="0" err="1" smtClean="0"/>
+              <a:t>Ellipticity</a:t>
+            </a:r>
+            <a:r>
+              <a:rPr lang="en-US" dirty="0" smtClean="0"/>
+              <a:t> plots with dip</a:t>
+            </a:r>
           </a:p>
         </p:txBody>
       </p:sp>
     </p:spTree>
     <p:extLst>
       <p:ext uri="{BB962C8B-B14F-4D97-AF65-F5344CB8AC3E}">
-        <p14:creationId xmlns:p14="http://schemas.microsoft.com/office/powerpoint/2010/main" val="3723072916"/>
+        <p14:creationId xmlns:p14="http://schemas.microsoft.com/office/powerpoint/2010/main" val="2194668825"/>
       </p:ext>
     </p:extLst>
   </p:cSld>
@@ -3928,7 +4005,7 @@
           <a:p>
             <a:r>
               <a:rPr lang="en-US" dirty="0" smtClean="0"/>
-              <a:t>Defining Filament Structure</a:t>
+              <a:t>Extracting the Cosmic Web</a:t>
             </a:r>
             <a:endParaRPr lang="en-US" dirty="0"/>
           </a:p>
@@ -3974,9 +4051,16 @@
           <a:p>
             <a:r>
               <a:rPr lang="en-US" dirty="0" smtClean="0"/>
-              <a:t>(Pictures of filament directions for different radii)</a:t>
-            </a:r>
-            <a:endParaRPr lang="en-US" dirty="0" smtClean="0"/>
+              <a:t>Discrete Persistent Source Extractor (</a:t>
+            </a:r>
+            <a:r>
+              <a:rPr lang="en-US" dirty="0" err="1" smtClean="0"/>
+              <a:t>DisPerSe</a:t>
+            </a:r>
+            <a:r>
+              <a:rPr lang="en-US" dirty="0" smtClean="0"/>
+              <a:t>)</a:t>
+            </a:r>
           </a:p>
           <a:p>
             <a:pPr lvl="1"/>
@@ -4012,7 +4096,7 @@
     </p:spTree>
     <p:extLst>
       <p:ext uri="{BB962C8B-B14F-4D97-AF65-F5344CB8AC3E}">
-        <p14:creationId xmlns:p14="http://schemas.microsoft.com/office/powerpoint/2010/main" val="3880460800"/>
+        <p14:creationId xmlns:p14="http://schemas.microsoft.com/office/powerpoint/2010/main" val="3723072916"/>
       </p:ext>
     </p:extLst>
   </p:cSld>

</xml_diff>

<commit_message>
Added reason slides - galaxy formation, study of evolution, DM is easier computation
</commit_message>
<xml_diff>
--- a/ICRAR-Black-Powerpoint.pptx
+++ b/ICRAR-Black-Powerpoint.pptx
@@ -3146,11 +3146,7 @@
           <a:p>
             <a:r>
               <a:rPr lang="en-US" dirty="0" smtClean="0"/>
-              <a:t>Why look at </a:t>
-            </a:r>
-            <a:r>
-              <a:rPr lang="en-US" dirty="0" smtClean="0"/>
-              <a:t>large-scale structure alignment?</a:t>
+              <a:t>Why look at large-scale structure alignment?</a:t>
             </a:r>
           </a:p>
           <a:p>
@@ -3160,11 +3156,7 @@
             <a:pPr lvl="2"/>
             <a:r>
               <a:rPr lang="en-US" dirty="0" smtClean="0"/>
-              <a:t>Provides insight into galax</a:t>
-            </a:r>
-            <a:r>
-              <a:rPr lang="en-US" dirty="0" smtClean="0"/>
-              <a:t>y formation processes</a:t>
+              <a:t>Provides insight into galaxy formation processes</a:t>
             </a:r>
           </a:p>
           <a:p>
@@ -3187,7 +3179,6 @@
               <a:rPr lang="en-US" dirty="0" smtClean="0"/>
               <a:t>At the moment, this is done with low resolution as it is computationally expensive to model baryonic physics in comparison to dark matter</a:t>
             </a:r>
-            <a:endParaRPr lang="en-US" dirty="0" smtClean="0"/>
           </a:p>
         </p:txBody>
       </p:sp>
@@ -3369,11 +3360,7 @@
           <a:p>
             <a:r>
               <a:rPr lang="en-US" dirty="0" smtClean="0"/>
-              <a:t>In previous research, stellar halo is filtered out (e.g. to look at galaxies or DM only</a:t>
-            </a:r>
-            <a:r>
-              <a:rPr lang="en-US" dirty="0" smtClean="0"/>
-              <a:t>)</a:t>
+              <a:t>In previous research, stellar halo is filtered out (e.g. to look at galaxies or DM only)</a:t>
             </a:r>
           </a:p>
           <a:p>
@@ -3384,17 +3371,13 @@
             <a:pPr lvl="2"/>
             <a:r>
               <a:rPr lang="en-US" dirty="0" smtClean="0"/>
-              <a:t>The stellar halo likely holds remnants of merger events etc. that have been significant in galaxy formation</a:t>
+              <a:t>The stellar halo likely holds remnants of merger events etc. that have been significant in galaxy </a:t>
+            </a:r>
+            <a:r>
+              <a:rPr lang="en-US" dirty="0" smtClean="0"/>
+              <a:t>formation</a:t>
             </a:r>
             <a:endParaRPr lang="en-US" dirty="0" smtClean="0"/>
-          </a:p>
-          <a:p>
-            <a:pPr lvl="4"/>
-            <a:r>
-              <a:rPr lang="en-US" dirty="0" smtClean="0"/>
-              <a:t>Bullet 3</a:t>
-            </a:r>
-            <a:endParaRPr lang="en-US" dirty="0"/>
           </a:p>
         </p:txBody>
       </p:sp>
@@ -3512,23 +3495,20 @@
             <a:pPr lvl="2"/>
             <a:r>
               <a:rPr lang="en-US" dirty="0" smtClean="0"/>
-              <a:t>Relationship to Horizon-AGN simulation (initial goal)</a:t>
+              <a:t>Relationship to Horizon-AGN simulation (initial goal</a:t>
+            </a:r>
+            <a:r>
+              <a:rPr lang="en-US" dirty="0" smtClean="0"/>
+              <a:t>)</a:t>
             </a:r>
           </a:p>
           <a:p>
             <a:pPr lvl="3"/>
             <a:r>
               <a:rPr lang="en-US" dirty="0" smtClean="0"/>
-              <a:t>Bullet 2</a:t>
-            </a:r>
-          </a:p>
-          <a:p>
-            <a:pPr lvl="4"/>
-            <a:r>
-              <a:rPr lang="en-US" dirty="0" smtClean="0"/>
-              <a:t>Bullet 3</a:t>
-            </a:r>
-            <a:endParaRPr lang="en-US" dirty="0"/>
+              <a:t>Small enough data set that it was easy to work with on a personal computer</a:t>
+            </a:r>
+            <a:endParaRPr lang="en-US" dirty="0" smtClean="0"/>
           </a:p>
         </p:txBody>
       </p:sp>

</xml_diff>

<commit_message>
Spoken to Chris about presentation - put lots of pictures in, be sure to talk about them and why what I've measured is relevant
</commit_message>
<xml_diff>
--- a/ICRAR-Black-Powerpoint.pptx
+++ b/ICRAR-Black-Powerpoint.pptx
@@ -5,26 +5,24 @@
     <p:sldMasterId id="2147483648" r:id="rId1"/>
   </p:sldMasterIdLst>
   <p:notesMasterIdLst>
-    <p:notesMasterId r:id="rId16"/>
+    <p:notesMasterId r:id="rId14"/>
   </p:notesMasterIdLst>
   <p:handoutMasterIdLst>
-    <p:handoutMasterId r:id="rId17"/>
+    <p:handoutMasterId r:id="rId15"/>
   </p:handoutMasterIdLst>
   <p:sldIdLst>
     <p:sldId id="256" r:id="rId2"/>
-    <p:sldId id="257" r:id="rId3"/>
-    <p:sldId id="269" r:id="rId4"/>
-    <p:sldId id="258" r:id="rId5"/>
-    <p:sldId id="265" r:id="rId6"/>
-    <p:sldId id="259" r:id="rId7"/>
-    <p:sldId id="262" r:id="rId8"/>
-    <p:sldId id="266" r:id="rId9"/>
-    <p:sldId id="260" r:id="rId10"/>
-    <p:sldId id="261" r:id="rId11"/>
-    <p:sldId id="263" r:id="rId12"/>
-    <p:sldId id="264" r:id="rId13"/>
-    <p:sldId id="267" r:id="rId14"/>
-    <p:sldId id="268" r:id="rId15"/>
+    <p:sldId id="270" r:id="rId3"/>
+    <p:sldId id="257" r:id="rId4"/>
+    <p:sldId id="259" r:id="rId5"/>
+    <p:sldId id="262" r:id="rId6"/>
+    <p:sldId id="266" r:id="rId7"/>
+    <p:sldId id="260" r:id="rId8"/>
+    <p:sldId id="261" r:id="rId9"/>
+    <p:sldId id="263" r:id="rId10"/>
+    <p:sldId id="264" r:id="rId11"/>
+    <p:sldId id="267" r:id="rId12"/>
+    <p:sldId id="268" r:id="rId13"/>
   </p:sldIdLst>
   <p:sldSz cx="9144000" cy="6858000" type="screen4x3"/>
   <p:notesSz cx="6858000" cy="9144000"/>
@@ -2413,7 +2411,7 @@
           <a:p>
             <a:r>
               <a:rPr lang="en-US" dirty="0" smtClean="0"/>
-              <a:t>Defining Filament Structure</a:t>
+              <a:t>Results?</a:t>
             </a:r>
             <a:endParaRPr lang="en-US" dirty="0"/>
           </a:p>
@@ -2435,7 +2433,7 @@
           <a:lstStyle/>
           <a:p>
             <a:r>
-              <a:rPr lang="en-US" smtClean="0"/>
+              <a:rPr lang="en-US" dirty="0" smtClean="0"/>
               <a:t>Presentation Title (Edit in File &gt; 'Page Setup')</a:t>
             </a:r>
             <a:endParaRPr lang="en-US" dirty="0"/>
@@ -2459,14 +2457,14 @@
           <a:p>
             <a:r>
               <a:rPr lang="en-US" dirty="0" smtClean="0"/>
-              <a:t>(Pictures of filament directions for different radii)</a:t>
+              <a:t>What did this say about large-scale structure formation?</a:t>
             </a:r>
           </a:p>
           <a:p>
             <a:pPr lvl="1"/>
             <a:r>
               <a:rPr lang="en-US" dirty="0" smtClean="0"/>
-              <a:t>Text</a:t>
+              <a:t>On the level of this single cluster</a:t>
             </a:r>
           </a:p>
           <a:p>
@@ -2496,13 +2494,20 @@
     </p:spTree>
     <p:extLst>
       <p:ext uri="{BB962C8B-B14F-4D97-AF65-F5344CB8AC3E}">
-        <p14:creationId xmlns:p14="http://schemas.microsoft.com/office/powerpoint/2010/main" val="3880460800"/>
+        <p14:creationId xmlns:p14="http://schemas.microsoft.com/office/powerpoint/2010/main" val="346904941"/>
       </p:ext>
     </p:extLst>
   </p:cSld>
   <p:clrMapOvr>
     <a:masterClrMapping/>
   </p:clrMapOvr>
+  <p:timing>
+    <p:tnLst>
+      <p:par>
+        <p:cTn xmlns:p14="http://schemas.microsoft.com/office/powerpoint/2010/main" id="1" dur="indefinite" restart="never" nodeType="tmRoot"/>
+      </p:par>
+    </p:tnLst>
+  </p:timing>
 </p:sld>
 </file>
 
@@ -2541,12 +2546,8 @@
           <a:lstStyle/>
           <a:p>
             <a:r>
-              <a:rPr lang="en-US" dirty="0" err="1" smtClean="0"/>
-              <a:t>Examing</a:t>
-            </a:r>
-            <a:r>
-              <a:rPr lang="en-US" dirty="0" smtClean="0"/>
-              <a:t> Correlations</a:t>
+              <a:rPr lang="en-US" dirty="0" smtClean="0"/>
+              <a:t>Results?</a:t>
             </a:r>
             <a:endParaRPr lang="en-US" dirty="0"/>
           </a:p>
@@ -2592,14 +2593,14 @@
           <a:p>
             <a:r>
               <a:rPr lang="en-US" dirty="0" smtClean="0"/>
-              <a:t>Plotting angle between the major axis of the halo and the filament</a:t>
+              <a:t>What did this say about large-scale structure formation?</a:t>
             </a:r>
           </a:p>
           <a:p>
             <a:pPr lvl="1"/>
             <a:r>
               <a:rPr lang="en-US" dirty="0" smtClean="0"/>
-              <a:t>What about the other axes? Did we plot these?</a:t>
+              <a:t>What could we expect to see in a larger simulation data set (such as Horizon-AGN)?</a:t>
             </a:r>
           </a:p>
           <a:p>
@@ -2629,13 +2630,20 @@
     </p:spTree>
     <p:extLst>
       <p:ext uri="{BB962C8B-B14F-4D97-AF65-F5344CB8AC3E}">
-        <p14:creationId xmlns:p14="http://schemas.microsoft.com/office/powerpoint/2010/main" val="136223336"/>
+        <p14:creationId xmlns:p14="http://schemas.microsoft.com/office/powerpoint/2010/main" val="2013433585"/>
       </p:ext>
     </p:extLst>
   </p:cSld>
   <p:clrMapOvr>
     <a:masterClrMapping/>
   </p:clrMapOvr>
+  <p:timing>
+    <p:tnLst>
+      <p:par>
+        <p:cTn xmlns:p14="http://schemas.microsoft.com/office/powerpoint/2010/main" id="1" dur="indefinite" restart="never" nodeType="tmRoot"/>
+      </p:par>
+    </p:tnLst>
+  </p:timing>
 </p:sld>
 </file>
 
@@ -2675,7 +2683,7 @@
           <a:p>
             <a:r>
               <a:rPr lang="en-US" dirty="0" smtClean="0"/>
-              <a:t>Results?</a:t>
+              <a:t>Acknowledgments</a:t>
             </a:r>
             <a:endParaRPr lang="en-US" dirty="0"/>
           </a:p>
@@ -2721,143 +2729,52 @@
           <a:p>
             <a:r>
               <a:rPr lang="en-US" dirty="0" smtClean="0"/>
-              <a:t>What did this say about large-scale structure formation?</a:t>
+              <a:t>Thank you to both supervisors at ICRAR (</a:t>
+            </a:r>
+            <a:r>
+              <a:rPr lang="en-US" dirty="0" err="1" smtClean="0"/>
+              <a:t>Dr</a:t>
+            </a:r>
+            <a:r>
+              <a:rPr lang="en-US" dirty="0" smtClean="0"/>
+              <a:t> Chris Power and </a:t>
+            </a:r>
+            <a:r>
+              <a:rPr lang="en-US" dirty="0" err="1" smtClean="0"/>
+              <a:t>Dr</a:t>
+            </a:r>
+            <a:r>
+              <a:rPr lang="en-US" dirty="0" smtClean="0"/>
+              <a:t> Charlotte Welker)</a:t>
+            </a:r>
+          </a:p>
+          <a:p>
+            <a:r>
+              <a:rPr lang="en-US" dirty="0" smtClean="0"/>
+              <a:t>Thank you to Chris </a:t>
+            </a:r>
+            <a:r>
+              <a:rPr lang="en-US" dirty="0" err="1" smtClean="0"/>
+              <a:t>Bording</a:t>
+            </a:r>
+            <a:r>
+              <a:rPr lang="en-US" dirty="0" smtClean="0"/>
+              <a:t> at </a:t>
+            </a:r>
+            <a:r>
+              <a:rPr lang="en-US" dirty="0" err="1" smtClean="0"/>
+              <a:t>Pawsey</a:t>
+            </a:r>
+            <a:r>
+              <a:rPr lang="en-US" dirty="0" smtClean="0"/>
+              <a:t> Supercomputing Centre</a:t>
             </a:r>
           </a:p>
           <a:p>
             <a:pPr lvl="1"/>
             <a:r>
               <a:rPr lang="en-US" dirty="0" smtClean="0"/>
-              <a:t>On the level of this single cluster</a:t>
-            </a:r>
-          </a:p>
-          <a:p>
-            <a:pPr lvl="2"/>
-            <a:r>
-              <a:rPr lang="en-US" dirty="0" smtClean="0"/>
-              <a:t>Bullet 1</a:t>
-            </a:r>
-          </a:p>
-          <a:p>
-            <a:pPr lvl="3"/>
-            <a:r>
-              <a:rPr lang="en-US" dirty="0" smtClean="0"/>
-              <a:t>Bullet 2</a:t>
-            </a:r>
-          </a:p>
-          <a:p>
-            <a:pPr lvl="4"/>
-            <a:r>
-              <a:rPr lang="en-US" dirty="0" smtClean="0"/>
-              <a:t>Bullet 3</a:t>
-            </a:r>
-            <a:endParaRPr lang="en-US" dirty="0"/>
-          </a:p>
-        </p:txBody>
-      </p:sp>
-    </p:spTree>
-    <p:extLst>
-      <p:ext uri="{BB962C8B-B14F-4D97-AF65-F5344CB8AC3E}">
-        <p14:creationId xmlns:p14="http://schemas.microsoft.com/office/powerpoint/2010/main" val="346904941"/>
-      </p:ext>
-    </p:extLst>
-  </p:cSld>
-  <p:clrMapOvr>
-    <a:masterClrMapping/>
-  </p:clrMapOvr>
-</p:sld>
-</file>
-
-<file path=ppt/slides/slide13.xml><?xml version="1.0" encoding="utf-8"?>
-<p:sld xmlns:a="http://schemas.openxmlformats.org/drawingml/2006/main" xmlns:r="http://schemas.openxmlformats.org/officeDocument/2006/relationships" xmlns:p="http://schemas.openxmlformats.org/presentationml/2006/main">
-  <p:cSld>
-    <p:spTree>
-      <p:nvGrpSpPr>
-        <p:cNvPr id="1" name=""/>
-        <p:cNvGrpSpPr/>
-        <p:nvPr/>
-      </p:nvGrpSpPr>
-      <p:grpSpPr>
-        <a:xfrm>
-          <a:off x="0" y="0"/>
-          <a:ext cx="0" cy="0"/>
-          <a:chOff x="0" y="0"/>
-          <a:chExt cx="0" cy="0"/>
-        </a:xfrm>
-      </p:grpSpPr>
-      <p:sp>
-        <p:nvSpPr>
-          <p:cNvPr id="2" name="Title 1"/>
-          <p:cNvSpPr>
-            <a:spLocks noGrp="1"/>
-          </p:cNvSpPr>
-          <p:nvPr>
-            <p:ph type="title"/>
-          </p:nvPr>
-        </p:nvSpPr>
-        <p:spPr/>
-        <p:txBody>
-          <a:bodyPr>
-            <a:normAutofit fontScale="90000"/>
-          </a:bodyPr>
-          <a:lstStyle/>
-          <a:p>
-            <a:r>
-              <a:rPr lang="en-US" dirty="0" smtClean="0"/>
-              <a:t>Results?</a:t>
-            </a:r>
-            <a:endParaRPr lang="en-US" dirty="0"/>
-          </a:p>
-        </p:txBody>
-      </p:sp>
-      <p:sp>
-        <p:nvSpPr>
-          <p:cNvPr id="3" name="Footer Placeholder 2"/>
-          <p:cNvSpPr>
-            <a:spLocks noGrp="1"/>
-          </p:cNvSpPr>
-          <p:nvPr>
-            <p:ph type="ftr" sz="quarter" idx="10"/>
-          </p:nvPr>
-        </p:nvSpPr>
-        <p:spPr/>
-        <p:txBody>
-          <a:bodyPr/>
-          <a:lstStyle/>
-          <a:p>
-            <a:r>
-              <a:rPr lang="en-US" dirty="0" smtClean="0"/>
-              <a:t>Presentation Title (Edit in File &gt; 'Page Setup')</a:t>
-            </a:r>
-            <a:endParaRPr lang="en-US" dirty="0"/>
-          </a:p>
-        </p:txBody>
-      </p:sp>
-      <p:sp>
-        <p:nvSpPr>
-          <p:cNvPr id="4" name="Text Placeholder 3"/>
-          <p:cNvSpPr>
-            <a:spLocks noGrp="1"/>
-          </p:cNvSpPr>
-          <p:nvPr>
-            <p:ph type="body" sz="quarter" idx="14"/>
-          </p:nvPr>
-        </p:nvSpPr>
-        <p:spPr/>
-        <p:txBody>
-          <a:bodyPr/>
-          <a:lstStyle/>
-          <a:p>
-            <a:r>
-              <a:rPr lang="en-US" dirty="0" smtClean="0"/>
-              <a:t>What did this say about large-scale structure formation?</a:t>
-            </a:r>
-          </a:p>
-          <a:p>
-            <a:pPr lvl="1"/>
-            <a:r>
-              <a:rPr lang="en-US" dirty="0" smtClean="0"/>
-              <a:t>What could we expect to see in a larger simulation data set (such as Horizon-AGN)?</a:t>
+              <a:t>Text</a:t>
             </a:r>
           </a:p>
           <a:p>
@@ -2894,173 +2811,13 @@
   <p:clrMapOvr>
     <a:masterClrMapping/>
   </p:clrMapOvr>
-</p:sld>
-</file>
-
-<file path=ppt/slides/slide14.xml><?xml version="1.0" encoding="utf-8"?>
-<p:sld xmlns:a="http://schemas.openxmlformats.org/drawingml/2006/main" xmlns:r="http://schemas.openxmlformats.org/officeDocument/2006/relationships" xmlns:p="http://schemas.openxmlformats.org/presentationml/2006/main">
-  <p:cSld>
-    <p:spTree>
-      <p:nvGrpSpPr>
-        <p:cNvPr id="1" name=""/>
-        <p:cNvGrpSpPr/>
-        <p:nvPr/>
-      </p:nvGrpSpPr>
-      <p:grpSpPr>
-        <a:xfrm>
-          <a:off x="0" y="0"/>
-          <a:ext cx="0" cy="0"/>
-          <a:chOff x="0" y="0"/>
-          <a:chExt cx="0" cy="0"/>
-        </a:xfrm>
-      </p:grpSpPr>
-      <p:sp>
-        <p:nvSpPr>
-          <p:cNvPr id="2" name="Title 1"/>
-          <p:cNvSpPr>
-            <a:spLocks noGrp="1"/>
-          </p:cNvSpPr>
-          <p:nvPr>
-            <p:ph type="title"/>
-          </p:nvPr>
-        </p:nvSpPr>
-        <p:spPr/>
-        <p:txBody>
-          <a:bodyPr>
-            <a:normAutofit fontScale="90000"/>
-          </a:bodyPr>
-          <a:lstStyle/>
-          <a:p>
-            <a:r>
-              <a:rPr lang="en-US" dirty="0" smtClean="0"/>
-              <a:t>Acknowledgments</a:t>
-            </a:r>
-            <a:endParaRPr lang="en-US" dirty="0"/>
-          </a:p>
-        </p:txBody>
-      </p:sp>
-      <p:sp>
-        <p:nvSpPr>
-          <p:cNvPr id="3" name="Footer Placeholder 2"/>
-          <p:cNvSpPr>
-            <a:spLocks noGrp="1"/>
-          </p:cNvSpPr>
-          <p:nvPr>
-            <p:ph type="ftr" sz="quarter" idx="10"/>
-          </p:nvPr>
-        </p:nvSpPr>
-        <p:spPr/>
-        <p:txBody>
-          <a:bodyPr/>
-          <a:lstStyle/>
-          <a:p>
-            <a:r>
-              <a:rPr lang="en-US" dirty="0" smtClean="0"/>
-              <a:t>Presentation Title (Edit in File &gt; 'Page Setup')</a:t>
-            </a:r>
-            <a:endParaRPr lang="en-US" dirty="0"/>
-          </a:p>
-        </p:txBody>
-      </p:sp>
-      <p:sp>
-        <p:nvSpPr>
-          <p:cNvPr id="4" name="Text Placeholder 3"/>
-          <p:cNvSpPr>
-            <a:spLocks noGrp="1"/>
-          </p:cNvSpPr>
-          <p:nvPr>
-            <p:ph type="body" sz="quarter" idx="14"/>
-          </p:nvPr>
-        </p:nvSpPr>
-        <p:spPr/>
-        <p:txBody>
-          <a:bodyPr/>
-          <a:lstStyle/>
-          <a:p>
-            <a:r>
-              <a:rPr lang="en-US" dirty="0" smtClean="0"/>
-              <a:t>Thank you to both supervisors at ICRAR (</a:t>
-            </a:r>
-            <a:r>
-              <a:rPr lang="en-US" dirty="0" err="1" smtClean="0"/>
-              <a:t>Dr</a:t>
-            </a:r>
-            <a:r>
-              <a:rPr lang="en-US" dirty="0" smtClean="0"/>
-              <a:t> Chris Power and </a:t>
-            </a:r>
-            <a:r>
-              <a:rPr lang="en-US" dirty="0" err="1" smtClean="0"/>
-              <a:t>Dr</a:t>
-            </a:r>
-            <a:r>
-              <a:rPr lang="en-US" dirty="0" smtClean="0"/>
-              <a:t> Charlotte Welker)</a:t>
-            </a:r>
-          </a:p>
-          <a:p>
-            <a:r>
-              <a:rPr lang="en-US" dirty="0" smtClean="0"/>
-              <a:t>Thank you to Chris </a:t>
-            </a:r>
-            <a:r>
-              <a:rPr lang="en-US" dirty="0" err="1" smtClean="0"/>
-              <a:t>Bording</a:t>
-            </a:r>
-            <a:r>
-              <a:rPr lang="en-US" dirty="0" smtClean="0"/>
-              <a:t> at </a:t>
-            </a:r>
-            <a:r>
-              <a:rPr lang="en-US" dirty="0" err="1" smtClean="0"/>
-              <a:t>Pawsey</a:t>
-            </a:r>
-            <a:r>
-              <a:rPr lang="en-US" dirty="0" smtClean="0"/>
-              <a:t> Supercomputing Centre</a:t>
-            </a:r>
-          </a:p>
-          <a:p>
-            <a:pPr lvl="1"/>
-            <a:r>
-              <a:rPr lang="en-US" dirty="0" smtClean="0"/>
-              <a:t>Text</a:t>
-            </a:r>
-          </a:p>
-          <a:p>
-            <a:pPr lvl="2"/>
-            <a:r>
-              <a:rPr lang="en-US" dirty="0" smtClean="0"/>
-              <a:t>Bullet 1</a:t>
-            </a:r>
-          </a:p>
-          <a:p>
-            <a:pPr lvl="3"/>
-            <a:r>
-              <a:rPr lang="en-US" dirty="0" smtClean="0"/>
-              <a:t>Bullet 2</a:t>
-            </a:r>
-          </a:p>
-          <a:p>
-            <a:pPr lvl="4"/>
-            <a:r>
-              <a:rPr lang="en-US" dirty="0" smtClean="0"/>
-              <a:t>Bullet 3</a:t>
-            </a:r>
-            <a:endParaRPr lang="en-US" dirty="0"/>
-          </a:p>
-        </p:txBody>
-      </p:sp>
-    </p:spTree>
-    <p:extLst>
-      <p:ext uri="{BB962C8B-B14F-4D97-AF65-F5344CB8AC3E}">
-        <p14:creationId xmlns:p14="http://schemas.microsoft.com/office/powerpoint/2010/main" val="2013433585"/>
-      </p:ext>
-    </p:extLst>
-  </p:cSld>
-  <p:clrMapOvr>
-    <a:masterClrMapping/>
-  </p:clrMapOvr>
+  <p:timing>
+    <p:tnLst>
+      <p:par>
+        <p:cTn xmlns:p14="http://schemas.microsoft.com/office/powerpoint/2010/main" id="1" dur="indefinite" restart="never" nodeType="tmRoot"/>
+      </p:par>
+    </p:tnLst>
+  </p:timing>
 </p:sld>
 </file>
 
@@ -3100,7 +2857,7 @@
           <a:p>
             <a:r>
               <a:rPr lang="en-US" dirty="0" smtClean="0"/>
-              <a:t>Hierarchical Structure Formation</a:t>
+              <a:t>Background</a:t>
             </a:r>
             <a:endParaRPr lang="en-US" dirty="0"/>
           </a:p>
@@ -3123,7 +2880,7 @@
           <a:p>
             <a:r>
               <a:rPr lang="en-US" smtClean="0"/>
-              <a:t>Presentation Title (Edit in File &gt; 'Page Setup')</a:t>
+              <a:t>Presentation Title (Edit in File &gt; 'Page Setup' &gt; ‘Header/footer’)</a:t>
             </a:r>
             <a:endParaRPr lang="en-US" dirty="0"/>
           </a:p>
@@ -3146,38 +2903,38 @@
           <a:p>
             <a:r>
               <a:rPr lang="en-US" dirty="0" smtClean="0"/>
-              <a:t>Why look at large-scale structure alignment?</a:t>
-            </a:r>
-          </a:p>
-          <a:p>
-            <a:endParaRPr lang="en-US" dirty="0" smtClean="0"/>
+              <a:t>Hierarchical structure formation: </a:t>
+            </a:r>
+          </a:p>
+          <a:p>
+            <a:endParaRPr lang="en-US" dirty="0"/>
           </a:p>
           <a:p>
             <a:pPr lvl="2"/>
             <a:r>
               <a:rPr lang="en-US" dirty="0" smtClean="0"/>
-              <a:t>Provides insight into galaxy formation processes</a:t>
+              <a:t>Cosmological structures (such as large galaxy clusters) are formed by merging processes</a:t>
             </a:r>
           </a:p>
           <a:p>
             <a:pPr lvl="2"/>
             <a:r>
               <a:rPr lang="en-US" dirty="0" smtClean="0"/>
-              <a:t>Simulations can predict mass distributions and much more, but what we are capable of observing is galaxies</a:t>
+              <a:t>In such processes, gas in falls into the gravitational well formed by dark matter haloes</a:t>
             </a:r>
           </a:p>
           <a:p>
             <a:pPr lvl="3"/>
             <a:r>
               <a:rPr lang="en-US" dirty="0" smtClean="0"/>
-              <a:t>Therefore need to model galaxy formation accurately!</a:t>
-            </a:r>
-          </a:p>
-          <a:p>
-            <a:pPr lvl="3"/>
-            <a:r>
-              <a:rPr lang="en-US" dirty="0" smtClean="0"/>
-              <a:t>At the moment, this is done with low resolution as it is computationally expensive to model baryonic physics in comparison to dark matter</a:t>
+              <a:t>Satellite galaxies are drawn in by a central galaxy in the dark matter halo</a:t>
+            </a:r>
+          </a:p>
+          <a:p>
+            <a:pPr lvl="2"/>
+            <a:r>
+              <a:rPr lang="en-US" dirty="0" smtClean="0"/>
+              <a:t>As this occurs, stellar matter is tidally stripped during collisions, and we can suppose that this matter will tend to align with the smooth gravitational potential of the large-scale structure</a:t>
             </a:r>
           </a:p>
         </p:txBody>
@@ -3185,7 +2942,7 @@
     </p:spTree>
     <p:extLst>
       <p:ext uri="{BB962C8B-B14F-4D97-AF65-F5344CB8AC3E}">
-        <p14:creationId xmlns:p14="http://schemas.microsoft.com/office/powerpoint/2010/main" val="3224246657"/>
+        <p14:creationId xmlns:p14="http://schemas.microsoft.com/office/powerpoint/2010/main" val="3957811970"/>
       </p:ext>
     </p:extLst>
   </p:cSld>
@@ -3222,12 +2979,7 @@
             <p:ph type="title"/>
           </p:nvPr>
         </p:nvSpPr>
-        <p:spPr>
-          <a:xfrm>
-            <a:off x="540355" y="1596645"/>
-            <a:ext cx="7670800" cy="3861149"/>
-          </a:xfrm>
-        </p:spPr>
+        <p:spPr/>
         <p:txBody>
           <a:bodyPr>
             <a:normAutofit fontScale="90000"/>
@@ -3236,7 +2988,7 @@
           <a:p>
             <a:r>
               <a:rPr lang="en-US" dirty="0" smtClean="0"/>
-              <a:t>If there is clear alignment between stellar halo and dark matter halo or surrounding large-scale structure (filament), could be used as an indicator of galaxy distributions (without as much computation)</a:t>
+              <a:t>Why is this significant?</a:t>
             </a:r>
             <a:endParaRPr lang="en-US" dirty="0"/>
           </a:p>
@@ -3259,16 +3011,119 @@
           <a:p>
             <a:r>
               <a:rPr lang="en-US" smtClean="0"/>
-              <a:t>Presentation Title (Edit in File &gt; 'Page Setup' &gt; ‘Header/footer’)</a:t>
-            </a:r>
-            <a:endParaRPr lang="en-US" dirty="0"/>
+              <a:t>Presentation Title (Edit in File &gt; 'Page Setup')</a:t>
+            </a:r>
+            <a:endParaRPr lang="en-US" dirty="0"/>
+          </a:p>
+        </p:txBody>
+      </p:sp>
+      <p:sp>
+        <p:nvSpPr>
+          <p:cNvPr id="4" name="Text Placeholder 3"/>
+          <p:cNvSpPr>
+            <a:spLocks noGrp="1"/>
+          </p:cNvSpPr>
+          <p:nvPr>
+            <p:ph type="body" sz="quarter" idx="14"/>
+          </p:nvPr>
+        </p:nvSpPr>
+        <p:spPr>
+          <a:xfrm>
+            <a:off x="246137" y="1158876"/>
+            <a:ext cx="8674026" cy="2662726"/>
+          </a:xfrm>
+        </p:spPr>
+        <p:txBody>
+          <a:bodyPr/>
+          <a:lstStyle/>
+          <a:p>
+            <a:r>
+              <a:rPr lang="en-US" dirty="0" smtClean="0"/>
+              <a:t>Why look at large-scale structure alignment</a:t>
+            </a:r>
+            <a:r>
+              <a:rPr lang="en-US" dirty="0" smtClean="0"/>
+              <a:t>?</a:t>
+            </a:r>
+            <a:endParaRPr lang="en-US" dirty="0" smtClean="0"/>
+          </a:p>
+          <a:p>
+            <a:pPr lvl="2"/>
+            <a:r>
+              <a:rPr lang="en-US" dirty="0" smtClean="0"/>
+              <a:t>Simulations </a:t>
+            </a:r>
+            <a:r>
+              <a:rPr lang="en-US" dirty="0" smtClean="0"/>
+              <a:t>can predict mass distributions and much more, but what we are </a:t>
+            </a:r>
+            <a:r>
+              <a:rPr lang="en-US" dirty="0" smtClean="0"/>
+              <a:t>most capable </a:t>
+            </a:r>
+            <a:r>
+              <a:rPr lang="en-US" dirty="0" smtClean="0"/>
+              <a:t>of observing is galaxies</a:t>
+            </a:r>
+          </a:p>
+          <a:p>
+            <a:pPr lvl="3"/>
+            <a:r>
+              <a:rPr lang="en-US" dirty="0" smtClean="0"/>
+              <a:t>PROBLEM: When observing at a scale of galaxies, their alignments are so influenced by recent merger events that they cannot point out the large scale structure around them</a:t>
+            </a:r>
+          </a:p>
+          <a:p>
+            <a:pPr lvl="3"/>
+            <a:r>
+              <a:rPr lang="en-US" dirty="0" smtClean="0"/>
+              <a:t>However perhaps the stellar halo can?</a:t>
+            </a:r>
+            <a:endParaRPr lang="en-US" dirty="0" smtClean="0"/>
+          </a:p>
+        </p:txBody>
+      </p:sp>
+      <p:sp>
+        <p:nvSpPr>
+          <p:cNvPr id="5" name="Rectangle 4"/>
+          <p:cNvSpPr/>
+          <p:nvPr/>
+        </p:nvSpPr>
+        <p:spPr>
+          <a:xfrm>
+            <a:off x="1249680" y="3870231"/>
+            <a:ext cx="7688168" cy="2554545"/>
+          </a:xfrm>
+          <a:prstGeom prst="rect">
+            <a:avLst/>
+          </a:prstGeom>
+        </p:spPr>
+        <p:txBody>
+          <a:bodyPr wrap="square">
+            <a:spAutoFit/>
+          </a:bodyPr>
+          <a:lstStyle/>
+          <a:p>
+            <a:pPr marL="571500" indent="-571500">
+              <a:buFont typeface="Wingdings" charset="2"/>
+              <a:buChar char="Ø"/>
+            </a:pPr>
+            <a:r>
+              <a:rPr lang="en-US" sz="4000" dirty="0">
+                <a:solidFill>
+                  <a:srgbClr val="F6BB1C"/>
+                </a:solidFill>
+              </a:rPr>
+              <a:t>See if the structural properties of the stellar halo aligns with dark matter halo and large-scale filamentary structure</a:t>
+            </a:r>
+            <a:endParaRPr lang="en-US" sz="4000" dirty="0"/>
           </a:p>
         </p:txBody>
       </p:sp>
     </p:spTree>
     <p:extLst>
       <p:ext uri="{BB962C8B-B14F-4D97-AF65-F5344CB8AC3E}">
-        <p14:creationId xmlns:p14="http://schemas.microsoft.com/office/powerpoint/2010/main" val="3115040940"/>
+        <p14:creationId xmlns:p14="http://schemas.microsoft.com/office/powerpoint/2010/main" val="3224246657"/>
       </p:ext>
     </p:extLst>
   </p:cSld>
@@ -3314,7 +3169,7 @@
           <a:p>
             <a:r>
               <a:rPr lang="en-US" dirty="0" smtClean="0"/>
-              <a:t>Why Stellar Halos?</a:t>
+              <a:t>Halo Shape Properties</a:t>
             </a:r>
             <a:endParaRPr lang="en-US" dirty="0"/>
           </a:p>
@@ -3336,7 +3191,7 @@
           <a:lstStyle/>
           <a:p>
             <a:r>
-              <a:rPr lang="en-US" smtClean="0"/>
+              <a:rPr lang="en-US" dirty="0" smtClean="0"/>
               <a:t>Presentation Title (Edit in File &gt; 'Page Setup')</a:t>
             </a:r>
             <a:endParaRPr lang="en-US" dirty="0"/>
@@ -3360,23 +3215,57 @@
           <a:p>
             <a:r>
               <a:rPr lang="en-US" dirty="0" smtClean="0"/>
-              <a:t>In previous research, stellar halo is filtered out (e.g. to look at galaxies or DM only)</a:t>
-            </a:r>
+              <a:t>Reduced moment of inertia </a:t>
+            </a:r>
+            <a:r>
+              <a:rPr lang="en-US" dirty="0" smtClean="0"/>
+              <a:t>tensor</a:t>
+            </a:r>
+            <a:endParaRPr lang="en-US" dirty="0"/>
           </a:p>
           <a:p>
             <a:pPr lvl="2"/>
-            <a:endParaRPr lang="en-US" dirty="0"/>
+            <a:r>
+              <a:rPr lang="en-US" dirty="0" smtClean="0"/>
+              <a:t>From here, find eigenvalues (square roots correspond to major, intermediate and minor axes lengths – eigenvalues correspond to axes’ direction)</a:t>
+            </a:r>
           </a:p>
           <a:p>
             <a:pPr lvl="2"/>
             <a:r>
               <a:rPr lang="en-US" dirty="0" smtClean="0"/>
-              <a:t>The stellar halo likely holds remnants of merger events etc. that have been significant in galaxy </a:t>
-            </a:r>
-            <a:r>
-              <a:rPr lang="en-US" dirty="0" smtClean="0"/>
-              <a:t>formation</a:t>
-            </a:r>
+              <a:t>From here, can then get values for </a:t>
+            </a:r>
+            <a:r>
+              <a:rPr lang="en-US" dirty="0" err="1" smtClean="0"/>
+              <a:t>sphericity</a:t>
+            </a:r>
+            <a:r>
+              <a:rPr lang="en-US" dirty="0" smtClean="0"/>
+              <a:t>, </a:t>
+            </a:r>
+            <a:r>
+              <a:rPr lang="en-US" dirty="0" err="1" smtClean="0"/>
+              <a:t>ellipticity</a:t>
+            </a:r>
+            <a:r>
+              <a:rPr lang="en-US" dirty="0" smtClean="0"/>
+              <a:t>,</a:t>
+            </a:r>
+            <a:r>
+              <a:rPr lang="en-US" dirty="0"/>
+              <a:t> </a:t>
+            </a:r>
+            <a:r>
+              <a:rPr lang="en-US" dirty="0" smtClean="0"/>
+              <a:t>etc.</a:t>
+            </a:r>
+            <a:endParaRPr lang="en-US" dirty="0"/>
+          </a:p>
+          <a:p>
+            <a:endParaRPr lang="en-US" dirty="0" smtClean="0"/>
+          </a:p>
+          <a:p>
             <a:endParaRPr lang="en-US" dirty="0" smtClean="0"/>
           </a:p>
         </p:txBody>
@@ -3429,12 +3318,8 @@
           <a:lstStyle/>
           <a:p>
             <a:r>
-              <a:rPr lang="en-US" dirty="0" err="1" smtClean="0"/>
-              <a:t>nIFTy</a:t>
-            </a:r>
-            <a:r>
-              <a:rPr lang="en-US" dirty="0" smtClean="0"/>
-              <a:t> Cluster</a:t>
+              <a:rPr lang="en-US" dirty="0" smtClean="0"/>
+              <a:t>Large-scale structure </a:t>
             </a:r>
             <a:endParaRPr lang="en-US" dirty="0"/>
           </a:p>
@@ -3456,7 +3341,7 @@
           <a:lstStyle/>
           <a:p>
             <a:r>
-              <a:rPr lang="en-US" smtClean="0"/>
+              <a:rPr lang="en-US" dirty="0" smtClean="0"/>
               <a:t>Presentation Title (Edit in File &gt; 'Page Setup')</a:t>
             </a:r>
             <a:endParaRPr lang="en-US" dirty="0"/>
@@ -3480,48 +3365,60 @@
           <a:p>
             <a:r>
               <a:rPr lang="en-US" dirty="0" smtClean="0"/>
-              <a:t>Why the </a:t>
+              <a:t>Discrete Persistent Source Extractor (</a:t>
             </a:r>
             <a:r>
               <a:rPr lang="en-US" dirty="0" err="1" smtClean="0"/>
-              <a:t>nIFTy</a:t>
-            </a:r>
-            <a:r>
-              <a:rPr lang="en-US" dirty="0" smtClean="0"/>
-              <a:t> cluster?</a:t>
-            </a:r>
+              <a:t>DisPerSe</a:t>
+            </a:r>
+            <a:r>
+              <a:rPr lang="en-US" dirty="0" smtClean="0"/>
+              <a:t>)</a:t>
+            </a:r>
+            <a:endParaRPr lang="en-US" dirty="0" smtClean="0"/>
           </a:p>
           <a:p>
             <a:pPr lvl="2"/>
             <a:r>
               <a:rPr lang="en-US" dirty="0" smtClean="0"/>
-              <a:t>Relationship to Horizon-AGN simulation (initial goal</a:t>
-            </a:r>
-            <a:r>
-              <a:rPr lang="en-US" dirty="0" smtClean="0"/>
-              <a:t>)</a:t>
-            </a:r>
-          </a:p>
-          <a:p>
-            <a:pPr lvl="3"/>
-            <a:r>
-              <a:rPr lang="en-US" dirty="0" smtClean="0"/>
-              <a:t>Small enough data set that it was easy to work with on a personal computer</a:t>
-            </a:r>
-            <a:endParaRPr lang="en-US" dirty="0" smtClean="0"/>
+              <a:t>Extracts filamentary skeleton from grid values through computation of the Morse-</a:t>
+            </a:r>
+            <a:r>
+              <a:rPr lang="en-US" dirty="0" err="1" smtClean="0"/>
+              <a:t>Smale</a:t>
+            </a:r>
+            <a:r>
+              <a:rPr lang="en-US" dirty="0" smtClean="0"/>
+              <a:t> complex</a:t>
+            </a:r>
+          </a:p>
+          <a:p>
+            <a:pPr lvl="2"/>
+            <a:r>
+              <a:rPr lang="en-US" dirty="0" smtClean="0"/>
+              <a:t>Calculated up to a certain persistence level, allowing for removal of noise</a:t>
+            </a:r>
+            <a:endParaRPr lang="en-US" dirty="0"/>
           </a:p>
         </p:txBody>
       </p:sp>
     </p:spTree>
     <p:extLst>
       <p:ext uri="{BB962C8B-B14F-4D97-AF65-F5344CB8AC3E}">
-        <p14:creationId xmlns:p14="http://schemas.microsoft.com/office/powerpoint/2010/main" val="2194668825"/>
+        <p14:creationId xmlns:p14="http://schemas.microsoft.com/office/powerpoint/2010/main" val="136223336"/>
       </p:ext>
     </p:extLst>
   </p:cSld>
   <p:clrMapOvr>
     <a:masterClrMapping/>
   </p:clrMapOvr>
+  <p:timing>
+    <p:tnLst>
+      <p:par>
+        <p:cTn xmlns:p14="http://schemas.microsoft.com/office/powerpoint/2010/main" id="1" dur="indefinite" restart="never" nodeType="tmRoot"/>
+      </p:par>
+    </p:tnLst>
+  </p:timing>
 </p:sld>
 </file>
 
@@ -3561,7 +3458,7 @@
           <a:p>
             <a:r>
               <a:rPr lang="en-US" dirty="0" smtClean="0"/>
-              <a:t>Halo Shape Properties</a:t>
+              <a:t>Results – 2D projections</a:t>
             </a:r>
             <a:endParaRPr lang="en-US" dirty="0"/>
           </a:p>
@@ -3583,74 +3480,90 @@
           <a:lstStyle/>
           <a:p>
             <a:r>
-              <a:rPr lang="en-US" dirty="0" smtClean="0"/>
+              <a:rPr lang="en-US" smtClean="0"/>
               <a:t>Presentation Title (Edit in File &gt; 'Page Setup')</a:t>
             </a:r>
             <a:endParaRPr lang="en-US" dirty="0"/>
           </a:p>
         </p:txBody>
       </p:sp>
-      <p:sp>
-        <p:nvSpPr>
-          <p:cNvPr id="4" name="Text Placeholder 3"/>
-          <p:cNvSpPr>
-            <a:spLocks noGrp="1"/>
-          </p:cNvSpPr>
-          <p:nvPr>
-            <p:ph type="body" sz="quarter" idx="14"/>
-          </p:nvPr>
-        </p:nvSpPr>
-        <p:spPr/>
-        <p:txBody>
-          <a:bodyPr/>
-          <a:lstStyle/>
-          <a:p>
-            <a:r>
-              <a:rPr lang="en-US" dirty="0" smtClean="0"/>
-              <a:t>Reduced moment of inertia tensor</a:t>
-            </a:r>
-          </a:p>
-          <a:p>
-            <a:pPr lvl="1"/>
-            <a:r>
-              <a:rPr lang="en-US" dirty="0" smtClean="0"/>
-              <a:t>Text</a:t>
-            </a:r>
-          </a:p>
-          <a:p>
-            <a:pPr lvl="2"/>
-            <a:r>
-              <a:rPr lang="en-US" dirty="0" smtClean="0"/>
-              <a:t>Bullet 1</a:t>
-            </a:r>
-          </a:p>
-          <a:p>
-            <a:pPr lvl="3"/>
-            <a:r>
-              <a:rPr lang="en-US" dirty="0" smtClean="0"/>
-              <a:t>Bullet 2</a:t>
-            </a:r>
-          </a:p>
-          <a:p>
-            <a:pPr lvl="4"/>
-            <a:r>
-              <a:rPr lang="en-US" dirty="0" smtClean="0"/>
-              <a:t>Bullet 3</a:t>
-            </a:r>
-            <a:endParaRPr lang="en-US" dirty="0"/>
-          </a:p>
-        </p:txBody>
-      </p:sp>
+      <p:pic>
+        <p:nvPicPr>
+          <p:cNvPr id="6" name="Picture 5" descr="DMDenEllipxy.png"/>
+          <p:cNvPicPr>
+            <a:picLocks noChangeAspect="1"/>
+          </p:cNvPicPr>
+          <p:nvPr/>
+        </p:nvPicPr>
+        <p:blipFill>
+          <a:blip r:embed="rId2">
+            <a:extLst>
+              <a:ext uri="{28A0092B-C50C-407E-A947-70E740481C1C}">
+                <a14:useLocalDpi xmlns:a14="http://schemas.microsoft.com/office/drawing/2010/main" val="0"/>
+              </a:ext>
+            </a:extLst>
+          </a:blip>
+          <a:stretch>
+            <a:fillRect/>
+          </a:stretch>
+        </p:blipFill>
+        <p:spPr>
+          <a:xfrm>
+            <a:off x="0" y="1018330"/>
+            <a:ext cx="5402500" cy="5153153"/>
+          </a:xfrm>
+          <a:prstGeom prst="rect">
+            <a:avLst/>
+          </a:prstGeom>
+        </p:spPr>
+      </p:pic>
+      <p:pic>
+        <p:nvPicPr>
+          <p:cNvPr id="7" name="Picture 6" descr="GasDenEllipxy.png"/>
+          <p:cNvPicPr>
+            <a:picLocks noChangeAspect="1"/>
+          </p:cNvPicPr>
+          <p:nvPr/>
+        </p:nvPicPr>
+        <p:blipFill>
+          <a:blip r:embed="rId3">
+            <a:extLst>
+              <a:ext uri="{28A0092B-C50C-407E-A947-70E740481C1C}">
+                <a14:useLocalDpi xmlns:a14="http://schemas.microsoft.com/office/drawing/2010/main" val="0"/>
+              </a:ext>
+            </a:extLst>
+          </a:blip>
+          <a:stretch>
+            <a:fillRect/>
+          </a:stretch>
+        </p:blipFill>
+        <p:spPr>
+          <a:xfrm>
+            <a:off x="4370936" y="1018330"/>
+            <a:ext cx="5402500" cy="5153154"/>
+          </a:xfrm>
+          <a:prstGeom prst="rect">
+            <a:avLst/>
+          </a:prstGeom>
+        </p:spPr>
+      </p:pic>
     </p:spTree>
     <p:extLst>
       <p:ext uri="{BB962C8B-B14F-4D97-AF65-F5344CB8AC3E}">
-        <p14:creationId xmlns:p14="http://schemas.microsoft.com/office/powerpoint/2010/main" val="3723072916"/>
+        <p14:creationId xmlns:p14="http://schemas.microsoft.com/office/powerpoint/2010/main" val="2194668825"/>
       </p:ext>
     </p:extLst>
   </p:cSld>
   <p:clrMapOvr>
     <a:masterClrMapping/>
   </p:clrMapOvr>
+  <p:timing>
+    <p:tnLst>
+      <p:par>
+        <p:cTn xmlns:p14="http://schemas.microsoft.com/office/powerpoint/2010/main" id="1" dur="indefinite" restart="never" nodeType="tmRoot"/>
+      </p:par>
+    </p:tnLst>
+  </p:timing>
 </p:sld>
 </file>
 
@@ -3690,7 +3603,7 @@
           <a:p>
             <a:r>
               <a:rPr lang="en-US" dirty="0" smtClean="0"/>
-              <a:t>Halo Shape Properties</a:t>
+              <a:t>Extracting the Cosmic Web</a:t>
             </a:r>
             <a:endParaRPr lang="en-US" dirty="0"/>
           </a:p>
@@ -3712,7 +3625,7 @@
           <a:lstStyle/>
           <a:p>
             <a:r>
-              <a:rPr lang="en-US" dirty="0" smtClean="0"/>
+              <a:rPr lang="en-US" smtClean="0"/>
               <a:t>Presentation Title (Edit in File &gt; 'Page Setup')</a:t>
             </a:r>
             <a:endParaRPr lang="en-US" dirty="0"/>
@@ -3735,32 +3648,23 @@
           <a:lstStyle/>
           <a:p>
             <a:r>
+              <a:rPr lang="en-US" dirty="0" smtClean="0"/>
+              <a:t>Discrete Persistent Source Extractor (</a:t>
+            </a:r>
+            <a:r>
               <a:rPr lang="en-US" dirty="0" err="1" smtClean="0"/>
-              <a:t>Sphericity</a:t>
-            </a:r>
-            <a:r>
-              <a:rPr lang="en-US" dirty="0" smtClean="0"/>
-              <a:t>, </a:t>
-            </a:r>
-            <a:r>
-              <a:rPr lang="en-US" dirty="0" err="1" smtClean="0"/>
-              <a:t>Triaxiality</a:t>
-            </a:r>
-            <a:r>
-              <a:rPr lang="en-US" dirty="0" smtClean="0"/>
-              <a:t> and </a:t>
-            </a:r>
-            <a:r>
-              <a:rPr lang="en-US" dirty="0" err="1" smtClean="0"/>
-              <a:t>Ellipticity</a:t>
-            </a:r>
-            <a:endParaRPr lang="en-US" dirty="0" smtClean="0"/>
+              <a:t>DisPerSe</a:t>
+            </a:r>
+            <a:r>
+              <a:rPr lang="en-US" dirty="0" smtClean="0"/>
+              <a:t>)</a:t>
+            </a:r>
           </a:p>
           <a:p>
             <a:pPr lvl="1"/>
             <a:r>
               <a:rPr lang="en-US" dirty="0" smtClean="0"/>
-              <a:t>Differences between these properties?</a:t>
+              <a:t>Text</a:t>
             </a:r>
           </a:p>
           <a:p>
@@ -3790,13 +3694,20 @@
     </p:spTree>
     <p:extLst>
       <p:ext uri="{BB962C8B-B14F-4D97-AF65-F5344CB8AC3E}">
-        <p14:creationId xmlns:p14="http://schemas.microsoft.com/office/powerpoint/2010/main" val="136223336"/>
+        <p14:creationId xmlns:p14="http://schemas.microsoft.com/office/powerpoint/2010/main" val="3723072916"/>
       </p:ext>
     </p:extLst>
   </p:cSld>
   <p:clrMapOvr>
     <a:masterClrMapping/>
   </p:clrMapOvr>
+  <p:timing>
+    <p:tnLst>
+      <p:par>
+        <p:cTn xmlns:p14="http://schemas.microsoft.com/office/powerpoint/2010/main" id="1" dur="indefinite" restart="never" nodeType="tmRoot"/>
+      </p:par>
+    </p:tnLst>
+  </p:timing>
 </p:sld>
 </file>
 
@@ -3836,7 +3747,7 @@
           <a:p>
             <a:r>
               <a:rPr lang="en-US" dirty="0" smtClean="0"/>
-              <a:t>Results</a:t>
+              <a:t>Defining Filament Structure</a:t>
             </a:r>
             <a:endParaRPr lang="en-US" dirty="0"/>
           </a:p>
@@ -3882,70 +3793,57 @@
           <a:p>
             <a:r>
               <a:rPr lang="en-US" dirty="0" smtClean="0"/>
-              <a:t>What do the shape characteristics at different radii say about large-scale structure formation?</a:t>
+              <a:t>(Pictures of filament directions for different radii)</a:t>
+            </a:r>
+          </a:p>
+          <a:p>
+            <a:pPr lvl="1"/>
+            <a:r>
+              <a:rPr lang="en-US" dirty="0" smtClean="0"/>
+              <a:t>Text</a:t>
             </a:r>
           </a:p>
           <a:p>
             <a:pPr lvl="2"/>
             <a:r>
               <a:rPr lang="en-US" dirty="0" smtClean="0"/>
-              <a:t>Strongly influenced by large mergers (e.g. in </a:t>
-            </a:r>
-            <a:r>
-              <a:rPr lang="en-US" dirty="0" err="1" smtClean="0"/>
-              <a:t>nIFTy</a:t>
-            </a:r>
-            <a:r>
-              <a:rPr lang="en-US" dirty="0" smtClean="0"/>
-              <a:t> cluster picture)</a:t>
+              <a:t>Bullet 1</a:t>
+            </a:r>
+          </a:p>
+          <a:p>
+            <a:pPr lvl="3"/>
+            <a:r>
+              <a:rPr lang="en-US" dirty="0" smtClean="0"/>
+              <a:t>Bullet 2</a:t>
             </a:r>
           </a:p>
           <a:p>
             <a:pPr lvl="4"/>
             <a:r>
               <a:rPr lang="en-US" dirty="0" smtClean="0"/>
-              <a:t>Show picture of cluster with circle of radius at same point in dip of </a:t>
-            </a:r>
-            <a:r>
-              <a:rPr lang="en-US" dirty="0" err="1" smtClean="0"/>
-              <a:t>sphericity</a:t>
-            </a:r>
-            <a:r>
-              <a:rPr lang="en-US" dirty="0" smtClean="0"/>
-              <a:t>/</a:t>
-            </a:r>
-            <a:r>
-              <a:rPr lang="en-US" dirty="0" err="1" smtClean="0"/>
-              <a:t>ellipticity</a:t>
-            </a:r>
-            <a:r>
-              <a:rPr lang="en-US" dirty="0" smtClean="0"/>
-              <a:t> (whichever shows it the most)</a:t>
-            </a:r>
-          </a:p>
-          <a:p>
-            <a:pPr lvl="4"/>
-            <a:r>
-              <a:rPr lang="en-US" dirty="0" err="1" smtClean="0"/>
-              <a:t>Ellipticity</a:t>
-            </a:r>
-            <a:r>
-              <a:rPr lang="en-US" dirty="0" smtClean="0"/>
-              <a:t> plots with dip</a:t>
-            </a:r>
+              <a:t>Bullet 3</a:t>
+            </a:r>
+            <a:endParaRPr lang="en-US" dirty="0"/>
           </a:p>
         </p:txBody>
       </p:sp>
     </p:spTree>
     <p:extLst>
       <p:ext uri="{BB962C8B-B14F-4D97-AF65-F5344CB8AC3E}">
-        <p14:creationId xmlns:p14="http://schemas.microsoft.com/office/powerpoint/2010/main" val="2194668825"/>
+        <p14:creationId xmlns:p14="http://schemas.microsoft.com/office/powerpoint/2010/main" val="3880460800"/>
       </p:ext>
     </p:extLst>
   </p:cSld>
   <p:clrMapOvr>
     <a:masterClrMapping/>
   </p:clrMapOvr>
+  <p:timing>
+    <p:tnLst>
+      <p:par>
+        <p:cTn xmlns:p14="http://schemas.microsoft.com/office/powerpoint/2010/main" id="1" dur="indefinite" restart="never" nodeType="tmRoot"/>
+      </p:par>
+    </p:tnLst>
+  </p:timing>
 </p:sld>
 </file>
 
@@ -3984,8 +3882,12 @@
           <a:lstStyle/>
           <a:p>
             <a:r>
-              <a:rPr lang="en-US" dirty="0" smtClean="0"/>
-              <a:t>Extracting the Cosmic Web</a:t>
+              <a:rPr lang="en-US" dirty="0" err="1" smtClean="0"/>
+              <a:t>Examing</a:t>
+            </a:r>
+            <a:r>
+              <a:rPr lang="en-US" dirty="0" smtClean="0"/>
+              <a:t> Correlations</a:t>
             </a:r>
             <a:endParaRPr lang="en-US" dirty="0"/>
           </a:p>
@@ -4007,7 +3909,7 @@
           <a:lstStyle/>
           <a:p>
             <a:r>
-              <a:rPr lang="en-US" smtClean="0"/>
+              <a:rPr lang="en-US" dirty="0" smtClean="0"/>
               <a:t>Presentation Title (Edit in File &gt; 'Page Setup')</a:t>
             </a:r>
             <a:endParaRPr lang="en-US" dirty="0"/>
@@ -4031,22 +3933,14 @@
           <a:p>
             <a:r>
               <a:rPr lang="en-US" dirty="0" smtClean="0"/>
-              <a:t>Discrete Persistent Source Extractor (</a:t>
-            </a:r>
-            <a:r>
-              <a:rPr lang="en-US" dirty="0" err="1" smtClean="0"/>
-              <a:t>DisPerSe</a:t>
-            </a:r>
-            <a:r>
-              <a:rPr lang="en-US" dirty="0" smtClean="0"/>
-              <a:t>)</a:t>
+              <a:t>Plotting angle between the major axis of the halo and the filament</a:t>
             </a:r>
           </a:p>
           <a:p>
             <a:pPr lvl="1"/>
             <a:r>
               <a:rPr lang="en-US" dirty="0" smtClean="0"/>
-              <a:t>Text</a:t>
+              <a:t>What about the other axes? Did we plot these?</a:t>
             </a:r>
           </a:p>
           <a:p>
@@ -4076,13 +3970,20 @@
     </p:spTree>
     <p:extLst>
       <p:ext uri="{BB962C8B-B14F-4D97-AF65-F5344CB8AC3E}">
-        <p14:creationId xmlns:p14="http://schemas.microsoft.com/office/powerpoint/2010/main" val="3723072916"/>
+        <p14:creationId xmlns:p14="http://schemas.microsoft.com/office/powerpoint/2010/main" val="136223336"/>
       </p:ext>
     </p:extLst>
   </p:cSld>
   <p:clrMapOvr>
     <a:masterClrMapping/>
   </p:clrMapOvr>
+  <p:timing>
+    <p:tnLst>
+      <p:par>
+        <p:cTn xmlns:p14="http://schemas.microsoft.com/office/powerpoint/2010/main" id="1" dur="indefinite" restart="never" nodeType="tmRoot"/>
+      </p:par>
+    </p:tnLst>
+  </p:timing>
 </p:sld>
 </file>
 

</xml_diff>

<commit_message>
Worried the computer will break down - need to change angle to 180 minus (anti-aligned with major axis at the moment
</commit_message>
<xml_diff>
--- a/ICRAR-Black-Powerpoint.pptx
+++ b/ICRAR-Black-Powerpoint.pptx
@@ -5,24 +5,21 @@
     <p:sldMasterId id="2147483648" r:id="rId1"/>
   </p:sldMasterIdLst>
   <p:notesMasterIdLst>
-    <p:notesMasterId r:id="rId14"/>
+    <p:notesMasterId r:id="rId11"/>
   </p:notesMasterIdLst>
   <p:handoutMasterIdLst>
-    <p:handoutMasterId r:id="rId15"/>
+    <p:handoutMasterId r:id="rId12"/>
   </p:handoutMasterIdLst>
   <p:sldIdLst>
     <p:sldId id="256" r:id="rId2"/>
     <p:sldId id="270" r:id="rId3"/>
     <p:sldId id="257" r:id="rId4"/>
     <p:sldId id="259" r:id="rId5"/>
-    <p:sldId id="262" r:id="rId6"/>
-    <p:sldId id="266" r:id="rId7"/>
-    <p:sldId id="260" r:id="rId8"/>
-    <p:sldId id="261" r:id="rId9"/>
-    <p:sldId id="263" r:id="rId10"/>
-    <p:sldId id="264" r:id="rId11"/>
-    <p:sldId id="267" r:id="rId12"/>
-    <p:sldId id="268" r:id="rId13"/>
+    <p:sldId id="266" r:id="rId6"/>
+    <p:sldId id="272" r:id="rId7"/>
+    <p:sldId id="262" r:id="rId8"/>
+    <p:sldId id="263" r:id="rId9"/>
+    <p:sldId id="267" r:id="rId10"/>
   </p:sldIdLst>
   <p:sldSz cx="9144000" cy="6858000" type="screen4x3"/>
   <p:notesSz cx="6858000" cy="9144000"/>
@@ -206,7 +203,7 @@
           <a:p>
             <a:fld id="{CF40E7CB-B090-6140-958A-EAE3EFECA0AB}" type="datetimeFigureOut">
               <a:rPr lang="en-US" smtClean="0"/>
-              <a:t>13/02/17</a:t>
+              <a:t>13/2/17</a:t>
             </a:fld>
             <a:endParaRPr lang="en-US"/>
           </a:p>
@@ -372,7 +369,7 @@
           <a:p>
             <a:fld id="{CC8FA2BA-21CB-AC41-BDFF-8AF1F2C23B5F}" type="datetimeFigureOut">
               <a:rPr lang="en-US" smtClean="0"/>
-              <a:t>13/02/17</a:t>
+              <a:t>13/2/17</a:t>
             </a:fld>
             <a:endParaRPr lang="en-US"/>
           </a:p>
@@ -639,6 +636,90 @@
     </a:lvl9pPr>
   </p:notesStyle>
 </p:notesMaster>
+</file>
+
+<file path=ppt/notesSlides/notesSlide1.xml><?xml version="1.0" encoding="utf-8"?>
+<p:notes xmlns:a="http://schemas.openxmlformats.org/drawingml/2006/main" xmlns:r="http://schemas.openxmlformats.org/officeDocument/2006/relationships" xmlns:p="http://schemas.openxmlformats.org/presentationml/2006/main">
+  <p:cSld>
+    <p:spTree>
+      <p:nvGrpSpPr>
+        <p:cNvPr id="1" name=""/>
+        <p:cNvGrpSpPr/>
+        <p:nvPr/>
+      </p:nvGrpSpPr>
+      <p:grpSpPr>
+        <a:xfrm>
+          <a:off x="0" y="0"/>
+          <a:ext cx="0" cy="0"/>
+          <a:chOff x="0" y="0"/>
+          <a:chExt cx="0" cy="0"/>
+        </a:xfrm>
+      </p:grpSpPr>
+      <p:sp>
+        <p:nvSpPr>
+          <p:cNvPr id="2" name="Slide Image Placeholder 1"/>
+          <p:cNvSpPr>
+            <a:spLocks noGrp="1" noRot="1" noChangeAspect="1"/>
+          </p:cNvSpPr>
+          <p:nvPr>
+            <p:ph type="sldImg"/>
+          </p:nvPr>
+        </p:nvSpPr>
+        <p:spPr/>
+      </p:sp>
+      <p:sp>
+        <p:nvSpPr>
+          <p:cNvPr id="3" name="Notes Placeholder 2"/>
+          <p:cNvSpPr>
+            <a:spLocks noGrp="1"/>
+          </p:cNvSpPr>
+          <p:nvPr>
+            <p:ph type="body" idx="1"/>
+          </p:nvPr>
+        </p:nvSpPr>
+        <p:spPr/>
+        <p:txBody>
+          <a:bodyPr/>
+          <a:lstStyle/>
+          <a:p>
+            <a:endParaRPr lang="en-US" dirty="0"/>
+          </a:p>
+        </p:txBody>
+      </p:sp>
+      <p:sp>
+        <p:nvSpPr>
+          <p:cNvPr id="4" name="Slide Number Placeholder 3"/>
+          <p:cNvSpPr>
+            <a:spLocks noGrp="1"/>
+          </p:cNvSpPr>
+          <p:nvPr>
+            <p:ph type="sldNum" sz="quarter" idx="10"/>
+          </p:nvPr>
+        </p:nvSpPr>
+        <p:spPr/>
+        <p:txBody>
+          <a:bodyPr/>
+          <a:lstStyle/>
+          <a:p>
+            <a:fld id="{3FA75954-64D3-3547-9E41-BA5D253C709A}" type="slidenum">
+              <a:rPr lang="en-US" smtClean="0"/>
+              <a:t>9</a:t>
+            </a:fld>
+            <a:endParaRPr lang="en-US"/>
+          </a:p>
+        </p:txBody>
+      </p:sp>
+    </p:spTree>
+    <p:extLst>
+      <p:ext uri="{BB962C8B-B14F-4D97-AF65-F5344CB8AC3E}">
+        <p14:creationId xmlns:p14="http://schemas.microsoft.com/office/powerpoint/2010/main" val="1659644624"/>
+      </p:ext>
+    </p:extLst>
+  </p:cSld>
+  <p:clrMapOvr>
+    <a:masterClrMapping/>
+  </p:clrMapOvr>
+</p:notes>
 </file>
 
 <file path=ppt/slideLayouts/slideLayout1.xml><?xml version="1.0" encoding="utf-8"?>
@@ -2375,452 +2456,6 @@
 </p:sld>
 </file>
 
-<file path=ppt/slides/slide10.xml><?xml version="1.0" encoding="utf-8"?>
-<p:sld xmlns:a="http://schemas.openxmlformats.org/drawingml/2006/main" xmlns:r="http://schemas.openxmlformats.org/officeDocument/2006/relationships" xmlns:p="http://schemas.openxmlformats.org/presentationml/2006/main">
-  <p:cSld>
-    <p:spTree>
-      <p:nvGrpSpPr>
-        <p:cNvPr id="1" name=""/>
-        <p:cNvGrpSpPr/>
-        <p:nvPr/>
-      </p:nvGrpSpPr>
-      <p:grpSpPr>
-        <a:xfrm>
-          <a:off x="0" y="0"/>
-          <a:ext cx="0" cy="0"/>
-          <a:chOff x="0" y="0"/>
-          <a:chExt cx="0" cy="0"/>
-        </a:xfrm>
-      </p:grpSpPr>
-      <p:sp>
-        <p:nvSpPr>
-          <p:cNvPr id="2" name="Title 1"/>
-          <p:cNvSpPr>
-            <a:spLocks noGrp="1"/>
-          </p:cNvSpPr>
-          <p:nvPr>
-            <p:ph type="title"/>
-          </p:nvPr>
-        </p:nvSpPr>
-        <p:spPr/>
-        <p:txBody>
-          <a:bodyPr>
-            <a:normAutofit fontScale="90000"/>
-          </a:bodyPr>
-          <a:lstStyle/>
-          <a:p>
-            <a:r>
-              <a:rPr lang="en-US" dirty="0" smtClean="0"/>
-              <a:t>Results?</a:t>
-            </a:r>
-            <a:endParaRPr lang="en-US" dirty="0"/>
-          </a:p>
-        </p:txBody>
-      </p:sp>
-      <p:sp>
-        <p:nvSpPr>
-          <p:cNvPr id="3" name="Footer Placeholder 2"/>
-          <p:cNvSpPr>
-            <a:spLocks noGrp="1"/>
-          </p:cNvSpPr>
-          <p:nvPr>
-            <p:ph type="ftr" sz="quarter" idx="10"/>
-          </p:nvPr>
-        </p:nvSpPr>
-        <p:spPr/>
-        <p:txBody>
-          <a:bodyPr/>
-          <a:lstStyle/>
-          <a:p>
-            <a:r>
-              <a:rPr lang="en-US" dirty="0" smtClean="0"/>
-              <a:t>Presentation Title (Edit in File &gt; 'Page Setup')</a:t>
-            </a:r>
-            <a:endParaRPr lang="en-US" dirty="0"/>
-          </a:p>
-        </p:txBody>
-      </p:sp>
-      <p:sp>
-        <p:nvSpPr>
-          <p:cNvPr id="4" name="Text Placeholder 3"/>
-          <p:cNvSpPr>
-            <a:spLocks noGrp="1"/>
-          </p:cNvSpPr>
-          <p:nvPr>
-            <p:ph type="body" sz="quarter" idx="14"/>
-          </p:nvPr>
-        </p:nvSpPr>
-        <p:spPr/>
-        <p:txBody>
-          <a:bodyPr/>
-          <a:lstStyle/>
-          <a:p>
-            <a:r>
-              <a:rPr lang="en-US" dirty="0" smtClean="0"/>
-              <a:t>What did this say about large-scale structure formation?</a:t>
-            </a:r>
-          </a:p>
-          <a:p>
-            <a:pPr lvl="1"/>
-            <a:r>
-              <a:rPr lang="en-US" dirty="0" smtClean="0"/>
-              <a:t>On the level of this single cluster</a:t>
-            </a:r>
-          </a:p>
-          <a:p>
-            <a:pPr lvl="2"/>
-            <a:r>
-              <a:rPr lang="en-US" dirty="0" smtClean="0"/>
-              <a:t>Bullet 1</a:t>
-            </a:r>
-          </a:p>
-          <a:p>
-            <a:pPr lvl="3"/>
-            <a:r>
-              <a:rPr lang="en-US" dirty="0" smtClean="0"/>
-              <a:t>Bullet 2</a:t>
-            </a:r>
-          </a:p>
-          <a:p>
-            <a:pPr lvl="4"/>
-            <a:r>
-              <a:rPr lang="en-US" dirty="0" smtClean="0"/>
-              <a:t>Bullet 3</a:t>
-            </a:r>
-            <a:endParaRPr lang="en-US" dirty="0"/>
-          </a:p>
-        </p:txBody>
-      </p:sp>
-    </p:spTree>
-    <p:extLst>
-      <p:ext uri="{BB962C8B-B14F-4D97-AF65-F5344CB8AC3E}">
-        <p14:creationId xmlns:p14="http://schemas.microsoft.com/office/powerpoint/2010/main" val="346904941"/>
-      </p:ext>
-    </p:extLst>
-  </p:cSld>
-  <p:clrMapOvr>
-    <a:masterClrMapping/>
-  </p:clrMapOvr>
-  <p:timing>
-    <p:tnLst>
-      <p:par>
-        <p:cTn xmlns:p14="http://schemas.microsoft.com/office/powerpoint/2010/main" id="1" dur="indefinite" restart="never" nodeType="tmRoot"/>
-      </p:par>
-    </p:tnLst>
-  </p:timing>
-</p:sld>
-</file>
-
-<file path=ppt/slides/slide11.xml><?xml version="1.0" encoding="utf-8"?>
-<p:sld xmlns:a="http://schemas.openxmlformats.org/drawingml/2006/main" xmlns:r="http://schemas.openxmlformats.org/officeDocument/2006/relationships" xmlns:p="http://schemas.openxmlformats.org/presentationml/2006/main">
-  <p:cSld>
-    <p:spTree>
-      <p:nvGrpSpPr>
-        <p:cNvPr id="1" name=""/>
-        <p:cNvGrpSpPr/>
-        <p:nvPr/>
-      </p:nvGrpSpPr>
-      <p:grpSpPr>
-        <a:xfrm>
-          <a:off x="0" y="0"/>
-          <a:ext cx="0" cy="0"/>
-          <a:chOff x="0" y="0"/>
-          <a:chExt cx="0" cy="0"/>
-        </a:xfrm>
-      </p:grpSpPr>
-      <p:sp>
-        <p:nvSpPr>
-          <p:cNvPr id="2" name="Title 1"/>
-          <p:cNvSpPr>
-            <a:spLocks noGrp="1"/>
-          </p:cNvSpPr>
-          <p:nvPr>
-            <p:ph type="title"/>
-          </p:nvPr>
-        </p:nvSpPr>
-        <p:spPr/>
-        <p:txBody>
-          <a:bodyPr>
-            <a:normAutofit fontScale="90000"/>
-          </a:bodyPr>
-          <a:lstStyle/>
-          <a:p>
-            <a:r>
-              <a:rPr lang="en-US" dirty="0" smtClean="0"/>
-              <a:t>Results?</a:t>
-            </a:r>
-            <a:endParaRPr lang="en-US" dirty="0"/>
-          </a:p>
-        </p:txBody>
-      </p:sp>
-      <p:sp>
-        <p:nvSpPr>
-          <p:cNvPr id="3" name="Footer Placeholder 2"/>
-          <p:cNvSpPr>
-            <a:spLocks noGrp="1"/>
-          </p:cNvSpPr>
-          <p:nvPr>
-            <p:ph type="ftr" sz="quarter" idx="10"/>
-          </p:nvPr>
-        </p:nvSpPr>
-        <p:spPr/>
-        <p:txBody>
-          <a:bodyPr/>
-          <a:lstStyle/>
-          <a:p>
-            <a:r>
-              <a:rPr lang="en-US" dirty="0" smtClean="0"/>
-              <a:t>Presentation Title (Edit in File &gt; 'Page Setup')</a:t>
-            </a:r>
-            <a:endParaRPr lang="en-US" dirty="0"/>
-          </a:p>
-        </p:txBody>
-      </p:sp>
-      <p:sp>
-        <p:nvSpPr>
-          <p:cNvPr id="4" name="Text Placeholder 3"/>
-          <p:cNvSpPr>
-            <a:spLocks noGrp="1"/>
-          </p:cNvSpPr>
-          <p:nvPr>
-            <p:ph type="body" sz="quarter" idx="14"/>
-          </p:nvPr>
-        </p:nvSpPr>
-        <p:spPr/>
-        <p:txBody>
-          <a:bodyPr/>
-          <a:lstStyle/>
-          <a:p>
-            <a:r>
-              <a:rPr lang="en-US" dirty="0" smtClean="0"/>
-              <a:t>What did this say about large-scale structure formation?</a:t>
-            </a:r>
-          </a:p>
-          <a:p>
-            <a:pPr lvl="1"/>
-            <a:r>
-              <a:rPr lang="en-US" dirty="0" smtClean="0"/>
-              <a:t>What could we expect to see in a larger simulation data set (such as Horizon-AGN)?</a:t>
-            </a:r>
-          </a:p>
-          <a:p>
-            <a:pPr lvl="2"/>
-            <a:r>
-              <a:rPr lang="en-US" dirty="0" smtClean="0"/>
-              <a:t>Bullet 1</a:t>
-            </a:r>
-          </a:p>
-          <a:p>
-            <a:pPr lvl="3"/>
-            <a:r>
-              <a:rPr lang="en-US" dirty="0" smtClean="0"/>
-              <a:t>Bullet 2</a:t>
-            </a:r>
-          </a:p>
-          <a:p>
-            <a:pPr lvl="4"/>
-            <a:r>
-              <a:rPr lang="en-US" dirty="0" smtClean="0"/>
-              <a:t>Bullet 3</a:t>
-            </a:r>
-            <a:endParaRPr lang="en-US" dirty="0"/>
-          </a:p>
-        </p:txBody>
-      </p:sp>
-    </p:spTree>
-    <p:extLst>
-      <p:ext uri="{BB962C8B-B14F-4D97-AF65-F5344CB8AC3E}">
-        <p14:creationId xmlns:p14="http://schemas.microsoft.com/office/powerpoint/2010/main" val="2013433585"/>
-      </p:ext>
-    </p:extLst>
-  </p:cSld>
-  <p:clrMapOvr>
-    <a:masterClrMapping/>
-  </p:clrMapOvr>
-  <p:timing>
-    <p:tnLst>
-      <p:par>
-        <p:cTn xmlns:p14="http://schemas.microsoft.com/office/powerpoint/2010/main" id="1" dur="indefinite" restart="never" nodeType="tmRoot"/>
-      </p:par>
-    </p:tnLst>
-  </p:timing>
-</p:sld>
-</file>
-
-<file path=ppt/slides/slide12.xml><?xml version="1.0" encoding="utf-8"?>
-<p:sld xmlns:a="http://schemas.openxmlformats.org/drawingml/2006/main" xmlns:r="http://schemas.openxmlformats.org/officeDocument/2006/relationships" xmlns:p="http://schemas.openxmlformats.org/presentationml/2006/main">
-  <p:cSld>
-    <p:spTree>
-      <p:nvGrpSpPr>
-        <p:cNvPr id="1" name=""/>
-        <p:cNvGrpSpPr/>
-        <p:nvPr/>
-      </p:nvGrpSpPr>
-      <p:grpSpPr>
-        <a:xfrm>
-          <a:off x="0" y="0"/>
-          <a:ext cx="0" cy="0"/>
-          <a:chOff x="0" y="0"/>
-          <a:chExt cx="0" cy="0"/>
-        </a:xfrm>
-      </p:grpSpPr>
-      <p:sp>
-        <p:nvSpPr>
-          <p:cNvPr id="2" name="Title 1"/>
-          <p:cNvSpPr>
-            <a:spLocks noGrp="1"/>
-          </p:cNvSpPr>
-          <p:nvPr>
-            <p:ph type="title"/>
-          </p:nvPr>
-        </p:nvSpPr>
-        <p:spPr/>
-        <p:txBody>
-          <a:bodyPr>
-            <a:normAutofit fontScale="90000"/>
-          </a:bodyPr>
-          <a:lstStyle/>
-          <a:p>
-            <a:r>
-              <a:rPr lang="en-US" dirty="0" smtClean="0"/>
-              <a:t>Acknowledgments</a:t>
-            </a:r>
-            <a:endParaRPr lang="en-US" dirty="0"/>
-          </a:p>
-        </p:txBody>
-      </p:sp>
-      <p:sp>
-        <p:nvSpPr>
-          <p:cNvPr id="3" name="Footer Placeholder 2"/>
-          <p:cNvSpPr>
-            <a:spLocks noGrp="1"/>
-          </p:cNvSpPr>
-          <p:nvPr>
-            <p:ph type="ftr" sz="quarter" idx="10"/>
-          </p:nvPr>
-        </p:nvSpPr>
-        <p:spPr/>
-        <p:txBody>
-          <a:bodyPr/>
-          <a:lstStyle/>
-          <a:p>
-            <a:r>
-              <a:rPr lang="en-US" dirty="0" smtClean="0"/>
-              <a:t>Presentation Title (Edit in File &gt; 'Page Setup')</a:t>
-            </a:r>
-            <a:endParaRPr lang="en-US" dirty="0"/>
-          </a:p>
-        </p:txBody>
-      </p:sp>
-      <p:sp>
-        <p:nvSpPr>
-          <p:cNvPr id="4" name="Text Placeholder 3"/>
-          <p:cNvSpPr>
-            <a:spLocks noGrp="1"/>
-          </p:cNvSpPr>
-          <p:nvPr>
-            <p:ph type="body" sz="quarter" idx="14"/>
-          </p:nvPr>
-        </p:nvSpPr>
-        <p:spPr/>
-        <p:txBody>
-          <a:bodyPr/>
-          <a:lstStyle/>
-          <a:p>
-            <a:r>
-              <a:rPr lang="en-US" dirty="0" smtClean="0"/>
-              <a:t>Thank you to both supervisors at ICRAR (</a:t>
-            </a:r>
-            <a:r>
-              <a:rPr lang="en-US" dirty="0" err="1" smtClean="0"/>
-              <a:t>Dr</a:t>
-            </a:r>
-            <a:r>
-              <a:rPr lang="en-US" dirty="0" smtClean="0"/>
-              <a:t> Chris Power and </a:t>
-            </a:r>
-            <a:r>
-              <a:rPr lang="en-US" dirty="0" err="1" smtClean="0"/>
-              <a:t>Dr</a:t>
-            </a:r>
-            <a:r>
-              <a:rPr lang="en-US" dirty="0" smtClean="0"/>
-              <a:t> Charlotte Welker)</a:t>
-            </a:r>
-          </a:p>
-          <a:p>
-            <a:r>
-              <a:rPr lang="en-US" dirty="0" smtClean="0"/>
-              <a:t>Thank you to Chris </a:t>
-            </a:r>
-            <a:r>
-              <a:rPr lang="en-US" dirty="0" err="1" smtClean="0"/>
-              <a:t>Bording</a:t>
-            </a:r>
-            <a:r>
-              <a:rPr lang="en-US" dirty="0" smtClean="0"/>
-              <a:t> at </a:t>
-            </a:r>
-            <a:r>
-              <a:rPr lang="en-US" dirty="0" err="1" smtClean="0"/>
-              <a:t>Pawsey</a:t>
-            </a:r>
-            <a:r>
-              <a:rPr lang="en-US" dirty="0" smtClean="0"/>
-              <a:t> Supercomputing Centre</a:t>
-            </a:r>
-          </a:p>
-          <a:p>
-            <a:pPr lvl="1"/>
-            <a:r>
-              <a:rPr lang="en-US" dirty="0" smtClean="0"/>
-              <a:t>Text</a:t>
-            </a:r>
-          </a:p>
-          <a:p>
-            <a:pPr lvl="2"/>
-            <a:r>
-              <a:rPr lang="en-US" dirty="0" smtClean="0"/>
-              <a:t>Bullet 1</a:t>
-            </a:r>
-          </a:p>
-          <a:p>
-            <a:pPr lvl="3"/>
-            <a:r>
-              <a:rPr lang="en-US" dirty="0" smtClean="0"/>
-              <a:t>Bullet 2</a:t>
-            </a:r>
-          </a:p>
-          <a:p>
-            <a:pPr lvl="4"/>
-            <a:r>
-              <a:rPr lang="en-US" dirty="0" smtClean="0"/>
-              <a:t>Bullet 3</a:t>
-            </a:r>
-            <a:endParaRPr lang="en-US" dirty="0"/>
-          </a:p>
-        </p:txBody>
-      </p:sp>
-    </p:spTree>
-    <p:extLst>
-      <p:ext uri="{BB962C8B-B14F-4D97-AF65-F5344CB8AC3E}">
-        <p14:creationId xmlns:p14="http://schemas.microsoft.com/office/powerpoint/2010/main" val="2013433585"/>
-      </p:ext>
-    </p:extLst>
-  </p:cSld>
-  <p:clrMapOvr>
-    <a:masterClrMapping/>
-  </p:clrMapOvr>
-  <p:timing>
-    <p:tnLst>
-      <p:par>
-        <p:cTn xmlns:p14="http://schemas.microsoft.com/office/powerpoint/2010/main" id="1" dur="indefinite" restart="never" nodeType="tmRoot"/>
-      </p:par>
-    </p:tnLst>
-  </p:timing>
-</p:sld>
-</file>
-
 <file path=ppt/slides/slide2.xml><?xml version="1.0" encoding="utf-8"?>
 <p:sld xmlns:a="http://schemas.openxmlformats.org/drawingml/2006/main" xmlns:r="http://schemas.openxmlformats.org/officeDocument/2006/relationships" xmlns:p="http://schemas.openxmlformats.org/presentationml/2006/main">
   <p:cSld>
@@ -3039,31 +2674,14 @@
           <a:p>
             <a:r>
               <a:rPr lang="en-US" dirty="0" smtClean="0"/>
-              <a:t>Why look at large-scale structure alignment</a:t>
-            </a:r>
+              <a:t>Why look at large-scale structure alignment?</a:t>
+            </a:r>
+          </a:p>
+          <a:p>
+            <a:pPr lvl="2"/>
             <a:r>
               <a:rPr lang="en-US" dirty="0" smtClean="0"/>
-              <a:t>?</a:t>
-            </a:r>
-            <a:endParaRPr lang="en-US" dirty="0" smtClean="0"/>
-          </a:p>
-          <a:p>
-            <a:pPr lvl="2"/>
-            <a:r>
-              <a:rPr lang="en-US" dirty="0" smtClean="0"/>
-              <a:t>Simulations </a:t>
-            </a:r>
-            <a:r>
-              <a:rPr lang="en-US" dirty="0" smtClean="0"/>
-              <a:t>can predict mass distributions and much more, but what we are </a:t>
-            </a:r>
-            <a:r>
-              <a:rPr lang="en-US" dirty="0" smtClean="0"/>
-              <a:t>most capable </a:t>
-            </a:r>
-            <a:r>
-              <a:rPr lang="en-US" dirty="0" smtClean="0"/>
-              <a:t>of observing is galaxies</a:t>
+              <a:t>Simulations can predict mass distributions and much more, but what we are most capable of observing is galaxies</a:t>
             </a:r>
           </a:p>
           <a:p>
@@ -3079,7 +2697,6 @@
               <a:rPr lang="en-US" dirty="0" smtClean="0"/>
               <a:t>However perhaps the stellar halo can?</a:t>
             </a:r>
-            <a:endParaRPr lang="en-US" dirty="0" smtClean="0"/>
           </a:p>
         </p:txBody>
       </p:sp>
@@ -3215,11 +2832,7 @@
           <a:p>
             <a:r>
               <a:rPr lang="en-US" dirty="0" smtClean="0"/>
-              <a:t>Reduced moment of inertia </a:t>
-            </a:r>
-            <a:r>
-              <a:rPr lang="en-US" dirty="0" smtClean="0"/>
-              <a:t>tensor</a:t>
+              <a:t>Reduced moment of inertia tensor</a:t>
             </a:r>
             <a:endParaRPr lang="en-US" dirty="0"/>
           </a:p>
@@ -3270,6 +2883,36 @@
           </a:p>
         </p:txBody>
       </p:sp>
+      <p:pic>
+        <p:nvPicPr>
+          <p:cNvPr id="5" name="Picture 4" descr="Screen Shot 2017-02-13 at 9.32.47 pm.png"/>
+          <p:cNvPicPr>
+            <a:picLocks noChangeAspect="1"/>
+          </p:cNvPicPr>
+          <p:nvPr/>
+        </p:nvPicPr>
+        <p:blipFill>
+          <a:blip r:embed="rId2">
+            <a:extLst>
+              <a:ext uri="{28A0092B-C50C-407E-A947-70E740481C1C}">
+                <a14:useLocalDpi xmlns:a14="http://schemas.microsoft.com/office/drawing/2010/main" val="0"/>
+              </a:ext>
+            </a:extLst>
+          </a:blip>
+          <a:stretch>
+            <a:fillRect/>
+          </a:stretch>
+        </p:blipFill>
+        <p:spPr>
+          <a:xfrm>
+            <a:off x="1487434" y="4019955"/>
+            <a:ext cx="6254318" cy="1302352"/>
+          </a:xfrm>
+          <a:prstGeom prst="rect">
+            <a:avLst/>
+          </a:prstGeom>
+        </p:spPr>
+      </p:pic>
     </p:spTree>
     <p:extLst>
       <p:ext uri="{BB962C8B-B14F-4D97-AF65-F5344CB8AC3E}">
@@ -3280,6 +2923,13 @@
   <p:clrMapOvr>
     <a:masterClrMapping/>
   </p:clrMapOvr>
+  <p:timing>
+    <p:tnLst>
+      <p:par>
+        <p:cTn xmlns:p14="http://schemas.microsoft.com/office/powerpoint/2010/main" id="1" dur="indefinite" restart="never" nodeType="tmRoot"/>
+      </p:par>
+    </p:tnLst>
+  </p:timing>
 </p:sld>
 </file>
 
@@ -3302,7 +2952,90 @@
       </p:grpSpPr>
       <p:sp>
         <p:nvSpPr>
-          <p:cNvPr id="2" name="Title 1"/>
+          <p:cNvPr id="3" name="Footer Placeholder 2"/>
+          <p:cNvSpPr>
+            <a:spLocks noGrp="1"/>
+          </p:cNvSpPr>
+          <p:nvPr>
+            <p:ph type="ftr" sz="quarter" idx="10"/>
+          </p:nvPr>
+        </p:nvSpPr>
+        <p:spPr/>
+        <p:txBody>
+          <a:bodyPr/>
+          <a:lstStyle/>
+          <a:p>
+            <a:r>
+              <a:rPr lang="en-US" smtClean="0"/>
+              <a:t>Presentation Title (Edit in File &gt; 'Page Setup')</a:t>
+            </a:r>
+            <a:endParaRPr lang="en-US" dirty="0"/>
+          </a:p>
+        </p:txBody>
+      </p:sp>
+      <p:pic>
+        <p:nvPicPr>
+          <p:cNvPr id="6" name="Picture 5" descr="DMDenEllipxy.png"/>
+          <p:cNvPicPr>
+            <a:picLocks noChangeAspect="1"/>
+          </p:cNvPicPr>
+          <p:nvPr/>
+        </p:nvPicPr>
+        <p:blipFill>
+          <a:blip r:embed="rId2">
+            <a:extLst>
+              <a:ext uri="{28A0092B-C50C-407E-A947-70E740481C1C}">
+                <a14:useLocalDpi xmlns:a14="http://schemas.microsoft.com/office/drawing/2010/main" val="0"/>
+              </a:ext>
+            </a:extLst>
+          </a:blip>
+          <a:stretch>
+            <a:fillRect/>
+          </a:stretch>
+        </p:blipFill>
+        <p:spPr>
+          <a:xfrm>
+            <a:off x="213907" y="1332248"/>
+            <a:ext cx="4318276" cy="4118970"/>
+          </a:xfrm>
+          <a:prstGeom prst="rect">
+            <a:avLst/>
+          </a:prstGeom>
+        </p:spPr>
+      </p:pic>
+      <p:pic>
+        <p:nvPicPr>
+          <p:cNvPr id="7" name="Picture 6" descr="GasDenEllipxy.png"/>
+          <p:cNvPicPr>
+            <a:picLocks noChangeAspect="1"/>
+          </p:cNvPicPr>
+          <p:nvPr/>
+        </p:nvPicPr>
+        <p:blipFill>
+          <a:blip r:embed="rId3">
+            <a:extLst>
+              <a:ext uri="{28A0092B-C50C-407E-A947-70E740481C1C}">
+                <a14:useLocalDpi xmlns:a14="http://schemas.microsoft.com/office/drawing/2010/main" val="0"/>
+              </a:ext>
+            </a:extLst>
+          </a:blip>
+          <a:stretch>
+            <a:fillRect/>
+          </a:stretch>
+        </p:blipFill>
+        <p:spPr>
+          <a:xfrm>
+            <a:off x="4646349" y="1332246"/>
+            <a:ext cx="4318277" cy="4118972"/>
+          </a:xfrm>
+          <a:prstGeom prst="rect">
+            <a:avLst/>
+          </a:prstGeom>
+        </p:spPr>
+      </p:pic>
+      <p:sp>
+        <p:nvSpPr>
+          <p:cNvPr id="9" name="Title 1"/>
           <p:cNvSpPr>
             <a:spLocks noGrp="1"/>
           </p:cNvSpPr>
@@ -3310,102 +3043,30 @@
             <p:ph type="title"/>
           </p:nvPr>
         </p:nvSpPr>
-        <p:spPr/>
+        <p:spPr>
+          <a:xfrm>
+            <a:off x="1249680" y="132080"/>
+            <a:ext cx="7670800" cy="650240"/>
+          </a:xfrm>
+        </p:spPr>
         <p:txBody>
           <a:bodyPr>
-            <a:normAutofit fontScale="90000"/>
+            <a:normAutofit/>
           </a:bodyPr>
           <a:lstStyle/>
           <a:p>
             <a:r>
-              <a:rPr lang="en-US" dirty="0" smtClean="0"/>
-              <a:t>Large-scale structure </a:t>
-            </a:r>
-            <a:endParaRPr lang="en-US" dirty="0"/>
-          </a:p>
-        </p:txBody>
-      </p:sp>
-      <p:sp>
-        <p:nvSpPr>
-          <p:cNvPr id="3" name="Footer Placeholder 2"/>
-          <p:cNvSpPr>
-            <a:spLocks noGrp="1"/>
-          </p:cNvSpPr>
-          <p:nvPr>
-            <p:ph type="ftr" sz="quarter" idx="10"/>
-          </p:nvPr>
-        </p:nvSpPr>
-        <p:spPr/>
-        <p:txBody>
-          <a:bodyPr/>
-          <a:lstStyle/>
-          <a:p>
-            <a:r>
-              <a:rPr lang="en-US" dirty="0" smtClean="0"/>
-              <a:t>Presentation Title (Edit in File &gt; 'Page Setup')</a:t>
-            </a:r>
-            <a:endParaRPr lang="en-US" dirty="0"/>
-          </a:p>
-        </p:txBody>
-      </p:sp>
-      <p:sp>
-        <p:nvSpPr>
-          <p:cNvPr id="4" name="Text Placeholder 3"/>
-          <p:cNvSpPr>
-            <a:spLocks noGrp="1"/>
-          </p:cNvSpPr>
-          <p:nvPr>
-            <p:ph type="body" sz="quarter" idx="14"/>
-          </p:nvPr>
-        </p:nvSpPr>
-        <p:spPr/>
-        <p:txBody>
-          <a:bodyPr/>
-          <a:lstStyle/>
-          <a:p>
-            <a:r>
-              <a:rPr lang="en-US" dirty="0" smtClean="0"/>
-              <a:t>Discrete Persistent Source Extractor (</a:t>
-            </a:r>
-            <a:r>
-              <a:rPr lang="en-US" dirty="0" err="1" smtClean="0"/>
-              <a:t>DisPerSe</a:t>
-            </a:r>
-            <a:r>
-              <a:rPr lang="en-US" dirty="0" smtClean="0"/>
-              <a:t>)</a:t>
-            </a:r>
-            <a:endParaRPr lang="en-US" dirty="0" smtClean="0"/>
-          </a:p>
-          <a:p>
-            <a:pPr lvl="2"/>
-            <a:r>
-              <a:rPr lang="en-US" dirty="0" smtClean="0"/>
-              <a:t>Extracts filamentary skeleton from grid values through computation of the Morse-</a:t>
-            </a:r>
-            <a:r>
-              <a:rPr lang="en-US" dirty="0" err="1" smtClean="0"/>
-              <a:t>Smale</a:t>
-            </a:r>
-            <a:r>
-              <a:rPr lang="en-US" dirty="0" smtClean="0"/>
-              <a:t> complex</a:t>
-            </a:r>
-          </a:p>
-          <a:p>
-            <a:pPr lvl="2"/>
-            <a:r>
-              <a:rPr lang="en-US" dirty="0" smtClean="0"/>
-              <a:t>Calculated up to a certain persistence level, allowing for removal of noise</a:t>
-            </a:r>
-            <a:endParaRPr lang="en-US" dirty="0"/>
+              <a:rPr lang="en-US" sz="3000" dirty="0" smtClean="0"/>
+              <a:t>Projection of moment of inertia ellipsoids</a:t>
+            </a:r>
+            <a:endParaRPr lang="en-US" sz="3000" dirty="0"/>
           </a:p>
         </p:txBody>
       </p:sp>
     </p:spTree>
     <p:extLst>
       <p:ext uri="{BB962C8B-B14F-4D97-AF65-F5344CB8AC3E}">
-        <p14:creationId xmlns:p14="http://schemas.microsoft.com/office/powerpoint/2010/main" val="136223336"/>
+        <p14:creationId xmlns:p14="http://schemas.microsoft.com/office/powerpoint/2010/main" val="2194668825"/>
       </p:ext>
     </p:extLst>
   </p:cSld>
@@ -3449,7 +3110,12 @@
             <p:ph type="title"/>
           </p:nvPr>
         </p:nvSpPr>
-        <p:spPr/>
+        <p:spPr>
+          <a:xfrm>
+            <a:off x="4998904" y="132080"/>
+            <a:ext cx="3921576" cy="650240"/>
+          </a:xfrm>
+        </p:spPr>
         <p:txBody>
           <a:bodyPr>
             <a:normAutofit fontScale="90000"/>
@@ -3457,10 +3123,14 @@
           <a:lstStyle/>
           <a:p>
             <a:r>
-              <a:rPr lang="en-US" dirty="0" smtClean="0"/>
-              <a:t>Results – 2D projections</a:t>
-            </a:r>
-            <a:endParaRPr lang="en-US" dirty="0"/>
+              <a:rPr lang="en-US" sz="3000" dirty="0" err="1" smtClean="0"/>
+              <a:t>Sphericity</a:t>
+            </a:r>
+            <a:r>
+              <a:rPr lang="en-US" sz="3000" dirty="0" smtClean="0"/>
+              <a:t> and ellipticity</a:t>
+            </a:r>
+            <a:endParaRPr lang="en-US" sz="3000" dirty="0"/>
           </a:p>
         </p:txBody>
       </p:sp>
@@ -3480,8 +3150,8 @@
           <a:lstStyle/>
           <a:p>
             <a:r>
-              <a:rPr lang="en-US" smtClean="0"/>
-              <a:t>Presentation Title (Edit in File &gt; 'Page Setup')</a:t>
+              <a:rPr lang="en-US" dirty="0" smtClean="0"/>
+              <a:t>Presentation Title (Edit in File &gt; 'Page Setup' &gt; ‘Header/footer’)</a:t>
             </a:r>
             <a:endParaRPr lang="en-US" dirty="0"/>
           </a:p>
@@ -3489,7 +3159,7 @@
       </p:sp>
       <p:pic>
         <p:nvPicPr>
-          <p:cNvPr id="6" name="Picture 5" descr="DMDenEllipxy.png"/>
+          <p:cNvPr id="5" name="Picture 4" descr="Screen Shot 2017-02-13 at 3.18.10 pm.png"/>
           <p:cNvPicPr>
             <a:picLocks noChangeAspect="1"/>
           </p:cNvPicPr>
@@ -3509,8 +3179,8 @@
         </p:blipFill>
         <p:spPr>
           <a:xfrm>
-            <a:off x="0" y="1018330"/>
-            <a:ext cx="5402500" cy="5153153"/>
+            <a:off x="4894438" y="1148519"/>
+            <a:ext cx="4026042" cy="3843612"/>
           </a:xfrm>
           <a:prstGeom prst="rect">
             <a:avLst/>
@@ -3519,13 +3189,13 @@
       </p:pic>
       <p:pic>
         <p:nvPicPr>
-          <p:cNvPr id="7" name="Picture 6" descr="GasDenEllipxy.png"/>
+          <p:cNvPr id="6" name="Picture 5" descr="Sphericity.png"/>
           <p:cNvPicPr>
             <a:picLocks noChangeAspect="1"/>
           </p:cNvPicPr>
           <p:nvPr/>
         </p:nvPicPr>
-        <p:blipFill>
+        <p:blipFill rotWithShape="1">
           <a:blip r:embed="rId3">
             <a:extLst>
               <a:ext uri="{28A0092B-C50C-407E-A947-70E740481C1C}">
@@ -3533,24 +3203,108 @@
               </a:ext>
             </a:extLst>
           </a:blip>
-          <a:stretch>
-            <a:fillRect/>
-          </a:stretch>
+          <a:srcRect l="5396" t="3258" r="2073" b="3110"/>
+          <a:stretch/>
         </p:blipFill>
         <p:spPr>
           <a:xfrm>
-            <a:off x="4370936" y="1018330"/>
-            <a:ext cx="5402500" cy="5153154"/>
+            <a:off x="237080" y="132080"/>
+            <a:ext cx="4537276" cy="3120472"/>
           </a:xfrm>
           <a:prstGeom prst="rect">
             <a:avLst/>
           </a:prstGeom>
         </p:spPr>
       </p:pic>
+      <p:pic>
+        <p:nvPicPr>
+          <p:cNvPr id="7" name="Picture 6" descr="Ellipticity.png"/>
+          <p:cNvPicPr>
+            <a:picLocks noChangeAspect="1"/>
+          </p:cNvPicPr>
+          <p:nvPr/>
+        </p:nvPicPr>
+        <p:blipFill rotWithShape="1">
+          <a:blip r:embed="rId4">
+            <a:extLst>
+              <a:ext uri="{28A0092B-C50C-407E-A947-70E740481C1C}">
+                <a14:useLocalDpi xmlns:a14="http://schemas.microsoft.com/office/drawing/2010/main" val="0"/>
+              </a:ext>
+            </a:extLst>
+          </a:blip>
+          <a:srcRect l="5379" t="4107" r="2370" b="3059"/>
+          <a:stretch/>
+        </p:blipFill>
+        <p:spPr>
+          <a:xfrm>
+            <a:off x="264564" y="3344884"/>
+            <a:ext cx="4537277" cy="3320681"/>
+          </a:xfrm>
+          <a:prstGeom prst="rect">
+            <a:avLst/>
+          </a:prstGeom>
+        </p:spPr>
+      </p:pic>
+      <p:sp>
+        <p:nvSpPr>
+          <p:cNvPr id="8" name="TextBox 7"/>
+          <p:cNvSpPr txBox="1"/>
+          <p:nvPr/>
+        </p:nvSpPr>
+        <p:spPr>
+          <a:xfrm>
+            <a:off x="5197818" y="5068393"/>
+            <a:ext cx="2819914" cy="923330"/>
+          </a:xfrm>
+          <a:prstGeom prst="rect">
+            <a:avLst/>
+          </a:prstGeom>
+          <a:noFill/>
+        </p:spPr>
+        <p:txBody>
+          <a:bodyPr wrap="square" rtlCol="0">
+            <a:spAutoFit/>
+          </a:bodyPr>
+          <a:lstStyle/>
+          <a:p>
+            <a:r>
+              <a:rPr lang="en-US" dirty="0" smtClean="0">
+                <a:solidFill>
+                  <a:schemeClr val="bg1"/>
+                </a:solidFill>
+              </a:rPr>
+              <a:t>0.1 Mpc thick slice through </a:t>
+            </a:r>
+            <a:r>
+              <a:rPr lang="en-US" dirty="0" err="1" smtClean="0">
+                <a:solidFill>
+                  <a:schemeClr val="bg1"/>
+                </a:solidFill>
+              </a:rPr>
+              <a:t>xy</a:t>
+            </a:r>
+            <a:r>
+              <a:rPr lang="en-US" dirty="0" smtClean="0">
+                <a:solidFill>
+                  <a:schemeClr val="bg1"/>
+                </a:solidFill>
+              </a:rPr>
+              <a:t> projection for gas density</a:t>
+            </a:r>
+          </a:p>
+          <a:p>
+            <a:endParaRPr lang="en-US" dirty="0">
+              <a:solidFill>
+                <a:schemeClr val="bg1"/>
+              </a:solidFill>
+            </a:endParaRPr>
+          </a:p>
+        </p:txBody>
+      </p:sp>
     </p:spTree>
     <p:extLst>
       <p:ext uri="{BB962C8B-B14F-4D97-AF65-F5344CB8AC3E}">
-        <p14:creationId xmlns:p14="http://schemas.microsoft.com/office/powerpoint/2010/main" val="2194668825"/>
+        <p14:creationId xmlns:p14="http://schemas.microsoft.com/office/powerpoint/2010/main" val="1506306792"/>
       </p:ext>
     </p:extLst>
   </p:cSld>
@@ -3603,7 +3357,7 @@
           <a:p>
             <a:r>
               <a:rPr lang="en-US" dirty="0" smtClean="0"/>
-              <a:t>Extracting the Cosmic Web</a:t>
+              <a:t>Large-scale structure </a:t>
             </a:r>
             <a:endParaRPr lang="en-US" dirty="0"/>
           </a:p>
@@ -3625,7 +3379,7 @@
           <a:lstStyle/>
           <a:p>
             <a:r>
-              <a:rPr lang="en-US" smtClean="0"/>
+              <a:rPr lang="en-US" dirty="0" smtClean="0"/>
               <a:t>Presentation Title (Edit in File &gt; 'Page Setup')</a:t>
             </a:r>
             <a:endParaRPr lang="en-US" dirty="0"/>
@@ -3642,7 +3396,12 @@
             <p:ph type="body" sz="quarter" idx="14"/>
           </p:nvPr>
         </p:nvSpPr>
-        <p:spPr/>
+        <p:spPr>
+          <a:xfrm>
+            <a:off x="246137" y="1158876"/>
+            <a:ext cx="8674026" cy="2422624"/>
+          </a:xfrm>
+        </p:spPr>
         <p:txBody>
           <a:bodyPr/>
           <a:lstStyle/>
@@ -3661,40 +3420,139 @@
             </a:r>
           </a:p>
           <a:p>
-            <a:pPr lvl="1"/>
+            <a:pPr lvl="2"/>
             <a:r>
               <a:rPr lang="en-US" dirty="0" smtClean="0"/>
-              <a:t>Text</a:t>
+              <a:t>Extracts filamentary skeleton from grid values through computation of the Morse-</a:t>
+            </a:r>
+            <a:r>
+              <a:rPr lang="en-US" dirty="0" err="1" smtClean="0"/>
+              <a:t>Smale</a:t>
+            </a:r>
+            <a:r>
+              <a:rPr lang="en-US" dirty="0" smtClean="0"/>
+              <a:t> complex</a:t>
             </a:r>
           </a:p>
           <a:p>
             <a:pPr lvl="2"/>
             <a:r>
               <a:rPr lang="en-US" dirty="0" smtClean="0"/>
-              <a:t>Bullet 1</a:t>
+              <a:t>Calculated up to a certain persistence level, allowing for removal of noise</a:t>
             </a:r>
           </a:p>
           <a:p>
             <a:pPr lvl="3"/>
             <a:r>
               <a:rPr lang="en-US" dirty="0" smtClean="0"/>
-              <a:t>Bullet 2</a:t>
-            </a:r>
-          </a:p>
-          <a:p>
-            <a:pPr lvl="4"/>
+              <a:t>Specified for </a:t>
+            </a:r>
+            <a:r>
+              <a:rPr lang="mr-IN" dirty="0" smtClean="0"/>
+              <a:t>–</a:t>
+            </a:r>
             <a:r>
               <a:rPr lang="en-US" dirty="0" smtClean="0"/>
-              <a:t>Bullet 3</a:t>
+              <a:t>cut = {0.001,0.01,0.1,1}</a:t>
             </a:r>
             <a:endParaRPr lang="en-US" dirty="0"/>
           </a:p>
         </p:txBody>
       </p:sp>
+      <p:pic>
+        <p:nvPicPr>
+          <p:cNvPr id="5" name="Picture 4" descr="Screen Shot 2017-02-13 at 9.19.23 pm.png"/>
+          <p:cNvPicPr>
+            <a:picLocks noChangeAspect="1"/>
+          </p:cNvPicPr>
+          <p:nvPr/>
+        </p:nvPicPr>
+        <p:blipFill>
+          <a:blip r:embed="rId2">
+            <a:extLst>
+              <a:ext uri="{28A0092B-C50C-407E-A947-70E740481C1C}">
+                <a14:useLocalDpi xmlns:a14="http://schemas.microsoft.com/office/drawing/2010/main" val="0"/>
+              </a:ext>
+            </a:extLst>
+          </a:blip>
+          <a:stretch>
+            <a:fillRect/>
+          </a:stretch>
+        </p:blipFill>
+        <p:spPr>
+          <a:xfrm>
+            <a:off x="112542" y="3581500"/>
+            <a:ext cx="3067982" cy="2935698"/>
+          </a:xfrm>
+          <a:prstGeom prst="rect">
+            <a:avLst/>
+          </a:prstGeom>
+        </p:spPr>
+      </p:pic>
+      <p:pic>
+        <p:nvPicPr>
+          <p:cNvPr id="7" name="Picture 6" descr="Screen Shot 2017-02-13 at 9.25.06 pm.png"/>
+          <p:cNvPicPr>
+            <a:picLocks noChangeAspect="1"/>
+          </p:cNvPicPr>
+          <p:nvPr/>
+        </p:nvPicPr>
+        <p:blipFill>
+          <a:blip r:embed="rId3">
+            <a:extLst>
+              <a:ext uri="{28A0092B-C50C-407E-A947-70E740481C1C}">
+                <a14:useLocalDpi xmlns:a14="http://schemas.microsoft.com/office/drawing/2010/main" val="0"/>
+              </a:ext>
+            </a:extLst>
+          </a:blip>
+          <a:stretch>
+            <a:fillRect/>
+          </a:stretch>
+        </p:blipFill>
+        <p:spPr>
+          <a:xfrm>
+            <a:off x="5995305" y="3581500"/>
+            <a:ext cx="3119498" cy="2935698"/>
+          </a:xfrm>
+          <a:prstGeom prst="rect">
+            <a:avLst/>
+          </a:prstGeom>
+        </p:spPr>
+      </p:pic>
+      <p:pic>
+        <p:nvPicPr>
+          <p:cNvPr id="9" name="Picture 8" descr="Screen Shot 2017-02-13 at 9.24.06 pm.png"/>
+          <p:cNvPicPr>
+            <a:picLocks noChangeAspect="1"/>
+          </p:cNvPicPr>
+          <p:nvPr/>
+        </p:nvPicPr>
+        <p:blipFill>
+          <a:blip r:embed="rId4">
+            <a:extLst>
+              <a:ext uri="{28A0092B-C50C-407E-A947-70E740481C1C}">
+                <a14:useLocalDpi xmlns:a14="http://schemas.microsoft.com/office/drawing/2010/main" val="0"/>
+              </a:ext>
+            </a:extLst>
+          </a:blip>
+          <a:stretch>
+            <a:fillRect/>
+          </a:stretch>
+        </p:blipFill>
+        <p:spPr>
+          <a:xfrm>
+            <a:off x="2996894" y="3581500"/>
+            <a:ext cx="3104475" cy="2935698"/>
+          </a:xfrm>
+          <a:prstGeom prst="rect">
+            <a:avLst/>
+          </a:prstGeom>
+        </p:spPr>
+      </p:pic>
     </p:spTree>
     <p:extLst>
       <p:ext uri="{BB962C8B-B14F-4D97-AF65-F5344CB8AC3E}">
-        <p14:creationId xmlns:p14="http://schemas.microsoft.com/office/powerpoint/2010/main" val="3723072916"/>
+        <p14:creationId xmlns:p14="http://schemas.microsoft.com/office/powerpoint/2010/main" val="136223336"/>
       </p:ext>
     </p:extLst>
   </p:cSld>
@@ -3738,18 +3596,27 @@
             <p:ph type="title"/>
           </p:nvPr>
         </p:nvSpPr>
-        <p:spPr/>
+        <p:spPr>
+          <a:xfrm>
+            <a:off x="1105654" y="146928"/>
+            <a:ext cx="7670800" cy="650240"/>
+          </a:xfrm>
+        </p:spPr>
         <p:txBody>
           <a:bodyPr>
-            <a:normAutofit fontScale="90000"/>
+            <a:noAutofit/>
           </a:bodyPr>
           <a:lstStyle/>
           <a:p>
             <a:r>
-              <a:rPr lang="en-US" dirty="0" smtClean="0"/>
-              <a:t>Defining Filament Structure</a:t>
-            </a:r>
-            <a:endParaRPr lang="en-US" dirty="0"/>
+              <a:rPr lang="en-US" sz="3000" dirty="0" smtClean="0"/>
+              <a:t>Alignment between </a:t>
+            </a:r>
+            <a:r>
+              <a:rPr lang="en-US" sz="3000" dirty="0" smtClean="0"/>
+              <a:t>halo axes and filament </a:t>
+            </a:r>
+            <a:endParaRPr lang="en-US" sz="3000" dirty="0"/>
           </a:p>
         </p:txBody>
       </p:sp>
@@ -3769,68 +3636,103 @@
           <a:lstStyle/>
           <a:p>
             <a:r>
-              <a:rPr lang="en-US" smtClean="0"/>
+              <a:rPr lang="en-US" dirty="0" smtClean="0"/>
               <a:t>Presentation Title (Edit in File &gt; 'Page Setup')</a:t>
             </a:r>
             <a:endParaRPr lang="en-US" dirty="0"/>
           </a:p>
         </p:txBody>
       </p:sp>
-      <p:sp>
-        <p:nvSpPr>
-          <p:cNvPr id="4" name="Text Placeholder 3"/>
-          <p:cNvSpPr>
-            <a:spLocks noGrp="1"/>
-          </p:cNvSpPr>
-          <p:nvPr>
-            <p:ph type="body" sz="quarter" idx="14"/>
-          </p:nvPr>
-        </p:nvSpPr>
-        <p:spPr/>
-        <p:txBody>
-          <a:bodyPr/>
+      <p:pic>
+        <p:nvPicPr>
+          <p:cNvPr id="4" name="Picture 3" descr="Screen Shot 2017-02-13 at 10.53.06 pm.png"/>
+          <p:cNvPicPr>
+            <a:picLocks noChangeAspect="1"/>
+          </p:cNvPicPr>
+          <p:nvPr/>
+        </p:nvPicPr>
+        <p:blipFill>
+          <a:blip r:embed="rId2">
+            <a:extLst>
+              <a:ext uri="{28A0092B-C50C-407E-A947-70E740481C1C}">
+                <a14:useLocalDpi xmlns:a14="http://schemas.microsoft.com/office/drawing/2010/main" val="0"/>
+              </a:ext>
+            </a:extLst>
+          </a:blip>
+          <a:stretch>
+            <a:fillRect/>
+          </a:stretch>
+        </p:blipFill>
+        <p:spPr>
+          <a:xfrm>
+            <a:off x="1322419" y="996067"/>
+            <a:ext cx="6520440" cy="4631094"/>
+          </a:xfrm>
+          <a:prstGeom prst="rect">
+            <a:avLst/>
+          </a:prstGeom>
+        </p:spPr>
+      </p:pic>
+      <p:sp>
+        <p:nvSpPr>
+          <p:cNvPr id="5" name="TextBox 4"/>
+          <p:cNvSpPr txBox="1"/>
+          <p:nvPr/>
+        </p:nvSpPr>
+        <p:spPr>
+          <a:xfrm>
+            <a:off x="733222" y="5735187"/>
+            <a:ext cx="8036688" cy="646331"/>
+          </a:xfrm>
+          <a:prstGeom prst="rect">
+            <a:avLst/>
+          </a:prstGeom>
+          <a:noFill/>
+        </p:spPr>
+        <p:txBody>
+          <a:bodyPr wrap="none" rtlCol="0">
+            <a:spAutoFit/>
+          </a:bodyPr>
           <a:lstStyle/>
           <a:p>
             <a:r>
-              <a:rPr lang="en-US" dirty="0" smtClean="0"/>
-              <a:t>(Pictures of filament directions for different radii)</a:t>
-            </a:r>
-          </a:p>
-          <a:p>
-            <a:pPr lvl="1"/>
-            <a:r>
-              <a:rPr lang="en-US" dirty="0" smtClean="0"/>
-              <a:t>Text</a:t>
-            </a:r>
-          </a:p>
-          <a:p>
-            <a:pPr lvl="2"/>
-            <a:r>
-              <a:rPr lang="en-US" dirty="0" smtClean="0"/>
-              <a:t>Bullet 1</a:t>
-            </a:r>
-          </a:p>
-          <a:p>
-            <a:pPr lvl="3"/>
-            <a:r>
-              <a:rPr lang="en-US" dirty="0" smtClean="0"/>
-              <a:t>Bullet 2</a:t>
-            </a:r>
-          </a:p>
-          <a:p>
-            <a:pPr lvl="4"/>
-            <a:r>
-              <a:rPr lang="en-US" dirty="0" smtClean="0"/>
-              <a:t>Bullet 3</a:t>
-            </a:r>
-            <a:endParaRPr lang="en-US" dirty="0"/>
+              <a:rPr lang="en-US" dirty="0" smtClean="0">
+                <a:solidFill>
+                  <a:schemeClr val="bg1"/>
+                </a:solidFill>
+              </a:rPr>
+              <a:t>Looking at DM and gas </a:t>
+            </a:r>
+            <a:r>
+              <a:rPr lang="mr-IN" dirty="0" smtClean="0">
+                <a:solidFill>
+                  <a:schemeClr val="bg1"/>
+                </a:solidFill>
+              </a:rPr>
+              <a:t>–</a:t>
+            </a:r>
+            <a:r>
+              <a:rPr lang="en-US" dirty="0" smtClean="0">
+                <a:solidFill>
+                  <a:schemeClr val="bg1"/>
+                </a:solidFill>
+              </a:rPr>
+              <a:t> intermediate axis shows strongest alignment with filament</a:t>
+            </a:r>
+          </a:p>
+          <a:p>
+            <a:endParaRPr lang="en-US" dirty="0">
+              <a:solidFill>
+                <a:schemeClr val="bg1"/>
+              </a:solidFill>
+            </a:endParaRPr>
           </a:p>
         </p:txBody>
       </p:sp>
     </p:spTree>
     <p:extLst>
       <p:ext uri="{BB962C8B-B14F-4D97-AF65-F5344CB8AC3E}">
-        <p14:creationId xmlns:p14="http://schemas.microsoft.com/office/powerpoint/2010/main" val="3880460800"/>
+        <p14:creationId xmlns:p14="http://schemas.microsoft.com/office/powerpoint/2010/main" val="136223336"/>
       </p:ext>
     </p:extLst>
   </p:cSld>
@@ -3882,12 +3784,8 @@
           <a:lstStyle/>
           <a:p>
             <a:r>
-              <a:rPr lang="en-US" dirty="0" err="1" smtClean="0"/>
-              <a:t>Examing</a:t>
-            </a:r>
-            <a:r>
               <a:rPr lang="en-US" dirty="0" smtClean="0"/>
-              <a:t> Correlations</a:t>
+              <a:t>For different skeletons?</a:t>
             </a:r>
             <a:endParaRPr lang="en-US" dirty="0"/>
           </a:p>
@@ -3916,61 +3814,260 @@
           </a:p>
         </p:txBody>
       </p:sp>
-      <p:sp>
-        <p:nvSpPr>
-          <p:cNvPr id="4" name="Text Placeholder 3"/>
-          <p:cNvSpPr>
-            <a:spLocks noGrp="1"/>
-          </p:cNvSpPr>
-          <p:nvPr>
-            <p:ph type="body" sz="quarter" idx="14"/>
-          </p:nvPr>
-        </p:nvSpPr>
-        <p:spPr/>
-        <p:txBody>
-          <a:bodyPr/>
+      <p:pic>
+        <p:nvPicPr>
+          <p:cNvPr id="6" name="Picture 5" descr="Screen Shot 2017-02-13 at 10.55.07 pm.png"/>
+          <p:cNvPicPr>
+            <a:picLocks noChangeAspect="1"/>
+          </p:cNvPicPr>
+          <p:nvPr/>
+        </p:nvPicPr>
+        <p:blipFill rotWithShape="1">
+          <a:blip r:embed="rId3">
+            <a:extLst>
+              <a:ext uri="{28A0092B-C50C-407E-A947-70E740481C1C}">
+                <a14:useLocalDpi xmlns:a14="http://schemas.microsoft.com/office/drawing/2010/main" val="0"/>
+              </a:ext>
+            </a:extLst>
+          </a:blip>
+          <a:srcRect t="5446"/>
+          <a:stretch/>
+        </p:blipFill>
+        <p:spPr>
+          <a:xfrm>
+            <a:off x="4610454" y="1610565"/>
+            <a:ext cx="4414771" cy="2955115"/>
+          </a:xfrm>
+          <a:prstGeom prst="rect">
+            <a:avLst/>
+          </a:prstGeom>
+        </p:spPr>
+      </p:pic>
+      <p:pic>
+        <p:nvPicPr>
+          <p:cNvPr id="8" name="Picture 7" descr="Screen Shot 2017-02-13 at 10.54.57 pm.png"/>
+          <p:cNvPicPr>
+            <a:picLocks noChangeAspect="1"/>
+          </p:cNvPicPr>
+          <p:nvPr/>
+        </p:nvPicPr>
+        <p:blipFill rotWithShape="1">
+          <a:blip r:embed="rId4">
+            <a:extLst>
+              <a:ext uri="{28A0092B-C50C-407E-A947-70E740481C1C}">
+                <a14:useLocalDpi xmlns:a14="http://schemas.microsoft.com/office/drawing/2010/main" val="0"/>
+              </a:ext>
+            </a:extLst>
+          </a:blip>
+          <a:srcRect t="3140"/>
+          <a:stretch/>
+        </p:blipFill>
+        <p:spPr>
+          <a:xfrm>
+            <a:off x="130932" y="1610565"/>
+            <a:ext cx="4374776" cy="2955116"/>
+          </a:xfrm>
+          <a:prstGeom prst="rect">
+            <a:avLst/>
+          </a:prstGeom>
+        </p:spPr>
+      </p:pic>
+      <p:sp>
+        <p:nvSpPr>
+          <p:cNvPr id="9" name="TextBox 8"/>
+          <p:cNvSpPr txBox="1"/>
+          <p:nvPr/>
+        </p:nvSpPr>
+        <p:spPr>
+          <a:xfrm>
+            <a:off x="484451" y="1093820"/>
+            <a:ext cx="1898521" cy="400110"/>
+          </a:xfrm>
+          <a:prstGeom prst="rect">
+            <a:avLst/>
+          </a:prstGeom>
+          <a:noFill/>
+        </p:spPr>
+        <p:txBody>
+          <a:bodyPr wrap="square" rtlCol="0">
+            <a:spAutoFit/>
+          </a:bodyPr>
           <a:lstStyle/>
           <a:p>
             <a:r>
-              <a:rPr lang="en-US" dirty="0" smtClean="0"/>
-              <a:t>Plotting angle between the major axis of the halo and the filament</a:t>
-            </a:r>
-          </a:p>
-          <a:p>
-            <a:pPr lvl="1"/>
-            <a:r>
-              <a:rPr lang="en-US" dirty="0" smtClean="0"/>
-              <a:t>What about the other axes? Did we plot these?</a:t>
-            </a:r>
-          </a:p>
-          <a:p>
-            <a:pPr lvl="2"/>
-            <a:r>
-              <a:rPr lang="en-US" dirty="0" smtClean="0"/>
-              <a:t>Bullet 1</a:t>
-            </a:r>
-          </a:p>
-          <a:p>
-            <a:pPr lvl="3"/>
-            <a:r>
-              <a:rPr lang="en-US" dirty="0" smtClean="0"/>
-              <a:t>Bullet 2</a:t>
-            </a:r>
-          </a:p>
-          <a:p>
-            <a:pPr lvl="4"/>
-            <a:r>
-              <a:rPr lang="en-US" dirty="0" smtClean="0"/>
-              <a:t>Bullet 3</a:t>
-            </a:r>
-            <a:endParaRPr lang="en-US" dirty="0"/>
+              <a:rPr lang="en-US" sz="2000" dirty="0" smtClean="0">
+                <a:solidFill>
+                  <a:srgbClr val="FFFFFF"/>
+                </a:solidFill>
+              </a:rPr>
+              <a:t>DM Alignment</a:t>
+            </a:r>
+            <a:endParaRPr lang="en-US" sz="2000" dirty="0">
+              <a:solidFill>
+                <a:srgbClr val="FFFFFF"/>
+              </a:solidFill>
+            </a:endParaRPr>
+          </a:p>
+        </p:txBody>
+      </p:sp>
+      <p:sp>
+        <p:nvSpPr>
+          <p:cNvPr id="10" name="TextBox 9"/>
+          <p:cNvSpPr txBox="1"/>
+          <p:nvPr/>
+        </p:nvSpPr>
+        <p:spPr>
+          <a:xfrm>
+            <a:off x="6820841" y="1093820"/>
+            <a:ext cx="2099639" cy="400110"/>
+          </a:xfrm>
+          <a:prstGeom prst="rect">
+            <a:avLst/>
+          </a:prstGeom>
+          <a:noFill/>
+        </p:spPr>
+        <p:txBody>
+          <a:bodyPr wrap="square" rtlCol="0">
+            <a:spAutoFit/>
+          </a:bodyPr>
+          <a:lstStyle/>
+          <a:p>
+            <a:r>
+              <a:rPr lang="en-US" sz="2000" dirty="0" smtClean="0">
+                <a:solidFill>
+                  <a:srgbClr val="FFFFFF"/>
+                </a:solidFill>
+              </a:rPr>
+              <a:t>Gas Alignment</a:t>
+            </a:r>
+            <a:endParaRPr lang="en-US" sz="2000" dirty="0">
+              <a:solidFill>
+                <a:srgbClr val="FFFFFF"/>
+              </a:solidFill>
+            </a:endParaRPr>
+          </a:p>
+        </p:txBody>
+      </p:sp>
+      <p:sp>
+        <p:nvSpPr>
+          <p:cNvPr id="11" name="TextBox 10"/>
+          <p:cNvSpPr txBox="1"/>
+          <p:nvPr/>
+        </p:nvSpPr>
+        <p:spPr>
+          <a:xfrm>
+            <a:off x="302774" y="4814467"/>
+            <a:ext cx="8615360" cy="1477328"/>
+          </a:xfrm>
+          <a:prstGeom prst="rect">
+            <a:avLst/>
+          </a:prstGeom>
+          <a:noFill/>
+        </p:spPr>
+        <p:txBody>
+          <a:bodyPr wrap="square" rtlCol="0">
+            <a:spAutoFit/>
+          </a:bodyPr>
+          <a:lstStyle/>
+          <a:p>
+            <a:pPr marL="285750" indent="-285750">
+              <a:buFont typeface="Arial"/>
+              <a:buChar char="•"/>
+            </a:pPr>
+            <a:r>
+              <a:rPr lang="en-US" dirty="0">
+                <a:solidFill>
+                  <a:srgbClr val="FFFFFF"/>
+                </a:solidFill>
+              </a:rPr>
+              <a:t>See stronger alignment in gas than DM at further distance </a:t>
+            </a:r>
+            <a:r>
+              <a:rPr lang="mr-IN" dirty="0">
+                <a:solidFill>
+                  <a:srgbClr val="FFFFFF"/>
+                </a:solidFill>
+              </a:rPr>
+              <a:t>–</a:t>
+            </a:r>
+            <a:r>
+              <a:rPr lang="en-US" dirty="0">
+                <a:solidFill>
+                  <a:srgbClr val="FFFFFF"/>
+                </a:solidFill>
+              </a:rPr>
+              <a:t> as expected, streams along the filament. </a:t>
+            </a:r>
+            <a:endParaRPr lang="en-US" dirty="0" smtClean="0">
+              <a:solidFill>
+                <a:srgbClr val="FFFFFF"/>
+              </a:solidFill>
+            </a:endParaRPr>
+          </a:p>
+          <a:p>
+            <a:pPr marL="285750" indent="-285750">
+              <a:buFont typeface="Arial"/>
+              <a:buChar char="•"/>
+            </a:pPr>
+            <a:r>
+              <a:rPr lang="en-US" dirty="0" smtClean="0">
+                <a:solidFill>
+                  <a:srgbClr val="FFFFFF"/>
+                </a:solidFill>
+              </a:rPr>
+              <a:t>Sharp drop at 0.5 corresponds to peak in </a:t>
+            </a:r>
+            <a:r>
+              <a:rPr lang="en-US" dirty="0" err="1" smtClean="0">
+                <a:solidFill>
+                  <a:srgbClr val="FFFFFF"/>
+                </a:solidFill>
+              </a:rPr>
+              <a:t>sphericity</a:t>
+            </a:r>
+            <a:r>
+              <a:rPr lang="en-US" dirty="0" smtClean="0">
+                <a:solidFill>
+                  <a:srgbClr val="FFFFFF"/>
+                </a:solidFill>
+              </a:rPr>
+              <a:t> for temperature profile </a:t>
+            </a:r>
+            <a:r>
+              <a:rPr lang="mr-IN" dirty="0" smtClean="0">
+                <a:solidFill>
+                  <a:srgbClr val="FFFFFF"/>
+                </a:solidFill>
+              </a:rPr>
+              <a:t>–</a:t>
+            </a:r>
+            <a:r>
+              <a:rPr lang="en-US" dirty="0" smtClean="0">
+                <a:solidFill>
+                  <a:srgbClr val="FFFFFF"/>
+                </a:solidFill>
+              </a:rPr>
+              <a:t> possibly a shock</a:t>
+            </a:r>
+            <a:endParaRPr lang="en-US" dirty="0">
+              <a:solidFill>
+                <a:srgbClr val="FFFFFF"/>
+              </a:solidFill>
+            </a:endParaRPr>
+          </a:p>
+          <a:p>
+            <a:endParaRPr lang="en-US" dirty="0">
+              <a:solidFill>
+                <a:srgbClr val="FFFFFF"/>
+              </a:solidFill>
+            </a:endParaRPr>
           </a:p>
         </p:txBody>
       </p:sp>
     </p:spTree>
     <p:extLst>
       <p:ext uri="{BB962C8B-B14F-4D97-AF65-F5344CB8AC3E}">
-        <p14:creationId xmlns:p14="http://schemas.microsoft.com/office/powerpoint/2010/main" val="136223336"/>
+        <p14:creationId xmlns:p14="http://schemas.microsoft.com/office/powerpoint/2010/main" val="2013433585"/>
       </p:ext>
     </p:extLst>
   </p:cSld>

</xml_diff>